<commit_message>
Obtendo lista de tarefas do WebService
</commit_message>
<xml_diff>
--- a/Apresentacao.Knockout.JS/Knockout.JS.2014.04.pptx
+++ b/Apresentacao.Knockout.JS/Knockout.JS.2014.04.pptx
@@ -3259,7 +3259,7 @@
             <a:fld id="{E28287AA-0D99-42CE-A71B-10FA9908BBF8}" type="datetimeFigureOut">
               <a:rPr lang="en-US" smtClean="0"/>
               <a:pPr/>
-              <a:t>4/7/2014</a:t>
+              <a:t>4/23/2014</a:t>
             </a:fld>
             <a:endParaRPr lang="en-US"/>
           </a:p>
@@ -3913,7 +3913,7 @@
             <a:fld id="{DCFA480D-CB17-4C49-BB2A-C7514E1C7CEA}" type="datetimeFigureOut">
               <a:rPr lang="en-US" smtClean="0"/>
               <a:pPr/>
-              <a:t>4/7/2014</a:t>
+              <a:t>4/23/2014</a:t>
             </a:fld>
             <a:endParaRPr lang="en-US"/>
           </a:p>
@@ -4081,7 +4081,7 @@
             <a:fld id="{DCFA480D-CB17-4C49-BB2A-C7514E1C7CEA}" type="datetimeFigureOut">
               <a:rPr lang="en-US" smtClean="0"/>
               <a:pPr/>
-              <a:t>4/7/2014</a:t>
+              <a:t>4/23/2014</a:t>
             </a:fld>
             <a:endParaRPr lang="en-US"/>
           </a:p>
@@ -4258,7 +4258,7 @@
             <a:fld id="{DCFA480D-CB17-4C49-BB2A-C7514E1C7CEA}" type="datetimeFigureOut">
               <a:rPr lang="en-US" smtClean="0"/>
               <a:pPr/>
-              <a:t>4/7/2014</a:t>
+              <a:t>4/23/2014</a:t>
             </a:fld>
             <a:endParaRPr lang="en-US"/>
           </a:p>
@@ -4407,7 +4407,7 @@
             <a:fld id="{DCFA480D-CB17-4C49-BB2A-C7514E1C7CEA}" type="datetimeFigureOut">
               <a:rPr lang="en-US" smtClean="0"/>
               <a:pPr/>
-              <a:t>4/7/2014</a:t>
+              <a:t>4/23/2014</a:t>
             </a:fld>
             <a:endParaRPr lang="en-US"/>
           </a:p>
@@ -4532,7 +4532,7 @@
             <a:fld id="{DCFA480D-CB17-4C49-BB2A-C7514E1C7CEA}" type="datetimeFigureOut">
               <a:rPr lang="en-US" smtClean="0"/>
               <a:pPr/>
-              <a:t>4/7/2014</a:t>
+              <a:t>4/23/2014</a:t>
             </a:fld>
             <a:endParaRPr lang="en-US" dirty="0"/>
           </a:p>
@@ -4804,7 +4804,7 @@
             <a:fld id="{DCFA480D-CB17-4C49-BB2A-C7514E1C7CEA}" type="datetimeFigureOut">
               <a:rPr lang="en-US" smtClean="0"/>
               <a:pPr/>
-              <a:t>4/7/2014</a:t>
+              <a:t>4/23/2014</a:t>
             </a:fld>
             <a:endParaRPr lang="en-US" dirty="0"/>
           </a:p>
@@ -5076,7 +5076,7 @@
             <a:fld id="{DCFA480D-CB17-4C49-BB2A-C7514E1C7CEA}" type="datetimeFigureOut">
               <a:rPr lang="en-US" smtClean="0"/>
               <a:pPr/>
-              <a:t>4/7/2014</a:t>
+              <a:t>4/23/2014</a:t>
             </a:fld>
             <a:endParaRPr lang="en-US" dirty="0"/>
           </a:p>
@@ -5524,7 +5524,7 @@
             <a:fld id="{DCFA480D-CB17-4C49-BB2A-C7514E1C7CEA}" type="datetimeFigureOut">
               <a:rPr lang="en-US" smtClean="0"/>
               <a:pPr/>
-              <a:t>4/7/2014</a:t>
+              <a:t>4/23/2014</a:t>
             </a:fld>
             <a:endParaRPr lang="en-US" dirty="0"/>
           </a:p>
@@ -5639,7 +5639,7 @@
             <a:fld id="{DCFA480D-CB17-4C49-BB2A-C7514E1C7CEA}" type="datetimeFigureOut">
               <a:rPr lang="en-US" smtClean="0"/>
               <a:pPr/>
-              <a:t>4/7/2014</a:t>
+              <a:t>4/23/2014</a:t>
             </a:fld>
             <a:endParaRPr lang="en-US" dirty="0"/>
           </a:p>
@@ -5891,7 +5891,7 @@
             <a:fld id="{DCFA480D-CB17-4C49-BB2A-C7514E1C7CEA}" type="datetimeFigureOut">
               <a:rPr lang="en-US" smtClean="0"/>
               <a:pPr/>
-              <a:t>4/7/2014</a:t>
+              <a:t>4/23/2014</a:t>
             </a:fld>
             <a:endParaRPr lang="en-US"/>
           </a:p>
@@ -6134,7 +6134,7 @@
             <a:fld id="{DCFA480D-CB17-4C49-BB2A-C7514E1C7CEA}" type="datetimeFigureOut">
               <a:rPr lang="en-US" smtClean="0"/>
               <a:pPr/>
-              <a:t>4/7/2014</a:t>
+              <a:t>4/23/2014</a:t>
             </a:fld>
             <a:endParaRPr lang="en-US"/>
           </a:p>
@@ -6310,7 +6310,7 @@
             <a:fld id="{DCFA480D-CB17-4C49-BB2A-C7514E1C7CEA}" type="datetimeFigureOut">
               <a:rPr lang="en-US" smtClean="0"/>
               <a:pPr/>
-              <a:t>4/7/2014</a:t>
+              <a:t>4/23/2014</a:t>
             </a:fld>
             <a:endParaRPr lang="en-US" sz="1200" dirty="0">
               <a:solidFill>
@@ -11793,30 +11793,21 @@
                             </p:childTnLst>
                           </p:cTn>
                         </p:par>
-                      </p:childTnLst>
-                    </p:cTn>
-                  </p:par>
-                  <p:par>
-                    <p:cTn id="8" fill="hold">
-                      <p:stCondLst>
-                        <p:cond delay="indefinite"/>
-                      </p:stCondLst>
-                      <p:childTnLst>
                         <p:par>
-                          <p:cTn id="9" fill="hold">
+                          <p:cTn id="8" fill="hold">
                             <p:stCondLst>
-                              <p:cond delay="0"/>
+                              <p:cond delay="500"/>
                             </p:stCondLst>
                             <p:childTnLst>
                               <p:par>
-                                <p:cTn id="10" presetID="10" presetClass="entr" presetSubtype="0" fill="hold" grpId="0" nodeType="clickEffect">
+                                <p:cTn id="9" presetID="10" presetClass="entr" presetSubtype="0" fill="hold" grpId="0" nodeType="afterEffect">
                                   <p:stCondLst>
                                     <p:cond delay="0"/>
                                   </p:stCondLst>
                                   <p:childTnLst>
                                     <p:set>
                                       <p:cBhvr>
-                                        <p:cTn id="11" dur="1" fill="hold">
+                                        <p:cTn id="10" dur="1" fill="hold">
                                           <p:stCondLst>
                                             <p:cond delay="0"/>
                                           </p:stCondLst>
@@ -11838,7 +11829,7 @@
                                     </p:set>
                                     <p:animEffect transition="in" filter="fade">
                                       <p:cBhvr>
-                                        <p:cTn id="12" dur="500"/>
+                                        <p:cTn id="11" dur="500"/>
                                         <p:tgtEl>
                                           <p:spTgt spid="3">
                                             <p:txEl>
@@ -11854,30 +11845,21 @@
                             </p:childTnLst>
                           </p:cTn>
                         </p:par>
-                      </p:childTnLst>
-                    </p:cTn>
-                  </p:par>
-                  <p:par>
-                    <p:cTn id="13" fill="hold">
-                      <p:stCondLst>
-                        <p:cond delay="indefinite"/>
-                      </p:stCondLst>
-                      <p:childTnLst>
                         <p:par>
-                          <p:cTn id="14" fill="hold">
+                          <p:cTn id="12" fill="hold">
                             <p:stCondLst>
-                              <p:cond delay="0"/>
+                              <p:cond delay="1000"/>
                             </p:stCondLst>
                             <p:childTnLst>
                               <p:par>
-                                <p:cTn id="15" presetID="10" presetClass="entr" presetSubtype="0" fill="hold" grpId="0" nodeType="clickEffect">
+                                <p:cTn id="13" presetID="10" presetClass="entr" presetSubtype="0" fill="hold" grpId="0" nodeType="afterEffect">
                                   <p:stCondLst>
                                     <p:cond delay="0"/>
                                   </p:stCondLst>
                                   <p:childTnLst>
                                     <p:set>
                                       <p:cBhvr>
-                                        <p:cTn id="16" dur="1" fill="hold">
+                                        <p:cTn id="14" dur="1" fill="hold">
                                           <p:stCondLst>
                                             <p:cond delay="0"/>
                                           </p:stCondLst>
@@ -11899,7 +11881,7 @@
                                     </p:set>
                                     <p:animEffect transition="in" filter="fade">
                                       <p:cBhvr>
-                                        <p:cTn id="17" dur="500"/>
+                                        <p:cTn id="15" dur="500"/>
                                         <p:tgtEl>
                                           <p:spTgt spid="3">
                                             <p:txEl>
@@ -11915,30 +11897,21 @@
                             </p:childTnLst>
                           </p:cTn>
                         </p:par>
-                      </p:childTnLst>
-                    </p:cTn>
-                  </p:par>
-                  <p:par>
-                    <p:cTn id="18" fill="hold">
-                      <p:stCondLst>
-                        <p:cond delay="indefinite"/>
-                      </p:stCondLst>
-                      <p:childTnLst>
                         <p:par>
-                          <p:cTn id="19" fill="hold">
+                          <p:cTn id="16" fill="hold">
                             <p:stCondLst>
-                              <p:cond delay="0"/>
+                              <p:cond delay="1500"/>
                             </p:stCondLst>
                             <p:childTnLst>
                               <p:par>
-                                <p:cTn id="20" presetID="10" presetClass="entr" presetSubtype="0" fill="hold" grpId="0" nodeType="clickEffect">
+                                <p:cTn id="17" presetID="10" presetClass="entr" presetSubtype="0" fill="hold" grpId="0" nodeType="afterEffect">
                                   <p:stCondLst>
                                     <p:cond delay="0"/>
                                   </p:stCondLst>
                                   <p:childTnLst>
                                     <p:set>
                                       <p:cBhvr>
-                                        <p:cTn id="21" dur="1" fill="hold">
+                                        <p:cTn id="18" dur="1" fill="hold">
                                           <p:stCondLst>
                                             <p:cond delay="0"/>
                                           </p:stCondLst>
@@ -11960,7 +11933,7 @@
                                     </p:set>
                                     <p:animEffect transition="in" filter="fade">
                                       <p:cBhvr>
-                                        <p:cTn id="22" dur="500"/>
+                                        <p:cTn id="19" dur="500"/>
                                         <p:tgtEl>
                                           <p:spTgt spid="3">
                                             <p:txEl>
@@ -11976,30 +11949,21 @@
                             </p:childTnLst>
                           </p:cTn>
                         </p:par>
-                      </p:childTnLst>
-                    </p:cTn>
-                  </p:par>
-                  <p:par>
-                    <p:cTn id="23" fill="hold">
-                      <p:stCondLst>
-                        <p:cond delay="indefinite"/>
-                      </p:stCondLst>
-                      <p:childTnLst>
                         <p:par>
-                          <p:cTn id="24" fill="hold">
+                          <p:cTn id="20" fill="hold">
                             <p:stCondLst>
-                              <p:cond delay="0"/>
+                              <p:cond delay="2000"/>
                             </p:stCondLst>
                             <p:childTnLst>
                               <p:par>
-                                <p:cTn id="25" presetID="10" presetClass="entr" presetSubtype="0" fill="hold" grpId="0" nodeType="clickEffect">
+                                <p:cTn id="21" presetID="10" presetClass="entr" presetSubtype="0" fill="hold" grpId="0" nodeType="afterEffect">
                                   <p:stCondLst>
                                     <p:cond delay="0"/>
                                   </p:stCondLst>
                                   <p:childTnLst>
                                     <p:set>
                                       <p:cBhvr>
-                                        <p:cTn id="26" dur="1" fill="hold">
+                                        <p:cTn id="22" dur="1" fill="hold">
                                           <p:stCondLst>
                                             <p:cond delay="0"/>
                                           </p:stCondLst>
@@ -12021,7 +11985,7 @@
                                     </p:set>
                                     <p:animEffect transition="in" filter="fade">
                                       <p:cBhvr>
-                                        <p:cTn id="27" dur="500"/>
+                                        <p:cTn id="23" dur="500"/>
                                         <p:tgtEl>
                                           <p:spTgt spid="3">
                                             <p:txEl>
@@ -12037,30 +12001,21 @@
                             </p:childTnLst>
                           </p:cTn>
                         </p:par>
-                      </p:childTnLst>
-                    </p:cTn>
-                  </p:par>
-                  <p:par>
-                    <p:cTn id="28" fill="hold">
-                      <p:stCondLst>
-                        <p:cond delay="indefinite"/>
-                      </p:stCondLst>
-                      <p:childTnLst>
                         <p:par>
-                          <p:cTn id="29" fill="hold">
+                          <p:cTn id="24" fill="hold">
                             <p:stCondLst>
-                              <p:cond delay="0"/>
+                              <p:cond delay="2500"/>
                             </p:stCondLst>
                             <p:childTnLst>
                               <p:par>
-                                <p:cTn id="30" presetID="10" presetClass="entr" presetSubtype="0" fill="hold" grpId="0" nodeType="clickEffect">
+                                <p:cTn id="25" presetID="10" presetClass="entr" presetSubtype="0" fill="hold" grpId="0" nodeType="afterEffect">
                                   <p:stCondLst>
                                     <p:cond delay="0"/>
                                   </p:stCondLst>
                                   <p:childTnLst>
                                     <p:set>
                                       <p:cBhvr>
-                                        <p:cTn id="31" dur="1" fill="hold">
+                                        <p:cTn id="26" dur="1" fill="hold">
                                           <p:stCondLst>
                                             <p:cond delay="0"/>
                                           </p:stCondLst>
@@ -12082,7 +12037,7 @@
                                     </p:set>
                                     <p:animEffect transition="in" filter="fade">
                                       <p:cBhvr>
-                                        <p:cTn id="32" dur="500"/>
+                                        <p:cTn id="27" dur="500"/>
                                         <p:tgtEl>
                                           <p:spTgt spid="3">
                                             <p:txEl>
@@ -12098,30 +12053,21 @@
                             </p:childTnLst>
                           </p:cTn>
                         </p:par>
-                      </p:childTnLst>
-                    </p:cTn>
-                  </p:par>
-                  <p:par>
-                    <p:cTn id="33" fill="hold">
-                      <p:stCondLst>
-                        <p:cond delay="indefinite"/>
-                      </p:stCondLst>
-                      <p:childTnLst>
                         <p:par>
-                          <p:cTn id="34" fill="hold">
+                          <p:cTn id="28" fill="hold">
                             <p:stCondLst>
-                              <p:cond delay="0"/>
+                              <p:cond delay="3000"/>
                             </p:stCondLst>
                             <p:childTnLst>
                               <p:par>
-                                <p:cTn id="35" presetID="10" presetClass="entr" presetSubtype="0" fill="hold" grpId="0" nodeType="clickEffect">
+                                <p:cTn id="29" presetID="10" presetClass="entr" presetSubtype="0" fill="hold" grpId="0" nodeType="afterEffect">
                                   <p:stCondLst>
                                     <p:cond delay="0"/>
                                   </p:stCondLst>
                                   <p:childTnLst>
                                     <p:set>
                                       <p:cBhvr>
-                                        <p:cTn id="36" dur="1" fill="hold">
+                                        <p:cTn id="30" dur="1" fill="hold">
                                           <p:stCondLst>
                                             <p:cond delay="0"/>
                                           </p:stCondLst>
@@ -12143,7 +12089,7 @@
                                     </p:set>
                                     <p:animEffect transition="in" filter="fade">
                                       <p:cBhvr>
-                                        <p:cTn id="37" dur="500"/>
+                                        <p:cTn id="31" dur="500"/>
                                         <p:tgtEl>
                                           <p:spTgt spid="3">
                                             <p:txEl>
@@ -12159,30 +12105,21 @@
                             </p:childTnLst>
                           </p:cTn>
                         </p:par>
-                      </p:childTnLst>
-                    </p:cTn>
-                  </p:par>
-                  <p:par>
-                    <p:cTn id="38" fill="hold">
-                      <p:stCondLst>
-                        <p:cond delay="indefinite"/>
-                      </p:stCondLst>
-                      <p:childTnLst>
                         <p:par>
-                          <p:cTn id="39" fill="hold">
+                          <p:cTn id="32" fill="hold">
                             <p:stCondLst>
-                              <p:cond delay="0"/>
+                              <p:cond delay="3500"/>
                             </p:stCondLst>
                             <p:childTnLst>
                               <p:par>
-                                <p:cTn id="40" presetID="10" presetClass="entr" presetSubtype="0" fill="hold" grpId="0" nodeType="clickEffect">
+                                <p:cTn id="33" presetID="10" presetClass="entr" presetSubtype="0" fill="hold" grpId="0" nodeType="afterEffect">
                                   <p:stCondLst>
                                     <p:cond delay="0"/>
                                   </p:stCondLst>
                                   <p:childTnLst>
                                     <p:set>
                                       <p:cBhvr>
-                                        <p:cTn id="41" dur="1" fill="hold">
+                                        <p:cTn id="34" dur="1" fill="hold">
                                           <p:stCondLst>
                                             <p:cond delay="0"/>
                                           </p:stCondLst>
@@ -12204,7 +12141,7 @@
                                     </p:set>
                                     <p:animEffect transition="in" filter="fade">
                                       <p:cBhvr>
-                                        <p:cTn id="42" dur="500"/>
+                                        <p:cTn id="35" dur="500"/>
                                         <p:tgtEl>
                                           <p:spTgt spid="3">
                                             <p:txEl>
@@ -12220,30 +12157,21 @@
                             </p:childTnLst>
                           </p:cTn>
                         </p:par>
-                      </p:childTnLst>
-                    </p:cTn>
-                  </p:par>
-                  <p:par>
-                    <p:cTn id="43" fill="hold">
-                      <p:stCondLst>
-                        <p:cond delay="indefinite"/>
-                      </p:stCondLst>
-                      <p:childTnLst>
                         <p:par>
-                          <p:cTn id="44" fill="hold">
+                          <p:cTn id="36" fill="hold">
                             <p:stCondLst>
-                              <p:cond delay="0"/>
+                              <p:cond delay="4000"/>
                             </p:stCondLst>
                             <p:childTnLst>
                               <p:par>
-                                <p:cTn id="45" presetID="10" presetClass="entr" presetSubtype="0" fill="hold" grpId="0" nodeType="clickEffect">
+                                <p:cTn id="37" presetID="10" presetClass="entr" presetSubtype="0" fill="hold" grpId="0" nodeType="afterEffect">
                                   <p:stCondLst>
                                     <p:cond delay="0"/>
                                   </p:stCondLst>
                                   <p:childTnLst>
                                     <p:set>
                                       <p:cBhvr>
-                                        <p:cTn id="46" dur="1" fill="hold">
+                                        <p:cTn id="38" dur="1" fill="hold">
                                           <p:stCondLst>
                                             <p:cond delay="0"/>
                                           </p:stCondLst>
@@ -12265,7 +12193,7 @@
                                     </p:set>
                                     <p:animEffect transition="in" filter="fade">
                                       <p:cBhvr>
-                                        <p:cTn id="47" dur="500"/>
+                                        <p:cTn id="39" dur="500"/>
                                         <p:tgtEl>
                                           <p:spTgt spid="3">
                                             <p:txEl>
@@ -12281,30 +12209,21 @@
                             </p:childTnLst>
                           </p:cTn>
                         </p:par>
-                      </p:childTnLst>
-                    </p:cTn>
-                  </p:par>
-                  <p:par>
-                    <p:cTn id="48" fill="hold">
-                      <p:stCondLst>
-                        <p:cond delay="indefinite"/>
-                      </p:stCondLst>
-                      <p:childTnLst>
                         <p:par>
-                          <p:cTn id="49" fill="hold">
+                          <p:cTn id="40" fill="hold">
                             <p:stCondLst>
-                              <p:cond delay="0"/>
+                              <p:cond delay="4500"/>
                             </p:stCondLst>
                             <p:childTnLst>
                               <p:par>
-                                <p:cTn id="50" presetID="10" presetClass="entr" presetSubtype="0" fill="hold" grpId="0" nodeType="clickEffect">
+                                <p:cTn id="41" presetID="10" presetClass="entr" presetSubtype="0" fill="hold" grpId="0" nodeType="afterEffect">
                                   <p:stCondLst>
                                     <p:cond delay="0"/>
                                   </p:stCondLst>
                                   <p:childTnLst>
                                     <p:set>
                                       <p:cBhvr>
-                                        <p:cTn id="51" dur="1" fill="hold">
+                                        <p:cTn id="42" dur="1" fill="hold">
                                           <p:stCondLst>
                                             <p:cond delay="0"/>
                                           </p:stCondLst>
@@ -12326,7 +12245,7 @@
                                     </p:set>
                                     <p:animEffect transition="in" filter="fade">
                                       <p:cBhvr>
-                                        <p:cTn id="52" dur="500"/>
+                                        <p:cTn id="43" dur="500"/>
                                         <p:tgtEl>
                                           <p:spTgt spid="3">
                                             <p:txEl>
@@ -12346,26 +12265,26 @@
                     </p:cTn>
                   </p:par>
                   <p:par>
-                    <p:cTn id="53" fill="hold">
+                    <p:cTn id="44" fill="hold">
                       <p:stCondLst>
                         <p:cond delay="indefinite"/>
                       </p:stCondLst>
                       <p:childTnLst>
                         <p:par>
-                          <p:cTn id="54" fill="hold">
+                          <p:cTn id="45" fill="hold">
                             <p:stCondLst>
                               <p:cond delay="0"/>
                             </p:stCondLst>
                             <p:childTnLst>
                               <p:par>
-                                <p:cTn id="55" presetID="10" presetClass="entr" presetSubtype="0" fill="hold" grpId="0" nodeType="clickEffect">
+                                <p:cTn id="46" presetID="10" presetClass="entr" presetSubtype="0" fill="hold" grpId="0" nodeType="clickEffect">
                                   <p:stCondLst>
                                     <p:cond delay="0"/>
                                   </p:stCondLst>
                                   <p:childTnLst>
                                     <p:set>
                                       <p:cBhvr>
-                                        <p:cTn id="56" dur="1" fill="hold">
+                                        <p:cTn id="47" dur="1" fill="hold">
                                           <p:stCondLst>
                                             <p:cond delay="0"/>
                                           </p:stCondLst>
@@ -12387,7 +12306,7 @@
                                     </p:set>
                                     <p:animEffect transition="in" filter="fade">
                                       <p:cBhvr>
-                                        <p:cTn id="57" dur="500"/>
+                                        <p:cTn id="48" dur="500"/>
                                         <p:tgtEl>
                                           <p:spTgt spid="4">
                                             <p:txEl>
@@ -12403,30 +12322,21 @@
                             </p:childTnLst>
                           </p:cTn>
                         </p:par>
-                      </p:childTnLst>
-                    </p:cTn>
-                  </p:par>
-                  <p:par>
-                    <p:cTn id="58" fill="hold">
-                      <p:stCondLst>
-                        <p:cond delay="indefinite"/>
-                      </p:stCondLst>
-                      <p:childTnLst>
                         <p:par>
-                          <p:cTn id="59" fill="hold">
+                          <p:cTn id="49" fill="hold">
                             <p:stCondLst>
-                              <p:cond delay="0"/>
+                              <p:cond delay="500"/>
                             </p:stCondLst>
                             <p:childTnLst>
                               <p:par>
-                                <p:cTn id="60" presetID="10" presetClass="entr" presetSubtype="0" fill="hold" grpId="0" nodeType="clickEffect">
+                                <p:cTn id="50" presetID="10" presetClass="entr" presetSubtype="0" fill="hold" grpId="0" nodeType="afterEffect">
                                   <p:stCondLst>
                                     <p:cond delay="0"/>
                                   </p:stCondLst>
                                   <p:childTnLst>
                                     <p:set>
                                       <p:cBhvr>
-                                        <p:cTn id="61" dur="1" fill="hold">
+                                        <p:cTn id="51" dur="1" fill="hold">
                                           <p:stCondLst>
                                             <p:cond delay="0"/>
                                           </p:stCondLst>
@@ -12448,7 +12358,7 @@
                                     </p:set>
                                     <p:animEffect transition="in" filter="fade">
                                       <p:cBhvr>
-                                        <p:cTn id="62" dur="500"/>
+                                        <p:cTn id="52" dur="500"/>
                                         <p:tgtEl>
                                           <p:spTgt spid="4">
                                             <p:txEl>
@@ -12464,30 +12374,21 @@
                             </p:childTnLst>
                           </p:cTn>
                         </p:par>
-                      </p:childTnLst>
-                    </p:cTn>
-                  </p:par>
-                  <p:par>
-                    <p:cTn id="63" fill="hold">
-                      <p:stCondLst>
-                        <p:cond delay="indefinite"/>
-                      </p:stCondLst>
-                      <p:childTnLst>
                         <p:par>
-                          <p:cTn id="64" fill="hold">
+                          <p:cTn id="53" fill="hold">
                             <p:stCondLst>
-                              <p:cond delay="0"/>
+                              <p:cond delay="1000"/>
                             </p:stCondLst>
                             <p:childTnLst>
                               <p:par>
-                                <p:cTn id="65" presetID="10" presetClass="entr" presetSubtype="0" fill="hold" grpId="0" nodeType="clickEffect">
+                                <p:cTn id="54" presetID="10" presetClass="entr" presetSubtype="0" fill="hold" grpId="0" nodeType="afterEffect">
                                   <p:stCondLst>
                                     <p:cond delay="0"/>
                                   </p:stCondLst>
                                   <p:childTnLst>
                                     <p:set>
                                       <p:cBhvr>
-                                        <p:cTn id="66" dur="1" fill="hold">
+                                        <p:cTn id="55" dur="1" fill="hold">
                                           <p:stCondLst>
                                             <p:cond delay="0"/>
                                           </p:stCondLst>
@@ -12509,7 +12410,7 @@
                                     </p:set>
                                     <p:animEffect transition="in" filter="fade">
                                       <p:cBhvr>
-                                        <p:cTn id="67" dur="500"/>
+                                        <p:cTn id="56" dur="500"/>
                                         <p:tgtEl>
                                           <p:spTgt spid="4">
                                             <p:txEl>
@@ -12525,30 +12426,21 @@
                             </p:childTnLst>
                           </p:cTn>
                         </p:par>
-                      </p:childTnLst>
-                    </p:cTn>
-                  </p:par>
-                  <p:par>
-                    <p:cTn id="68" fill="hold">
-                      <p:stCondLst>
-                        <p:cond delay="indefinite"/>
-                      </p:stCondLst>
-                      <p:childTnLst>
                         <p:par>
-                          <p:cTn id="69" fill="hold">
+                          <p:cTn id="57" fill="hold">
                             <p:stCondLst>
-                              <p:cond delay="0"/>
+                              <p:cond delay="1500"/>
                             </p:stCondLst>
                             <p:childTnLst>
                               <p:par>
-                                <p:cTn id="70" presetID="10" presetClass="entr" presetSubtype="0" fill="hold" grpId="0" nodeType="clickEffect">
+                                <p:cTn id="58" presetID="10" presetClass="entr" presetSubtype="0" fill="hold" grpId="0" nodeType="afterEffect">
                                   <p:stCondLst>
                                     <p:cond delay="0"/>
                                   </p:stCondLst>
                                   <p:childTnLst>
                                     <p:set>
                                       <p:cBhvr>
-                                        <p:cTn id="71" dur="1" fill="hold">
+                                        <p:cTn id="59" dur="1" fill="hold">
                                           <p:stCondLst>
                                             <p:cond delay="0"/>
                                           </p:stCondLst>
@@ -12570,7 +12462,7 @@
                                     </p:set>
                                     <p:animEffect transition="in" filter="fade">
                                       <p:cBhvr>
-                                        <p:cTn id="72" dur="500"/>
+                                        <p:cTn id="60" dur="500"/>
                                         <p:tgtEl>
                                           <p:spTgt spid="4">
                                             <p:txEl>
@@ -12586,30 +12478,21 @@
                             </p:childTnLst>
                           </p:cTn>
                         </p:par>
-                      </p:childTnLst>
-                    </p:cTn>
-                  </p:par>
-                  <p:par>
-                    <p:cTn id="73" fill="hold">
-                      <p:stCondLst>
-                        <p:cond delay="indefinite"/>
-                      </p:stCondLst>
-                      <p:childTnLst>
                         <p:par>
-                          <p:cTn id="74" fill="hold">
+                          <p:cTn id="61" fill="hold">
                             <p:stCondLst>
-                              <p:cond delay="0"/>
+                              <p:cond delay="2000"/>
                             </p:stCondLst>
                             <p:childTnLst>
                               <p:par>
-                                <p:cTn id="75" presetID="10" presetClass="entr" presetSubtype="0" fill="hold" grpId="0" nodeType="clickEffect">
+                                <p:cTn id="62" presetID="10" presetClass="entr" presetSubtype="0" fill="hold" grpId="0" nodeType="afterEffect">
                                   <p:stCondLst>
                                     <p:cond delay="0"/>
                                   </p:stCondLst>
                                   <p:childTnLst>
                                     <p:set>
                                       <p:cBhvr>
-                                        <p:cTn id="76" dur="1" fill="hold">
+                                        <p:cTn id="63" dur="1" fill="hold">
                                           <p:stCondLst>
                                             <p:cond delay="0"/>
                                           </p:stCondLst>
@@ -12631,7 +12514,7 @@
                                     </p:set>
                                     <p:animEffect transition="in" filter="fade">
                                       <p:cBhvr>
-                                        <p:cTn id="77" dur="500"/>
+                                        <p:cTn id="64" dur="500"/>
                                         <p:tgtEl>
                                           <p:spTgt spid="4">
                                             <p:txEl>
@@ -12647,30 +12530,21 @@
                             </p:childTnLst>
                           </p:cTn>
                         </p:par>
-                      </p:childTnLst>
-                    </p:cTn>
-                  </p:par>
-                  <p:par>
-                    <p:cTn id="78" fill="hold">
-                      <p:stCondLst>
-                        <p:cond delay="indefinite"/>
-                      </p:stCondLst>
-                      <p:childTnLst>
                         <p:par>
-                          <p:cTn id="79" fill="hold">
+                          <p:cTn id="65" fill="hold">
                             <p:stCondLst>
-                              <p:cond delay="0"/>
+                              <p:cond delay="2500"/>
                             </p:stCondLst>
                             <p:childTnLst>
                               <p:par>
-                                <p:cTn id="80" presetID="10" presetClass="entr" presetSubtype="0" fill="hold" grpId="0" nodeType="clickEffect">
+                                <p:cTn id="66" presetID="10" presetClass="entr" presetSubtype="0" fill="hold" grpId="0" nodeType="afterEffect">
                                   <p:stCondLst>
                                     <p:cond delay="0"/>
                                   </p:stCondLst>
                                   <p:childTnLst>
                                     <p:set>
                                       <p:cBhvr>
-                                        <p:cTn id="81" dur="1" fill="hold">
+                                        <p:cTn id="67" dur="1" fill="hold">
                                           <p:stCondLst>
                                             <p:cond delay="0"/>
                                           </p:stCondLst>
@@ -12692,7 +12566,7 @@
                                     </p:set>
                                     <p:animEffect transition="in" filter="fade">
                                       <p:cBhvr>
-                                        <p:cTn id="82" dur="500"/>
+                                        <p:cTn id="68" dur="500"/>
                                         <p:tgtEl>
                                           <p:spTgt spid="4">
                                             <p:txEl>
@@ -12708,30 +12582,21 @@
                             </p:childTnLst>
                           </p:cTn>
                         </p:par>
-                      </p:childTnLst>
-                    </p:cTn>
-                  </p:par>
-                  <p:par>
-                    <p:cTn id="83" fill="hold">
-                      <p:stCondLst>
-                        <p:cond delay="indefinite"/>
-                      </p:stCondLst>
-                      <p:childTnLst>
                         <p:par>
-                          <p:cTn id="84" fill="hold">
+                          <p:cTn id="69" fill="hold">
                             <p:stCondLst>
-                              <p:cond delay="0"/>
+                              <p:cond delay="3000"/>
                             </p:stCondLst>
                             <p:childTnLst>
                               <p:par>
-                                <p:cTn id="85" presetID="10" presetClass="entr" presetSubtype="0" fill="hold" grpId="0" nodeType="clickEffect">
+                                <p:cTn id="70" presetID="10" presetClass="entr" presetSubtype="0" fill="hold" grpId="0" nodeType="afterEffect">
                                   <p:stCondLst>
                                     <p:cond delay="0"/>
                                   </p:stCondLst>
                                   <p:childTnLst>
                                     <p:set>
                                       <p:cBhvr>
-                                        <p:cTn id="86" dur="1" fill="hold">
+                                        <p:cTn id="71" dur="1" fill="hold">
                                           <p:stCondLst>
                                             <p:cond delay="0"/>
                                           </p:stCondLst>
@@ -12753,7 +12618,7 @@
                                     </p:set>
                                     <p:animEffect transition="in" filter="fade">
                                       <p:cBhvr>
-                                        <p:cTn id="87" dur="500"/>
+                                        <p:cTn id="72" dur="500"/>
                                         <p:tgtEl>
                                           <p:spTgt spid="4">
                                             <p:txEl>
@@ -12769,30 +12634,21 @@
                             </p:childTnLst>
                           </p:cTn>
                         </p:par>
-                      </p:childTnLst>
-                    </p:cTn>
-                  </p:par>
-                  <p:par>
-                    <p:cTn id="88" fill="hold">
-                      <p:stCondLst>
-                        <p:cond delay="indefinite"/>
-                      </p:stCondLst>
-                      <p:childTnLst>
                         <p:par>
-                          <p:cTn id="89" fill="hold">
+                          <p:cTn id="73" fill="hold">
                             <p:stCondLst>
-                              <p:cond delay="0"/>
+                              <p:cond delay="3500"/>
                             </p:stCondLst>
                             <p:childTnLst>
                               <p:par>
-                                <p:cTn id="90" presetID="10" presetClass="entr" presetSubtype="0" fill="hold" grpId="0" nodeType="clickEffect">
+                                <p:cTn id="74" presetID="10" presetClass="entr" presetSubtype="0" fill="hold" grpId="0" nodeType="afterEffect">
                                   <p:stCondLst>
                                     <p:cond delay="0"/>
                                   </p:stCondLst>
                                   <p:childTnLst>
                                     <p:set>
                                       <p:cBhvr>
-                                        <p:cTn id="91" dur="1" fill="hold">
+                                        <p:cTn id="75" dur="1" fill="hold">
                                           <p:stCondLst>
                                             <p:cond delay="0"/>
                                           </p:stCondLst>
@@ -12814,7 +12670,7 @@
                                     </p:set>
                                     <p:animEffect transition="in" filter="fade">
                                       <p:cBhvr>
-                                        <p:cTn id="92" dur="500"/>
+                                        <p:cTn id="76" dur="500"/>
                                         <p:tgtEl>
                                           <p:spTgt spid="4">
                                             <p:txEl>
@@ -12830,30 +12686,21 @@
                             </p:childTnLst>
                           </p:cTn>
                         </p:par>
-                      </p:childTnLst>
-                    </p:cTn>
-                  </p:par>
-                  <p:par>
-                    <p:cTn id="93" fill="hold">
-                      <p:stCondLst>
-                        <p:cond delay="indefinite"/>
-                      </p:stCondLst>
-                      <p:childTnLst>
                         <p:par>
-                          <p:cTn id="94" fill="hold">
+                          <p:cTn id="77" fill="hold">
                             <p:stCondLst>
-                              <p:cond delay="0"/>
+                              <p:cond delay="4000"/>
                             </p:stCondLst>
                             <p:childTnLst>
                               <p:par>
-                                <p:cTn id="95" presetID="10" presetClass="entr" presetSubtype="0" fill="hold" grpId="0" nodeType="clickEffect">
+                                <p:cTn id="78" presetID="10" presetClass="entr" presetSubtype="0" fill="hold" grpId="0" nodeType="afterEffect">
                                   <p:stCondLst>
                                     <p:cond delay="0"/>
                                   </p:stCondLst>
                                   <p:childTnLst>
                                     <p:set>
                                       <p:cBhvr>
-                                        <p:cTn id="96" dur="1" fill="hold">
+                                        <p:cTn id="79" dur="1" fill="hold">
                                           <p:stCondLst>
                                             <p:cond delay="0"/>
                                           </p:stCondLst>
@@ -12875,7 +12722,7 @@
                                     </p:set>
                                     <p:animEffect transition="in" filter="fade">
                                       <p:cBhvr>
-                                        <p:cTn id="97" dur="500"/>
+                                        <p:cTn id="80" dur="500"/>
                                         <p:tgtEl>
                                           <p:spTgt spid="4">
                                             <p:txEl>
@@ -12895,26 +12742,26 @@
                     </p:cTn>
                   </p:par>
                   <p:par>
-                    <p:cTn id="98" fill="hold">
+                    <p:cTn id="81" fill="hold">
                       <p:stCondLst>
                         <p:cond delay="indefinite"/>
                       </p:stCondLst>
                       <p:childTnLst>
                         <p:par>
-                          <p:cTn id="99" fill="hold">
+                          <p:cTn id="82" fill="hold">
                             <p:stCondLst>
                               <p:cond delay="0"/>
                             </p:stCondLst>
                             <p:childTnLst>
                               <p:par>
-                                <p:cTn id="100" presetID="26" presetClass="entr" presetSubtype="0" fill="hold" nodeType="clickEffect">
+                                <p:cTn id="83" presetID="26" presetClass="entr" presetSubtype="0" fill="hold" nodeType="clickEffect">
                                   <p:stCondLst>
                                     <p:cond delay="0"/>
                                   </p:stCondLst>
                                   <p:childTnLst>
                                     <p:set>
                                       <p:cBhvr>
-                                        <p:cTn id="101" dur="1" fill="hold">
+                                        <p:cTn id="84" dur="1" fill="hold">
                                           <p:stCondLst>
                                             <p:cond delay="0"/>
                                           </p:stCondLst>
@@ -12932,7 +12779,7 @@
                                     </p:set>
                                     <p:animEffect transition="in" filter="wipe(down)">
                                       <p:cBhvr>
-                                        <p:cTn id="102" dur="580">
+                                        <p:cTn id="85" dur="580">
                                           <p:stCondLst>
                                             <p:cond delay="0"/>
                                           </p:stCondLst>
@@ -12944,7 +12791,7 @@
                                     </p:animEffect>
                                     <p:anim calcmode="lin" valueType="num">
                                       <p:cBhvr>
-                                        <p:cTn id="103" dur="1822" tmFilter="0,0; 0.14,0.36; 0.43,0.73; 0.71,0.91; 1.0,1.0">
+                                        <p:cTn id="86" dur="1822" tmFilter="0,0; 0.14,0.36; 0.43,0.73; 0.71,0.91; 1.0,1.0">
                                           <p:stCondLst>
                                             <p:cond delay="0"/>
                                           </p:stCondLst>
@@ -12971,7 +12818,7 @@
                                     </p:anim>
                                     <p:anim calcmode="lin" valueType="num">
                                       <p:cBhvr>
-                                        <p:cTn id="104" dur="664" tmFilter="0.0,0.0; 0.25,0.07; 0.50,0.2; 0.75,0.467; 1.0,1.0">
+                                        <p:cTn id="87" dur="664" tmFilter="0.0,0.0; 0.25,0.07; 0.50,0.2; 0.75,0.467; 1.0,1.0">
                                           <p:stCondLst>
                                             <p:cond delay="0"/>
                                           </p:stCondLst>
@@ -12998,7 +12845,7 @@
                                     </p:anim>
                                     <p:anim calcmode="lin" valueType="num">
                                       <p:cBhvr>
-                                        <p:cTn id="105" dur="664" tmFilter="0, 0; 0.125,0.2665; 0.25,0.4; 0.375,0.465; 0.5,0.5;  0.625,0.535; 0.75,0.6; 0.875,0.7335; 1,1">
+                                        <p:cTn id="88" dur="664" tmFilter="0, 0; 0.125,0.2665; 0.25,0.4; 0.375,0.465; 0.5,0.5;  0.625,0.535; 0.75,0.6; 0.875,0.7335; 1,1">
                                           <p:stCondLst>
                                             <p:cond delay="664"/>
                                           </p:stCondLst>
@@ -13025,7 +12872,7 @@
                                     </p:anim>
                                     <p:anim calcmode="lin" valueType="num">
                                       <p:cBhvr>
-                                        <p:cTn id="106" dur="332" tmFilter="0, 0; 0.125,0.2665; 0.25,0.4; 0.375,0.465; 0.5,0.5;  0.625,0.535; 0.75,0.6; 0.875,0.7335; 1,1">
+                                        <p:cTn id="89" dur="332" tmFilter="0, 0; 0.125,0.2665; 0.25,0.4; 0.375,0.465; 0.5,0.5;  0.625,0.535; 0.75,0.6; 0.875,0.7335; 1,1">
                                           <p:stCondLst>
                                             <p:cond delay="1324"/>
                                           </p:stCondLst>
@@ -13052,7 +12899,7 @@
                                     </p:anim>
                                     <p:anim calcmode="lin" valueType="num">
                                       <p:cBhvr>
-                                        <p:cTn id="107" dur="164" tmFilter="0, 0; 0.125,0.2665; 0.25,0.4; 0.375,0.465; 0.5,0.5;  0.625,0.535; 0.75,0.6; 0.875,0.7335; 1,1">
+                                        <p:cTn id="90" dur="164" tmFilter="0, 0; 0.125,0.2665; 0.25,0.4; 0.375,0.465; 0.5,0.5;  0.625,0.535; 0.75,0.6; 0.875,0.7335; 1,1">
                                           <p:stCondLst>
                                             <p:cond delay="1656"/>
                                           </p:stCondLst>
@@ -13079,7 +12926,7 @@
                                     </p:anim>
                                     <p:animScale>
                                       <p:cBhvr>
-                                        <p:cTn id="108" dur="26">
+                                        <p:cTn id="91" dur="26">
                                           <p:stCondLst>
                                             <p:cond delay="650"/>
                                           </p:stCondLst>
@@ -13092,7 +12939,7 @@
                                     </p:animScale>
                                     <p:animScale>
                                       <p:cBhvr>
-                                        <p:cTn id="109" dur="166" decel="50000">
+                                        <p:cTn id="92" dur="166" decel="50000">
                                           <p:stCondLst>
                                             <p:cond delay="676"/>
                                           </p:stCondLst>
@@ -13105,7 +12952,7 @@
                                     </p:animScale>
                                     <p:animScale>
                                       <p:cBhvr>
-                                        <p:cTn id="110" dur="26">
+                                        <p:cTn id="93" dur="26">
                                           <p:stCondLst>
                                             <p:cond delay="1312"/>
                                           </p:stCondLst>
@@ -13118,7 +12965,7 @@
                                     </p:animScale>
                                     <p:animScale>
                                       <p:cBhvr>
-                                        <p:cTn id="111" dur="166" decel="50000">
+                                        <p:cTn id="94" dur="166" decel="50000">
                                           <p:stCondLst>
                                             <p:cond delay="1338"/>
                                           </p:stCondLst>
@@ -13131,7 +12978,7 @@
                                     </p:animScale>
                                     <p:animScale>
                                       <p:cBhvr>
-                                        <p:cTn id="112" dur="26">
+                                        <p:cTn id="95" dur="26">
                                           <p:stCondLst>
                                             <p:cond delay="1642"/>
                                           </p:stCondLst>
@@ -13144,7 +12991,7 @@
                                     </p:animScale>
                                     <p:animScale>
                                       <p:cBhvr>
-                                        <p:cTn id="113" dur="166" decel="50000">
+                                        <p:cTn id="96" dur="166" decel="50000">
                                           <p:stCondLst>
                                             <p:cond delay="1668"/>
                                           </p:stCondLst>
@@ -13157,7 +13004,7 @@
                                     </p:animScale>
                                     <p:animScale>
                                       <p:cBhvr>
-                                        <p:cTn id="114" dur="26">
+                                        <p:cTn id="97" dur="26">
                                           <p:stCondLst>
                                             <p:cond delay="1808"/>
                                           </p:stCondLst>
@@ -13170,7 +13017,7 @@
                                     </p:animScale>
                                     <p:animScale>
                                       <p:cBhvr>
-                                        <p:cTn id="115" dur="166" decel="50000">
+                                        <p:cTn id="98" dur="166" decel="50000">
                                           <p:stCondLst>
                                             <p:cond delay="1834"/>
                                           </p:stCondLst>
@@ -13212,8 +13059,8 @@
       </p:par>
     </p:tnLst>
     <p:bldLst>
-      <p:bldP spid="3" grpId="0" build="p"/>
-      <p:bldP spid="4" grpId="0" build="p"/>
+      <p:bldP spid="3" grpId="0" uiExpand="1" build="p"/>
+      <p:bldP spid="4" grpId="0" uiExpand="1" build="p"/>
     </p:bldLst>
   </p:timing>
 </p:sld>
@@ -13238,25 +13085,6 @@
       </p:grpSpPr>
       <p:sp>
         <p:nvSpPr>
-          <p:cNvPr id="2" name="Content Placeholder 1"/>
-          <p:cNvSpPr>
-            <a:spLocks noGrp="1"/>
-          </p:cNvSpPr>
-          <p:nvPr>
-            <p:ph idx="1"/>
-          </p:nvPr>
-        </p:nvSpPr>
-        <p:spPr/>
-        <p:txBody>
-          <a:bodyPr/>
-          <a:lstStyle/>
-          <a:p>
-            <a:endParaRPr lang="en-US"/>
-          </a:p>
-        </p:txBody>
-      </p:sp>
-      <p:sp>
-        <p:nvSpPr>
           <p:cNvPr id="3" name="Title 2"/>
           <p:cNvSpPr>
             <a:spLocks noGrp="1"/>
@@ -13295,6 +13123,472 @@
           </a:p>
         </p:txBody>
       </p:sp>
+      <p:cxnSp>
+        <p:nvCxnSpPr>
+          <p:cNvPr id="4" name="Straight Arrow Connector 24"/>
+          <p:cNvCxnSpPr/>
+          <p:nvPr/>
+        </p:nvCxnSpPr>
+        <p:spPr>
+          <a:xfrm>
+            <a:off x="2711624" y="2564904"/>
+            <a:ext cx="1152128" cy="0"/>
+          </a:xfrm>
+          <a:prstGeom prst="straightConnector1">
+            <a:avLst/>
+          </a:prstGeom>
+          <a:ln w="57150">
+            <a:solidFill>
+              <a:schemeClr val="tx2"/>
+            </a:solidFill>
+            <a:prstDash val="sysDash"/>
+            <a:tailEnd type="triangle"/>
+          </a:ln>
+        </p:spPr>
+        <p:style>
+          <a:lnRef idx="1">
+            <a:schemeClr val="accent1"/>
+          </a:lnRef>
+          <a:fillRef idx="0">
+            <a:schemeClr val="accent1"/>
+          </a:fillRef>
+          <a:effectRef idx="0">
+            <a:schemeClr val="accent1"/>
+          </a:effectRef>
+          <a:fontRef idx="minor">
+            <a:schemeClr val="tx1"/>
+          </a:fontRef>
+        </p:style>
+      </p:cxnSp>
+      <p:grpSp>
+        <p:nvGrpSpPr>
+          <p:cNvPr id="5" name="Group 16"/>
+          <p:cNvGrpSpPr/>
+          <p:nvPr/>
+        </p:nvGrpSpPr>
+        <p:grpSpPr>
+          <a:xfrm>
+            <a:off x="531485" y="1548081"/>
+            <a:ext cx="2088232" cy="1592887"/>
+            <a:chOff x="839416" y="1620089"/>
+            <a:chExt cx="2088232" cy="1592887"/>
+          </a:xfrm>
+        </p:grpSpPr>
+        <p:sp>
+          <p:nvSpPr>
+            <p:cNvPr id="6" name="Rounded Rectangle 17"/>
+            <p:cNvSpPr/>
+            <p:nvPr/>
+          </p:nvSpPr>
+          <p:spPr>
+            <a:xfrm>
+              <a:off x="839416" y="2132856"/>
+              <a:ext cx="2088232" cy="1080120"/>
+            </a:xfrm>
+            <a:prstGeom prst="roundRect">
+              <a:avLst/>
+            </a:prstGeom>
+            <a:solidFill>
+              <a:schemeClr val="bg2">
+                <a:lumMod val="75000"/>
+              </a:schemeClr>
+            </a:solidFill>
+            <a:ln>
+              <a:noFill/>
+            </a:ln>
+          </p:spPr>
+          <p:style>
+            <a:lnRef idx="2">
+              <a:schemeClr val="accent1">
+                <a:shade val="50000"/>
+              </a:schemeClr>
+            </a:lnRef>
+            <a:fillRef idx="1">
+              <a:schemeClr val="accent1"/>
+            </a:fillRef>
+            <a:effectRef idx="0">
+              <a:schemeClr val="accent1"/>
+            </a:effectRef>
+            <a:fontRef idx="minor">
+              <a:schemeClr val="lt1"/>
+            </a:fontRef>
+          </p:style>
+          <p:txBody>
+            <a:bodyPr rtlCol="0" anchor="ctr"/>
+            <a:lstStyle/>
+            <a:p>
+              <a:pPr algn="ctr"/>
+              <a:endParaRPr lang="en-US"/>
+            </a:p>
+          </p:txBody>
+        </p:sp>
+        <p:sp>
+          <p:nvSpPr>
+            <p:cNvPr id="7" name="Rounded Rectangle 18"/>
+            <p:cNvSpPr/>
+            <p:nvPr/>
+          </p:nvSpPr>
+          <p:spPr>
+            <a:xfrm>
+              <a:off x="983432" y="2420888"/>
+              <a:ext cx="1800200" cy="576064"/>
+            </a:xfrm>
+            <a:prstGeom prst="roundRect">
+              <a:avLst/>
+            </a:prstGeom>
+            <a:ln>
+              <a:noFill/>
+            </a:ln>
+          </p:spPr>
+          <p:style>
+            <a:lnRef idx="1">
+              <a:schemeClr val="accent3"/>
+            </a:lnRef>
+            <a:fillRef idx="2">
+              <a:schemeClr val="accent3"/>
+            </a:fillRef>
+            <a:effectRef idx="1">
+              <a:schemeClr val="accent3"/>
+            </a:effectRef>
+            <a:fontRef idx="minor">
+              <a:schemeClr val="dk1"/>
+            </a:fontRef>
+          </p:style>
+          <p:txBody>
+            <a:bodyPr rtlCol="0" anchor="ctr"/>
+            <a:lstStyle/>
+            <a:p>
+              <a:pPr algn="ctr"/>
+              <a:r>
+                <a:rPr lang="en-US" sz="2800" dirty="0" smtClean="0">
+                  <a:latin typeface="Corbel" panose="020B0503020204020204" pitchFamily="34" charset="0"/>
+                </a:rPr>
+                <a:t>Dados</a:t>
+              </a:r>
+              <a:endParaRPr lang="en-US" sz="2800" dirty="0">
+                <a:latin typeface="Corbel" panose="020B0503020204020204" pitchFamily="34" charset="0"/>
+              </a:endParaRPr>
+            </a:p>
+          </p:txBody>
+        </p:sp>
+        <p:sp>
+          <p:nvSpPr>
+            <p:cNvPr id="8" name="TextBox 19"/>
+            <p:cNvSpPr txBox="1"/>
+            <p:nvPr/>
+          </p:nvSpPr>
+          <p:spPr>
+            <a:xfrm>
+              <a:off x="1098682" y="1620089"/>
+              <a:ext cx="1612942" cy="584775"/>
+            </a:xfrm>
+            <a:prstGeom prst="rect">
+              <a:avLst/>
+            </a:prstGeom>
+            <a:noFill/>
+          </p:spPr>
+          <p:txBody>
+            <a:bodyPr wrap="none" rtlCol="0">
+              <a:spAutoFit/>
+            </a:bodyPr>
+            <a:lstStyle/>
+            <a:p>
+              <a:r>
+                <a:rPr lang="en-US" sz="3200" dirty="0" smtClean="0">
+                  <a:solidFill>
+                    <a:schemeClr val="bg2">
+                      <a:lumMod val="40000"/>
+                      <a:lumOff val="60000"/>
+                    </a:schemeClr>
+                  </a:solidFill>
+                  <a:latin typeface="Corbel" panose="020B0503020204020204" pitchFamily="34" charset="0"/>
+                </a:rPr>
+                <a:t>Servidor</a:t>
+              </a:r>
+              <a:endParaRPr lang="en-US" sz="3200" dirty="0">
+                <a:solidFill>
+                  <a:schemeClr val="bg2">
+                    <a:lumMod val="40000"/>
+                    <a:lumOff val="60000"/>
+                  </a:schemeClr>
+                </a:solidFill>
+                <a:latin typeface="Corbel" panose="020B0503020204020204" pitchFamily="34" charset="0"/>
+              </a:endParaRPr>
+            </a:p>
+          </p:txBody>
+        </p:sp>
+      </p:grpSp>
+      <p:grpSp>
+        <p:nvGrpSpPr>
+          <p:cNvPr id="15" name="Grupo 14"/>
+          <p:cNvGrpSpPr/>
+          <p:nvPr/>
+        </p:nvGrpSpPr>
+        <p:grpSpPr>
+          <a:xfrm>
+            <a:off x="3959241" y="1548081"/>
+            <a:ext cx="7753383" cy="1592887"/>
+            <a:chOff x="3959241" y="1548081"/>
+            <a:chExt cx="7753383" cy="1592887"/>
+          </a:xfrm>
+        </p:grpSpPr>
+        <p:grpSp>
+          <p:nvGrpSpPr>
+            <p:cNvPr id="9" name="Group 20"/>
+            <p:cNvGrpSpPr/>
+            <p:nvPr/>
+          </p:nvGrpSpPr>
+          <p:grpSpPr>
+            <a:xfrm>
+              <a:off x="3959241" y="1548081"/>
+              <a:ext cx="7753383" cy="1592887"/>
+              <a:chOff x="4367807" y="1620089"/>
+              <a:chExt cx="7753383" cy="1592887"/>
+            </a:xfrm>
+          </p:grpSpPr>
+          <p:sp>
+            <p:nvSpPr>
+              <p:cNvPr id="10" name="Rounded Rectangle 21"/>
+              <p:cNvSpPr/>
+              <p:nvPr/>
+            </p:nvSpPr>
+            <p:spPr>
+              <a:xfrm>
+                <a:off x="4367807" y="2132856"/>
+                <a:ext cx="7753383" cy="1080120"/>
+              </a:xfrm>
+              <a:prstGeom prst="roundRect">
+                <a:avLst/>
+              </a:prstGeom>
+              <a:solidFill>
+                <a:schemeClr val="bg2">
+                  <a:lumMod val="75000"/>
+                </a:schemeClr>
+              </a:solidFill>
+              <a:ln>
+                <a:noFill/>
+              </a:ln>
+            </p:spPr>
+            <p:style>
+              <a:lnRef idx="2">
+                <a:schemeClr val="accent1">
+                  <a:shade val="50000"/>
+                </a:schemeClr>
+              </a:lnRef>
+              <a:fillRef idx="1">
+                <a:schemeClr val="accent1"/>
+              </a:fillRef>
+              <a:effectRef idx="0">
+                <a:schemeClr val="accent1"/>
+              </a:effectRef>
+              <a:fontRef idx="minor">
+                <a:schemeClr val="lt1"/>
+              </a:fontRef>
+            </p:style>
+            <p:txBody>
+              <a:bodyPr rtlCol="0" anchor="ctr"/>
+              <a:lstStyle/>
+              <a:p>
+                <a:pPr algn="ctr"/>
+                <a:endParaRPr lang="en-US"/>
+              </a:p>
+            </p:txBody>
+          </p:sp>
+          <p:sp>
+            <p:nvSpPr>
+              <p:cNvPr id="11" name="Rounded Rectangle 22"/>
+              <p:cNvSpPr/>
+              <p:nvPr/>
+            </p:nvSpPr>
+            <p:spPr>
+              <a:xfrm>
+                <a:off x="4511824" y="2420888"/>
+                <a:ext cx="2301012" cy="576064"/>
+              </a:xfrm>
+              <a:prstGeom prst="roundRect">
+                <a:avLst/>
+              </a:prstGeom>
+              <a:ln>
+                <a:noFill/>
+              </a:ln>
+            </p:spPr>
+            <p:style>
+              <a:lnRef idx="1">
+                <a:schemeClr val="accent3"/>
+              </a:lnRef>
+              <a:fillRef idx="2">
+                <a:schemeClr val="accent3"/>
+              </a:fillRef>
+              <a:effectRef idx="1">
+                <a:schemeClr val="accent3"/>
+              </a:effectRef>
+              <a:fontRef idx="minor">
+                <a:schemeClr val="dk1"/>
+              </a:fontRef>
+            </p:style>
+            <p:txBody>
+              <a:bodyPr rtlCol="0" anchor="ctr"/>
+              <a:lstStyle/>
+              <a:p>
+                <a:pPr algn="ctr"/>
+                <a:r>
+                  <a:rPr lang="en-US" sz="2800" dirty="0" smtClean="0">
+                    <a:latin typeface="Corbel" panose="020B0503020204020204" pitchFamily="34" charset="0"/>
+                  </a:rPr>
+                  <a:t>ViewModel</a:t>
+                </a:r>
+                <a:endParaRPr lang="en-US" sz="2800" dirty="0">
+                  <a:latin typeface="Corbel" panose="020B0503020204020204" pitchFamily="34" charset="0"/>
+                </a:endParaRPr>
+              </a:p>
+            </p:txBody>
+          </p:sp>
+          <p:sp>
+            <p:nvSpPr>
+              <p:cNvPr id="12" name="TextBox 23"/>
+              <p:cNvSpPr txBox="1"/>
+              <p:nvPr/>
+            </p:nvSpPr>
+            <p:spPr>
+              <a:xfrm>
+                <a:off x="4627074" y="1620089"/>
+                <a:ext cx="1435008" cy="584775"/>
+              </a:xfrm>
+              <a:prstGeom prst="rect">
+                <a:avLst/>
+              </a:prstGeom>
+              <a:noFill/>
+            </p:spPr>
+            <p:txBody>
+              <a:bodyPr wrap="none" rtlCol="0">
+                <a:spAutoFit/>
+              </a:bodyPr>
+              <a:lstStyle/>
+              <a:p>
+                <a:r>
+                  <a:rPr lang="en-US" sz="3200" dirty="0" smtClean="0">
+                    <a:solidFill>
+                      <a:schemeClr val="bg2">
+                        <a:lumMod val="40000"/>
+                        <a:lumOff val="60000"/>
+                      </a:schemeClr>
+                    </a:solidFill>
+                    <a:latin typeface="Corbel" panose="020B0503020204020204" pitchFamily="34" charset="0"/>
+                  </a:rPr>
+                  <a:t>Cliente</a:t>
+                </a:r>
+                <a:endParaRPr lang="en-US" sz="3200" dirty="0">
+                  <a:solidFill>
+                    <a:schemeClr val="bg2">
+                      <a:lumMod val="40000"/>
+                      <a:lumOff val="60000"/>
+                    </a:schemeClr>
+                  </a:solidFill>
+                  <a:latin typeface="Corbel" panose="020B0503020204020204" pitchFamily="34" charset="0"/>
+                </a:endParaRPr>
+              </a:p>
+            </p:txBody>
+          </p:sp>
+        </p:grpSp>
+        <p:sp>
+          <p:nvSpPr>
+            <p:cNvPr id="13" name="Rounded Rectangle 22"/>
+            <p:cNvSpPr/>
+            <p:nvPr/>
+          </p:nvSpPr>
+          <p:spPr>
+            <a:xfrm>
+              <a:off x="6593288" y="2348880"/>
+              <a:ext cx="2301012" cy="576064"/>
+            </a:xfrm>
+            <a:prstGeom prst="roundRect">
+              <a:avLst/>
+            </a:prstGeom>
+            <a:ln>
+              <a:noFill/>
+            </a:ln>
+          </p:spPr>
+          <p:style>
+            <a:lnRef idx="1">
+              <a:schemeClr val="accent3"/>
+            </a:lnRef>
+            <a:fillRef idx="2">
+              <a:schemeClr val="accent3"/>
+            </a:fillRef>
+            <a:effectRef idx="1">
+              <a:schemeClr val="accent3"/>
+            </a:effectRef>
+            <a:fontRef idx="minor">
+              <a:schemeClr val="dk1"/>
+            </a:fontRef>
+          </p:style>
+          <p:txBody>
+            <a:bodyPr rtlCol="0" anchor="ctr"/>
+            <a:lstStyle/>
+            <a:p>
+              <a:pPr algn="ctr"/>
+              <a:r>
+                <a:rPr lang="en-US" sz="2800" dirty="0" smtClean="0">
+                  <a:latin typeface="Corbel" panose="020B0503020204020204" pitchFamily="34" charset="0"/>
+                </a:rPr>
+                <a:t>View</a:t>
+              </a:r>
+              <a:endParaRPr lang="en-US" sz="2800" dirty="0">
+                <a:latin typeface="Corbel" panose="020B0503020204020204" pitchFamily="34" charset="0"/>
+              </a:endParaRPr>
+            </a:p>
+          </p:txBody>
+        </p:sp>
+        <p:sp>
+          <p:nvSpPr>
+            <p:cNvPr id="14" name="Rounded Rectangle 22"/>
+            <p:cNvSpPr/>
+            <p:nvPr/>
+          </p:nvSpPr>
+          <p:spPr>
+            <a:xfrm>
+              <a:off x="9083318" y="2348880"/>
+              <a:ext cx="2301012" cy="576064"/>
+            </a:xfrm>
+            <a:prstGeom prst="roundRect">
+              <a:avLst/>
+            </a:prstGeom>
+            <a:ln>
+              <a:noFill/>
+            </a:ln>
+          </p:spPr>
+          <p:style>
+            <a:lnRef idx="1">
+              <a:schemeClr val="accent3"/>
+            </a:lnRef>
+            <a:fillRef idx="2">
+              <a:schemeClr val="accent3"/>
+            </a:fillRef>
+            <a:effectRef idx="1">
+              <a:schemeClr val="accent3"/>
+            </a:effectRef>
+            <a:fontRef idx="minor">
+              <a:schemeClr val="dk1"/>
+            </a:fontRef>
+          </p:style>
+          <p:txBody>
+            <a:bodyPr rtlCol="0" anchor="ctr"/>
+            <a:lstStyle/>
+            <a:p>
+              <a:pPr algn="ctr"/>
+              <a:r>
+                <a:rPr lang="en-US" sz="2800" dirty="0" smtClean="0">
+                  <a:latin typeface="Corbel" panose="020B0503020204020204" pitchFamily="34" charset="0"/>
+                </a:rPr>
+                <a:t>DOM</a:t>
+              </a:r>
+              <a:endParaRPr lang="en-US" sz="2800" dirty="0">
+                <a:latin typeface="Corbel" panose="020B0503020204020204" pitchFamily="34" charset="0"/>
+              </a:endParaRPr>
+            </a:p>
+          </p:txBody>
+        </p:sp>
+      </p:grpSp>
     </p:spTree>
     <p:extLst>
       <p:ext uri="{BB962C8B-B14F-4D97-AF65-F5344CB8AC3E}">
@@ -13308,7 +13602,127 @@
   <p:timing>
     <p:tnLst>
       <p:par>
-        <p:cTn id="1" dur="indefinite" restart="never" nodeType="tmRoot"/>
+        <p:cTn id="1" dur="indefinite" restart="never" nodeType="tmRoot">
+          <p:childTnLst>
+            <p:seq concurrent="1" nextAc="seek">
+              <p:cTn id="2" dur="indefinite" nodeType="mainSeq">
+                <p:childTnLst>
+                  <p:par>
+                    <p:cTn id="3" fill="hold">
+                      <p:stCondLst>
+                        <p:cond delay="indefinite"/>
+                      </p:stCondLst>
+                      <p:childTnLst>
+                        <p:par>
+                          <p:cTn id="4" fill="hold">
+                            <p:stCondLst>
+                              <p:cond delay="0"/>
+                            </p:stCondLst>
+                            <p:childTnLst>
+                              <p:par>
+                                <p:cTn id="5" presetID="10" presetClass="entr" presetSubtype="0" fill="hold" nodeType="clickEffect">
+                                  <p:stCondLst>
+                                    <p:cond delay="0"/>
+                                  </p:stCondLst>
+                                  <p:childTnLst>
+                                    <p:set>
+                                      <p:cBhvr>
+                                        <p:cTn id="6" dur="1" fill="hold">
+                                          <p:stCondLst>
+                                            <p:cond delay="0"/>
+                                          </p:stCondLst>
+                                        </p:cTn>
+                                        <p:tgtEl>
+                                          <p:spTgt spid="5"/>
+                                        </p:tgtEl>
+                                        <p:attrNameLst>
+                                          <p:attrName>style.visibility</p:attrName>
+                                        </p:attrNameLst>
+                                      </p:cBhvr>
+                                      <p:to>
+                                        <p:strVal val="visible"/>
+                                      </p:to>
+                                    </p:set>
+                                    <p:animEffect transition="in" filter="fade">
+                                      <p:cBhvr>
+                                        <p:cTn id="7" dur="500"/>
+                                        <p:tgtEl>
+                                          <p:spTgt spid="5"/>
+                                        </p:tgtEl>
+                                      </p:cBhvr>
+                                    </p:animEffect>
+                                  </p:childTnLst>
+                                </p:cTn>
+                              </p:par>
+                            </p:childTnLst>
+                          </p:cTn>
+                        </p:par>
+                        <p:par>
+                          <p:cTn id="8" fill="hold">
+                            <p:stCondLst>
+                              <p:cond delay="500"/>
+                            </p:stCondLst>
+                            <p:childTnLst>
+                              <p:par>
+                                <p:cTn id="9" presetID="10" presetClass="entr" presetSubtype="0" fill="hold" nodeType="afterEffect">
+                                  <p:stCondLst>
+                                    <p:cond delay="0"/>
+                                  </p:stCondLst>
+                                  <p:childTnLst>
+                                    <p:set>
+                                      <p:cBhvr>
+                                        <p:cTn id="10" dur="1" fill="hold">
+                                          <p:stCondLst>
+                                            <p:cond delay="0"/>
+                                          </p:stCondLst>
+                                        </p:cTn>
+                                        <p:tgtEl>
+                                          <p:spTgt spid="4"/>
+                                        </p:tgtEl>
+                                        <p:attrNameLst>
+                                          <p:attrName>style.visibility</p:attrName>
+                                        </p:attrNameLst>
+                                      </p:cBhvr>
+                                      <p:to>
+                                        <p:strVal val="visible"/>
+                                      </p:to>
+                                    </p:set>
+                                    <p:animEffect transition="in" filter="fade">
+                                      <p:cBhvr>
+                                        <p:cTn id="11" dur="500"/>
+                                        <p:tgtEl>
+                                          <p:spTgt spid="4"/>
+                                        </p:tgtEl>
+                                      </p:cBhvr>
+                                    </p:animEffect>
+                                  </p:childTnLst>
+                                </p:cTn>
+                              </p:par>
+                            </p:childTnLst>
+                          </p:cTn>
+                        </p:par>
+                      </p:childTnLst>
+                    </p:cTn>
+                  </p:par>
+                </p:childTnLst>
+              </p:cTn>
+              <p:prevCondLst>
+                <p:cond evt="onPrev" delay="0">
+                  <p:tgtEl>
+                    <p:sldTgt/>
+                  </p:tgtEl>
+                </p:cond>
+              </p:prevCondLst>
+              <p:nextCondLst>
+                <p:cond evt="onNext" delay="0">
+                  <p:tgtEl>
+                    <p:sldTgt/>
+                  </p:tgtEl>
+                </p:cond>
+              </p:nextCondLst>
+            </p:seq>
+          </p:childTnLst>
+        </p:cTn>
       </p:par>
     </p:tnLst>
   </p:timing>
@@ -13355,6 +13769,472 @@
           </a:p>
         </p:txBody>
       </p:sp>
+      <p:cxnSp>
+        <p:nvCxnSpPr>
+          <p:cNvPr id="12" name="Straight Arrow Connector 24"/>
+          <p:cNvCxnSpPr/>
+          <p:nvPr/>
+        </p:nvCxnSpPr>
+        <p:spPr>
+          <a:xfrm>
+            <a:off x="2711624" y="5877272"/>
+            <a:ext cx="1152128" cy="0"/>
+          </a:xfrm>
+          <a:prstGeom prst="straightConnector1">
+            <a:avLst/>
+          </a:prstGeom>
+          <a:ln w="57150">
+            <a:solidFill>
+              <a:schemeClr val="tx2"/>
+            </a:solidFill>
+            <a:prstDash val="sysDash"/>
+            <a:tailEnd type="triangle"/>
+          </a:ln>
+        </p:spPr>
+        <p:style>
+          <a:lnRef idx="1">
+            <a:schemeClr val="accent1"/>
+          </a:lnRef>
+          <a:fillRef idx="0">
+            <a:schemeClr val="accent1"/>
+          </a:fillRef>
+          <a:effectRef idx="0">
+            <a:schemeClr val="accent1"/>
+          </a:effectRef>
+          <a:fontRef idx="minor">
+            <a:schemeClr val="tx1"/>
+          </a:fontRef>
+        </p:style>
+      </p:cxnSp>
+      <p:grpSp>
+        <p:nvGrpSpPr>
+          <p:cNvPr id="13" name="Group 16"/>
+          <p:cNvGrpSpPr/>
+          <p:nvPr/>
+        </p:nvGrpSpPr>
+        <p:grpSpPr>
+          <a:xfrm>
+            <a:off x="531485" y="4860449"/>
+            <a:ext cx="2088232" cy="1592887"/>
+            <a:chOff x="839416" y="1620089"/>
+            <a:chExt cx="2088232" cy="1592887"/>
+          </a:xfrm>
+        </p:grpSpPr>
+        <p:sp>
+          <p:nvSpPr>
+            <p:cNvPr id="14" name="Rounded Rectangle 17"/>
+            <p:cNvSpPr/>
+            <p:nvPr/>
+          </p:nvSpPr>
+          <p:spPr>
+            <a:xfrm>
+              <a:off x="839416" y="2132856"/>
+              <a:ext cx="2088232" cy="1080120"/>
+            </a:xfrm>
+            <a:prstGeom prst="roundRect">
+              <a:avLst/>
+            </a:prstGeom>
+            <a:solidFill>
+              <a:schemeClr val="bg2">
+                <a:lumMod val="75000"/>
+              </a:schemeClr>
+            </a:solidFill>
+            <a:ln>
+              <a:noFill/>
+            </a:ln>
+          </p:spPr>
+          <p:style>
+            <a:lnRef idx="2">
+              <a:schemeClr val="accent1">
+                <a:shade val="50000"/>
+              </a:schemeClr>
+            </a:lnRef>
+            <a:fillRef idx="1">
+              <a:schemeClr val="accent1"/>
+            </a:fillRef>
+            <a:effectRef idx="0">
+              <a:schemeClr val="accent1"/>
+            </a:effectRef>
+            <a:fontRef idx="minor">
+              <a:schemeClr val="lt1"/>
+            </a:fontRef>
+          </p:style>
+          <p:txBody>
+            <a:bodyPr rtlCol="0" anchor="ctr"/>
+            <a:lstStyle/>
+            <a:p>
+              <a:pPr algn="ctr"/>
+              <a:endParaRPr lang="en-US"/>
+            </a:p>
+          </p:txBody>
+        </p:sp>
+        <p:sp>
+          <p:nvSpPr>
+            <p:cNvPr id="15" name="Rounded Rectangle 18"/>
+            <p:cNvSpPr/>
+            <p:nvPr/>
+          </p:nvSpPr>
+          <p:spPr>
+            <a:xfrm>
+              <a:off x="983432" y="2420888"/>
+              <a:ext cx="1800200" cy="576064"/>
+            </a:xfrm>
+            <a:prstGeom prst="roundRect">
+              <a:avLst/>
+            </a:prstGeom>
+            <a:ln>
+              <a:noFill/>
+            </a:ln>
+          </p:spPr>
+          <p:style>
+            <a:lnRef idx="1">
+              <a:schemeClr val="accent3"/>
+            </a:lnRef>
+            <a:fillRef idx="2">
+              <a:schemeClr val="accent3"/>
+            </a:fillRef>
+            <a:effectRef idx="1">
+              <a:schemeClr val="accent3"/>
+            </a:effectRef>
+            <a:fontRef idx="minor">
+              <a:schemeClr val="dk1"/>
+            </a:fontRef>
+          </p:style>
+          <p:txBody>
+            <a:bodyPr rtlCol="0" anchor="ctr"/>
+            <a:lstStyle/>
+            <a:p>
+              <a:pPr algn="ctr"/>
+              <a:r>
+                <a:rPr lang="en-US" sz="2800" dirty="0" smtClean="0">
+                  <a:latin typeface="Corbel" panose="020B0503020204020204" pitchFamily="34" charset="0"/>
+                </a:rPr>
+                <a:t>Dados</a:t>
+              </a:r>
+              <a:endParaRPr lang="en-US" sz="2800" dirty="0">
+                <a:latin typeface="Corbel" panose="020B0503020204020204" pitchFamily="34" charset="0"/>
+              </a:endParaRPr>
+            </a:p>
+          </p:txBody>
+        </p:sp>
+        <p:sp>
+          <p:nvSpPr>
+            <p:cNvPr id="16" name="TextBox 19"/>
+            <p:cNvSpPr txBox="1"/>
+            <p:nvPr/>
+          </p:nvSpPr>
+          <p:spPr>
+            <a:xfrm>
+              <a:off x="1098682" y="1620089"/>
+              <a:ext cx="1612942" cy="584775"/>
+            </a:xfrm>
+            <a:prstGeom prst="rect">
+              <a:avLst/>
+            </a:prstGeom>
+            <a:noFill/>
+          </p:spPr>
+          <p:txBody>
+            <a:bodyPr wrap="none" rtlCol="0">
+              <a:spAutoFit/>
+            </a:bodyPr>
+            <a:lstStyle/>
+            <a:p>
+              <a:r>
+                <a:rPr lang="en-US" sz="3200" dirty="0" smtClean="0">
+                  <a:solidFill>
+                    <a:schemeClr val="bg2">
+                      <a:lumMod val="40000"/>
+                      <a:lumOff val="60000"/>
+                    </a:schemeClr>
+                  </a:solidFill>
+                  <a:latin typeface="Corbel" panose="020B0503020204020204" pitchFamily="34" charset="0"/>
+                </a:rPr>
+                <a:t>Servidor</a:t>
+              </a:r>
+              <a:endParaRPr lang="en-US" sz="3200" dirty="0">
+                <a:solidFill>
+                  <a:schemeClr val="bg2">
+                    <a:lumMod val="40000"/>
+                    <a:lumOff val="60000"/>
+                  </a:schemeClr>
+                </a:solidFill>
+                <a:latin typeface="Corbel" panose="020B0503020204020204" pitchFamily="34" charset="0"/>
+              </a:endParaRPr>
+            </a:p>
+          </p:txBody>
+        </p:sp>
+      </p:grpSp>
+      <p:grpSp>
+        <p:nvGrpSpPr>
+          <p:cNvPr id="21" name="Grupo 20"/>
+          <p:cNvGrpSpPr/>
+          <p:nvPr/>
+        </p:nvGrpSpPr>
+        <p:grpSpPr>
+          <a:xfrm>
+            <a:off x="3959241" y="4860449"/>
+            <a:ext cx="7753383" cy="1592887"/>
+            <a:chOff x="3959241" y="1548081"/>
+            <a:chExt cx="7753383" cy="1592887"/>
+          </a:xfrm>
+        </p:grpSpPr>
+        <p:grpSp>
+          <p:nvGrpSpPr>
+            <p:cNvPr id="22" name="Group 20"/>
+            <p:cNvGrpSpPr/>
+            <p:nvPr/>
+          </p:nvGrpSpPr>
+          <p:grpSpPr>
+            <a:xfrm>
+              <a:off x="3959241" y="1548081"/>
+              <a:ext cx="7753383" cy="1592887"/>
+              <a:chOff x="4367807" y="1620089"/>
+              <a:chExt cx="7753383" cy="1592887"/>
+            </a:xfrm>
+          </p:grpSpPr>
+          <p:sp>
+            <p:nvSpPr>
+              <p:cNvPr id="25" name="Rounded Rectangle 21"/>
+              <p:cNvSpPr/>
+              <p:nvPr/>
+            </p:nvSpPr>
+            <p:spPr>
+              <a:xfrm>
+                <a:off x="4367807" y="2132856"/>
+                <a:ext cx="7753383" cy="1080120"/>
+              </a:xfrm>
+              <a:prstGeom prst="roundRect">
+                <a:avLst/>
+              </a:prstGeom>
+              <a:solidFill>
+                <a:schemeClr val="bg2">
+                  <a:lumMod val="75000"/>
+                </a:schemeClr>
+              </a:solidFill>
+              <a:ln>
+                <a:noFill/>
+              </a:ln>
+            </p:spPr>
+            <p:style>
+              <a:lnRef idx="2">
+                <a:schemeClr val="accent1">
+                  <a:shade val="50000"/>
+                </a:schemeClr>
+              </a:lnRef>
+              <a:fillRef idx="1">
+                <a:schemeClr val="accent1"/>
+              </a:fillRef>
+              <a:effectRef idx="0">
+                <a:schemeClr val="accent1"/>
+              </a:effectRef>
+              <a:fontRef idx="minor">
+                <a:schemeClr val="lt1"/>
+              </a:fontRef>
+            </p:style>
+            <p:txBody>
+              <a:bodyPr rtlCol="0" anchor="ctr"/>
+              <a:lstStyle/>
+              <a:p>
+                <a:pPr algn="ctr"/>
+                <a:endParaRPr lang="en-US"/>
+              </a:p>
+            </p:txBody>
+          </p:sp>
+          <p:sp>
+            <p:nvSpPr>
+              <p:cNvPr id="26" name="Rounded Rectangle 22"/>
+              <p:cNvSpPr/>
+              <p:nvPr/>
+            </p:nvSpPr>
+            <p:spPr>
+              <a:xfrm>
+                <a:off x="4511824" y="2420888"/>
+                <a:ext cx="2301012" cy="576064"/>
+              </a:xfrm>
+              <a:prstGeom prst="roundRect">
+                <a:avLst/>
+              </a:prstGeom>
+              <a:ln>
+                <a:noFill/>
+              </a:ln>
+            </p:spPr>
+            <p:style>
+              <a:lnRef idx="1">
+                <a:schemeClr val="accent3"/>
+              </a:lnRef>
+              <a:fillRef idx="2">
+                <a:schemeClr val="accent3"/>
+              </a:fillRef>
+              <a:effectRef idx="1">
+                <a:schemeClr val="accent3"/>
+              </a:effectRef>
+              <a:fontRef idx="minor">
+                <a:schemeClr val="dk1"/>
+              </a:fontRef>
+            </p:style>
+            <p:txBody>
+              <a:bodyPr rtlCol="0" anchor="ctr"/>
+              <a:lstStyle/>
+              <a:p>
+                <a:pPr algn="ctr"/>
+                <a:r>
+                  <a:rPr lang="en-US" sz="2800" dirty="0" smtClean="0">
+                    <a:latin typeface="Corbel" panose="020B0503020204020204" pitchFamily="34" charset="0"/>
+                  </a:rPr>
+                  <a:t>ViewModel</a:t>
+                </a:r>
+                <a:endParaRPr lang="en-US" sz="2800" dirty="0">
+                  <a:latin typeface="Corbel" panose="020B0503020204020204" pitchFamily="34" charset="0"/>
+                </a:endParaRPr>
+              </a:p>
+            </p:txBody>
+          </p:sp>
+          <p:sp>
+            <p:nvSpPr>
+              <p:cNvPr id="27" name="TextBox 23"/>
+              <p:cNvSpPr txBox="1"/>
+              <p:nvPr/>
+            </p:nvSpPr>
+            <p:spPr>
+              <a:xfrm>
+                <a:off x="4627074" y="1620089"/>
+                <a:ext cx="1435008" cy="584775"/>
+              </a:xfrm>
+              <a:prstGeom prst="rect">
+                <a:avLst/>
+              </a:prstGeom>
+              <a:noFill/>
+            </p:spPr>
+            <p:txBody>
+              <a:bodyPr wrap="none" rtlCol="0">
+                <a:spAutoFit/>
+              </a:bodyPr>
+              <a:lstStyle/>
+              <a:p>
+                <a:r>
+                  <a:rPr lang="en-US" sz="3200" dirty="0" smtClean="0">
+                    <a:solidFill>
+                      <a:schemeClr val="bg2">
+                        <a:lumMod val="40000"/>
+                        <a:lumOff val="60000"/>
+                      </a:schemeClr>
+                    </a:solidFill>
+                    <a:latin typeface="Corbel" panose="020B0503020204020204" pitchFamily="34" charset="0"/>
+                  </a:rPr>
+                  <a:t>Cliente</a:t>
+                </a:r>
+                <a:endParaRPr lang="en-US" sz="3200" dirty="0">
+                  <a:solidFill>
+                    <a:schemeClr val="bg2">
+                      <a:lumMod val="40000"/>
+                      <a:lumOff val="60000"/>
+                    </a:schemeClr>
+                  </a:solidFill>
+                  <a:latin typeface="Corbel" panose="020B0503020204020204" pitchFamily="34" charset="0"/>
+                </a:endParaRPr>
+              </a:p>
+            </p:txBody>
+          </p:sp>
+        </p:grpSp>
+        <p:sp>
+          <p:nvSpPr>
+            <p:cNvPr id="23" name="Rounded Rectangle 22"/>
+            <p:cNvSpPr/>
+            <p:nvPr/>
+          </p:nvSpPr>
+          <p:spPr>
+            <a:xfrm>
+              <a:off x="6593288" y="2348880"/>
+              <a:ext cx="2301012" cy="576064"/>
+            </a:xfrm>
+            <a:prstGeom prst="roundRect">
+              <a:avLst/>
+            </a:prstGeom>
+            <a:ln>
+              <a:noFill/>
+            </a:ln>
+          </p:spPr>
+          <p:style>
+            <a:lnRef idx="1">
+              <a:schemeClr val="accent3"/>
+            </a:lnRef>
+            <a:fillRef idx="2">
+              <a:schemeClr val="accent3"/>
+            </a:fillRef>
+            <a:effectRef idx="1">
+              <a:schemeClr val="accent3"/>
+            </a:effectRef>
+            <a:fontRef idx="minor">
+              <a:schemeClr val="dk1"/>
+            </a:fontRef>
+          </p:style>
+          <p:txBody>
+            <a:bodyPr rtlCol="0" anchor="ctr"/>
+            <a:lstStyle/>
+            <a:p>
+              <a:pPr algn="ctr"/>
+              <a:r>
+                <a:rPr lang="en-US" sz="2800" dirty="0" smtClean="0">
+                  <a:latin typeface="Corbel" panose="020B0503020204020204" pitchFamily="34" charset="0"/>
+                </a:rPr>
+                <a:t>View</a:t>
+              </a:r>
+              <a:endParaRPr lang="en-US" sz="2800" dirty="0">
+                <a:latin typeface="Corbel" panose="020B0503020204020204" pitchFamily="34" charset="0"/>
+              </a:endParaRPr>
+            </a:p>
+          </p:txBody>
+        </p:sp>
+        <p:sp>
+          <p:nvSpPr>
+            <p:cNvPr id="24" name="Rounded Rectangle 22"/>
+            <p:cNvSpPr/>
+            <p:nvPr/>
+          </p:nvSpPr>
+          <p:spPr>
+            <a:xfrm>
+              <a:off x="9083318" y="2348880"/>
+              <a:ext cx="2301012" cy="576064"/>
+            </a:xfrm>
+            <a:prstGeom prst="roundRect">
+              <a:avLst/>
+            </a:prstGeom>
+            <a:ln>
+              <a:noFill/>
+            </a:ln>
+          </p:spPr>
+          <p:style>
+            <a:lnRef idx="1">
+              <a:schemeClr val="accent3"/>
+            </a:lnRef>
+            <a:fillRef idx="2">
+              <a:schemeClr val="accent3"/>
+            </a:fillRef>
+            <a:effectRef idx="1">
+              <a:schemeClr val="accent3"/>
+            </a:effectRef>
+            <a:fontRef idx="minor">
+              <a:schemeClr val="dk1"/>
+            </a:fontRef>
+          </p:style>
+          <p:txBody>
+            <a:bodyPr rtlCol="0" anchor="ctr"/>
+            <a:lstStyle/>
+            <a:p>
+              <a:pPr algn="ctr"/>
+              <a:r>
+                <a:rPr lang="en-US" sz="2800" dirty="0" smtClean="0">
+                  <a:latin typeface="Corbel" panose="020B0503020204020204" pitchFamily="34" charset="0"/>
+                </a:rPr>
+                <a:t>DOM</a:t>
+              </a:r>
+              <a:endParaRPr lang="en-US" sz="2800" dirty="0">
+                <a:latin typeface="Corbel" panose="020B0503020204020204" pitchFamily="34" charset="0"/>
+              </a:endParaRPr>
+            </a:p>
+          </p:txBody>
+        </p:sp>
+      </p:grpSp>
     </p:spTree>
     <p:extLst>
       <p:ext uri="{BB962C8B-B14F-4D97-AF65-F5344CB8AC3E}">
@@ -13368,7 +14248,127 @@
   <p:timing>
     <p:tnLst>
       <p:par>
-        <p:cTn id="1" dur="indefinite" restart="never" nodeType="tmRoot"/>
+        <p:cTn id="1" dur="indefinite" restart="never" nodeType="tmRoot">
+          <p:childTnLst>
+            <p:seq concurrent="1" nextAc="seek">
+              <p:cTn id="2" dur="indefinite" nodeType="mainSeq">
+                <p:childTnLst>
+                  <p:par>
+                    <p:cTn id="3" fill="hold">
+                      <p:stCondLst>
+                        <p:cond delay="indefinite"/>
+                      </p:stCondLst>
+                      <p:childTnLst>
+                        <p:par>
+                          <p:cTn id="4" fill="hold">
+                            <p:stCondLst>
+                              <p:cond delay="0"/>
+                            </p:stCondLst>
+                            <p:childTnLst>
+                              <p:par>
+                                <p:cTn id="5" presetID="10" presetClass="entr" presetSubtype="0" fill="hold" nodeType="clickEffect">
+                                  <p:stCondLst>
+                                    <p:cond delay="0"/>
+                                  </p:stCondLst>
+                                  <p:childTnLst>
+                                    <p:set>
+                                      <p:cBhvr>
+                                        <p:cTn id="6" dur="1" fill="hold">
+                                          <p:stCondLst>
+                                            <p:cond delay="0"/>
+                                          </p:stCondLst>
+                                        </p:cTn>
+                                        <p:tgtEl>
+                                          <p:spTgt spid="13"/>
+                                        </p:tgtEl>
+                                        <p:attrNameLst>
+                                          <p:attrName>style.visibility</p:attrName>
+                                        </p:attrNameLst>
+                                      </p:cBhvr>
+                                      <p:to>
+                                        <p:strVal val="visible"/>
+                                      </p:to>
+                                    </p:set>
+                                    <p:animEffect transition="in" filter="fade">
+                                      <p:cBhvr>
+                                        <p:cTn id="7" dur="500"/>
+                                        <p:tgtEl>
+                                          <p:spTgt spid="13"/>
+                                        </p:tgtEl>
+                                      </p:cBhvr>
+                                    </p:animEffect>
+                                  </p:childTnLst>
+                                </p:cTn>
+                              </p:par>
+                            </p:childTnLst>
+                          </p:cTn>
+                        </p:par>
+                        <p:par>
+                          <p:cTn id="8" fill="hold">
+                            <p:stCondLst>
+                              <p:cond delay="500"/>
+                            </p:stCondLst>
+                            <p:childTnLst>
+                              <p:par>
+                                <p:cTn id="9" presetID="10" presetClass="entr" presetSubtype="0" fill="hold" nodeType="afterEffect">
+                                  <p:stCondLst>
+                                    <p:cond delay="0"/>
+                                  </p:stCondLst>
+                                  <p:childTnLst>
+                                    <p:set>
+                                      <p:cBhvr>
+                                        <p:cTn id="10" dur="1" fill="hold">
+                                          <p:stCondLst>
+                                            <p:cond delay="0"/>
+                                          </p:stCondLst>
+                                        </p:cTn>
+                                        <p:tgtEl>
+                                          <p:spTgt spid="12"/>
+                                        </p:tgtEl>
+                                        <p:attrNameLst>
+                                          <p:attrName>style.visibility</p:attrName>
+                                        </p:attrNameLst>
+                                      </p:cBhvr>
+                                      <p:to>
+                                        <p:strVal val="visible"/>
+                                      </p:to>
+                                    </p:set>
+                                    <p:animEffect transition="in" filter="fade">
+                                      <p:cBhvr>
+                                        <p:cTn id="11" dur="500"/>
+                                        <p:tgtEl>
+                                          <p:spTgt spid="12"/>
+                                        </p:tgtEl>
+                                      </p:cBhvr>
+                                    </p:animEffect>
+                                  </p:childTnLst>
+                                </p:cTn>
+                              </p:par>
+                            </p:childTnLst>
+                          </p:cTn>
+                        </p:par>
+                      </p:childTnLst>
+                    </p:cTn>
+                  </p:par>
+                </p:childTnLst>
+              </p:cTn>
+              <p:prevCondLst>
+                <p:cond evt="onPrev" delay="0">
+                  <p:tgtEl>
+                    <p:sldTgt/>
+                  </p:tgtEl>
+                </p:cond>
+              </p:prevCondLst>
+              <p:nextCondLst>
+                <p:cond evt="onNext" delay="0">
+                  <p:tgtEl>
+                    <p:sldTgt/>
+                  </p:tgtEl>
+                </p:cond>
+              </p:nextCondLst>
+            </p:seq>
+          </p:childTnLst>
+        </p:cTn>
       </p:par>
     </p:tnLst>
   </p:timing>
@@ -13917,30 +14917,21 @@
                             </p:childTnLst>
                           </p:cTn>
                         </p:par>
-                      </p:childTnLst>
-                    </p:cTn>
-                  </p:par>
-                  <p:par>
-                    <p:cTn id="8" fill="hold">
-                      <p:stCondLst>
-                        <p:cond delay="indefinite"/>
-                      </p:stCondLst>
-                      <p:childTnLst>
                         <p:par>
-                          <p:cTn id="9" fill="hold">
+                          <p:cTn id="8" fill="hold">
                             <p:stCondLst>
-                              <p:cond delay="0"/>
+                              <p:cond delay="500"/>
                             </p:stCondLst>
                             <p:childTnLst>
                               <p:par>
-                                <p:cTn id="10" presetID="10" presetClass="entr" presetSubtype="0" fill="hold" grpId="0" nodeType="clickEffect">
+                                <p:cTn id="9" presetID="10" presetClass="entr" presetSubtype="0" fill="hold" grpId="0" nodeType="afterEffect">
                                   <p:stCondLst>
                                     <p:cond delay="0"/>
                                   </p:stCondLst>
                                   <p:childTnLst>
                                     <p:set>
                                       <p:cBhvr>
-                                        <p:cTn id="11" dur="1" fill="hold">
+                                        <p:cTn id="10" dur="1" fill="hold">
                                           <p:stCondLst>
                                             <p:cond delay="0"/>
                                           </p:stCondLst>
@@ -13962,7 +14953,7 @@
                                     </p:set>
                                     <p:animEffect transition="in" filter="fade">
                                       <p:cBhvr>
-                                        <p:cTn id="12" dur="500"/>
+                                        <p:cTn id="11" dur="500"/>
                                         <p:tgtEl>
                                           <p:spTgt spid="2">
                                             <p:txEl>
@@ -13978,30 +14969,21 @@
                             </p:childTnLst>
                           </p:cTn>
                         </p:par>
-                      </p:childTnLst>
-                    </p:cTn>
-                  </p:par>
-                  <p:par>
-                    <p:cTn id="13" fill="hold">
-                      <p:stCondLst>
-                        <p:cond delay="indefinite"/>
-                      </p:stCondLst>
-                      <p:childTnLst>
                         <p:par>
-                          <p:cTn id="14" fill="hold">
+                          <p:cTn id="12" fill="hold">
                             <p:stCondLst>
-                              <p:cond delay="0"/>
+                              <p:cond delay="1000"/>
                             </p:stCondLst>
                             <p:childTnLst>
                               <p:par>
-                                <p:cTn id="15" presetID="10" presetClass="entr" presetSubtype="0" fill="hold" grpId="0" nodeType="clickEffect">
+                                <p:cTn id="13" presetID="10" presetClass="entr" presetSubtype="0" fill="hold" grpId="0" nodeType="afterEffect">
                                   <p:stCondLst>
                                     <p:cond delay="0"/>
                                   </p:stCondLst>
                                   <p:childTnLst>
                                     <p:set>
                                       <p:cBhvr>
-                                        <p:cTn id="16" dur="1" fill="hold">
+                                        <p:cTn id="14" dur="1" fill="hold">
                                           <p:stCondLst>
                                             <p:cond delay="0"/>
                                           </p:stCondLst>
@@ -14023,7 +15005,7 @@
                                     </p:set>
                                     <p:animEffect transition="in" filter="fade">
                                       <p:cBhvr>
-                                        <p:cTn id="17" dur="500"/>
+                                        <p:cTn id="15" dur="500"/>
                                         <p:tgtEl>
                                           <p:spTgt spid="2">
                                             <p:txEl>
@@ -14064,7 +15046,7 @@
       </p:par>
     </p:tnLst>
     <p:bldLst>
-      <p:bldP spid="2" grpId="0" build="p"/>
+      <p:bldP spid="2" grpId="0" uiExpand="1" build="p"/>
     </p:bldLst>
   </p:timing>
 </p:sld>
@@ -16252,30 +17234,21 @@
                             </p:childTnLst>
                           </p:cTn>
                         </p:par>
-                      </p:childTnLst>
-                    </p:cTn>
-                  </p:par>
-                  <p:par>
-                    <p:cTn id="8" fill="hold">
-                      <p:stCondLst>
-                        <p:cond delay="indefinite"/>
-                      </p:stCondLst>
-                      <p:childTnLst>
                         <p:par>
-                          <p:cTn id="9" fill="hold">
+                          <p:cTn id="8" fill="hold">
                             <p:stCondLst>
-                              <p:cond delay="0"/>
+                              <p:cond delay="500"/>
                             </p:stCondLst>
                             <p:childTnLst>
                               <p:par>
-                                <p:cTn id="10" presetID="10" presetClass="entr" presetSubtype="0" fill="hold" grpId="0" nodeType="clickEffect">
+                                <p:cTn id="9" presetID="10" presetClass="entr" presetSubtype="0" fill="hold" grpId="0" nodeType="afterEffect">
                                   <p:stCondLst>
                                     <p:cond delay="0"/>
                                   </p:stCondLst>
                                   <p:childTnLst>
                                     <p:set>
                                       <p:cBhvr>
-                                        <p:cTn id="11" dur="1" fill="hold">
+                                        <p:cTn id="10" dur="1" fill="hold">
                                           <p:stCondLst>
                                             <p:cond delay="0"/>
                                           </p:stCondLst>
@@ -16297,7 +17270,7 @@
                                     </p:set>
                                     <p:animEffect transition="in" filter="fade">
                                       <p:cBhvr>
-                                        <p:cTn id="12" dur="500"/>
+                                        <p:cTn id="11" dur="500"/>
                                         <p:tgtEl>
                                           <p:spTgt spid="2">
                                             <p:txEl>
@@ -16338,7 +17311,7 @@
       </p:par>
     </p:tnLst>
     <p:bldLst>
-      <p:bldP spid="2" grpId="0" build="p"/>
+      <p:bldP spid="2" grpId="0" uiExpand="1" build="p"/>
     </p:bldLst>
   </p:timing>
 </p:sld>
@@ -18674,9 +19647,204 @@
   <p:timing>
     <p:tnLst>
       <p:par>
-        <p:cTn id="1" dur="indefinite" restart="never" nodeType="tmRoot"/>
+        <p:cTn id="1" dur="indefinite" restart="never" nodeType="tmRoot">
+          <p:childTnLst>
+            <p:seq concurrent="1" nextAc="seek">
+              <p:cTn id="2" dur="indefinite" nodeType="mainSeq">
+                <p:childTnLst>
+                  <p:par>
+                    <p:cTn id="3" fill="hold">
+                      <p:stCondLst>
+                        <p:cond delay="indefinite"/>
+                      </p:stCondLst>
+                      <p:childTnLst>
+                        <p:par>
+                          <p:cTn id="4" fill="hold">
+                            <p:stCondLst>
+                              <p:cond delay="0"/>
+                            </p:stCondLst>
+                            <p:childTnLst>
+                              <p:par>
+                                <p:cTn id="5" presetID="1" presetClass="entr" presetSubtype="0" fill="hold" grpId="0" nodeType="clickEffect">
+                                  <p:stCondLst>
+                                    <p:cond delay="0"/>
+                                  </p:stCondLst>
+                                  <p:childTnLst>
+                                    <p:set>
+                                      <p:cBhvr>
+                                        <p:cTn id="6" dur="1" fill="hold">
+                                          <p:stCondLst>
+                                            <p:cond delay="0"/>
+                                          </p:stCondLst>
+                                        </p:cTn>
+                                        <p:tgtEl>
+                                          <p:spTgt spid="2">
+                                            <p:txEl>
+                                              <p:pRg st="0" end="0"/>
+                                            </p:txEl>
+                                          </p:spTgt>
+                                        </p:tgtEl>
+                                        <p:attrNameLst>
+                                          <p:attrName>style.visibility</p:attrName>
+                                        </p:attrNameLst>
+                                      </p:cBhvr>
+                                      <p:to>
+                                        <p:strVal val="visible"/>
+                                      </p:to>
+                                    </p:set>
+                                  </p:childTnLst>
+                                </p:cTn>
+                              </p:par>
+                            </p:childTnLst>
+                          </p:cTn>
+                        </p:par>
+                        <p:par>
+                          <p:cTn id="7" fill="hold">
+                            <p:stCondLst>
+                              <p:cond delay="0"/>
+                            </p:stCondLst>
+                            <p:childTnLst>
+                              <p:par>
+                                <p:cTn id="8" presetID="1" presetClass="entr" presetSubtype="0" fill="hold" grpId="0" nodeType="afterEffect">
+                                  <p:stCondLst>
+                                    <p:cond delay="0"/>
+                                  </p:stCondLst>
+                                  <p:childTnLst>
+                                    <p:set>
+                                      <p:cBhvr>
+                                        <p:cTn id="9" dur="1" fill="hold">
+                                          <p:stCondLst>
+                                            <p:cond delay="0"/>
+                                          </p:stCondLst>
+                                        </p:cTn>
+                                        <p:tgtEl>
+                                          <p:spTgt spid="2">
+                                            <p:txEl>
+                                              <p:pRg st="1" end="1"/>
+                                            </p:txEl>
+                                          </p:spTgt>
+                                        </p:tgtEl>
+                                        <p:attrNameLst>
+                                          <p:attrName>style.visibility</p:attrName>
+                                        </p:attrNameLst>
+                                      </p:cBhvr>
+                                      <p:to>
+                                        <p:strVal val="visible"/>
+                                      </p:to>
+                                    </p:set>
+                                  </p:childTnLst>
+                                </p:cTn>
+                              </p:par>
+                            </p:childTnLst>
+                          </p:cTn>
+                        </p:par>
+                        <p:par>
+                          <p:cTn id="10" fill="hold">
+                            <p:stCondLst>
+                              <p:cond delay="0"/>
+                            </p:stCondLst>
+                            <p:childTnLst>
+                              <p:par>
+                                <p:cTn id="11" presetID="1" presetClass="entr" presetSubtype="0" fill="hold" grpId="0" nodeType="afterEffect">
+                                  <p:stCondLst>
+                                    <p:cond delay="0"/>
+                                  </p:stCondLst>
+                                  <p:childTnLst>
+                                    <p:set>
+                                      <p:cBhvr>
+                                        <p:cTn id="12" dur="1" fill="hold">
+                                          <p:stCondLst>
+                                            <p:cond delay="0"/>
+                                          </p:stCondLst>
+                                        </p:cTn>
+                                        <p:tgtEl>
+                                          <p:spTgt spid="2">
+                                            <p:txEl>
+                                              <p:pRg st="2" end="2"/>
+                                            </p:txEl>
+                                          </p:spTgt>
+                                        </p:tgtEl>
+                                        <p:attrNameLst>
+                                          <p:attrName>style.visibility</p:attrName>
+                                        </p:attrNameLst>
+                                      </p:cBhvr>
+                                      <p:to>
+                                        <p:strVal val="visible"/>
+                                      </p:to>
+                                    </p:set>
+                                  </p:childTnLst>
+                                </p:cTn>
+                              </p:par>
+                            </p:childTnLst>
+                          </p:cTn>
+                        </p:par>
+                        <p:par>
+                          <p:cTn id="13" fill="hold">
+                            <p:stCondLst>
+                              <p:cond delay="0"/>
+                            </p:stCondLst>
+                            <p:childTnLst>
+                              <p:par>
+                                <p:cTn id="14" presetID="1" presetClass="entr" presetSubtype="0" fill="hold" grpId="0" nodeType="afterEffect">
+                                  <p:stCondLst>
+                                    <p:cond delay="0"/>
+                                  </p:stCondLst>
+                                  <p:childTnLst>
+                                    <p:set>
+                                      <p:cBhvr>
+                                        <p:cTn id="15" dur="1" fill="hold">
+                                          <p:stCondLst>
+                                            <p:cond delay="0"/>
+                                          </p:stCondLst>
+                                        </p:cTn>
+                                        <p:tgtEl>
+                                          <p:spTgt spid="2">
+                                            <p:txEl>
+                                              <p:pRg st="3" end="3"/>
+                                            </p:txEl>
+                                          </p:spTgt>
+                                        </p:tgtEl>
+                                        <p:attrNameLst>
+                                          <p:attrName>style.visibility</p:attrName>
+                                        </p:attrNameLst>
+                                      </p:cBhvr>
+                                      <p:to>
+                                        <p:strVal val="visible"/>
+                                      </p:to>
+                                    </p:set>
+                                  </p:childTnLst>
+                                </p:cTn>
+                              </p:par>
+                            </p:childTnLst>
+                          </p:cTn>
+                        </p:par>
+                      </p:childTnLst>
+                    </p:cTn>
+                  </p:par>
+                </p:childTnLst>
+              </p:cTn>
+              <p:prevCondLst>
+                <p:cond evt="onPrev" delay="0">
+                  <p:tgtEl>
+                    <p:sldTgt/>
+                  </p:tgtEl>
+                </p:cond>
+              </p:prevCondLst>
+              <p:nextCondLst>
+                <p:cond evt="onNext" delay="0">
+                  <p:tgtEl>
+                    <p:sldTgt/>
+                  </p:tgtEl>
+                </p:cond>
+              </p:nextCondLst>
+            </p:seq>
+          </p:childTnLst>
+        </p:cTn>
       </p:par>
     </p:tnLst>
+    <p:bldLst>
+      <p:bldP spid="2" grpId="0" uiExpand="1" build="p"/>
+    </p:bldLst>
   </p:timing>
 </p:sld>
 </file>
@@ -19378,30 +20546,21 @@
                             </p:childTnLst>
                           </p:cTn>
                         </p:par>
-                      </p:childTnLst>
-                    </p:cTn>
-                  </p:par>
-                  <p:par>
-                    <p:cTn id="12" fill="hold">
-                      <p:stCondLst>
-                        <p:cond delay="indefinite"/>
-                      </p:stCondLst>
-                      <p:childTnLst>
                         <p:par>
-                          <p:cTn id="13" fill="hold">
+                          <p:cTn id="12" fill="hold">
                             <p:stCondLst>
                               <p:cond delay="0"/>
                             </p:stCondLst>
                             <p:childTnLst>
                               <p:par>
-                                <p:cTn id="14" presetID="1" presetClass="entr" presetSubtype="0" fill="hold" grpId="0" nodeType="clickEffect">
+                                <p:cTn id="13" presetID="1" presetClass="entr" presetSubtype="0" fill="hold" grpId="0" nodeType="afterEffect">
                                   <p:stCondLst>
                                     <p:cond delay="0"/>
                                   </p:stCondLst>
                                   <p:childTnLst>
                                     <p:set>
                                       <p:cBhvr>
-                                        <p:cTn id="15" dur="1" fill="hold">
+                                        <p:cTn id="14" dur="1" fill="hold">
                                           <p:stCondLst>
                                             <p:cond delay="0"/>
                                           </p:stCondLst>
@@ -19427,30 +20586,21 @@
                             </p:childTnLst>
                           </p:cTn>
                         </p:par>
-                      </p:childTnLst>
-                    </p:cTn>
-                  </p:par>
-                  <p:par>
-                    <p:cTn id="16" fill="hold">
-                      <p:stCondLst>
-                        <p:cond delay="indefinite"/>
-                      </p:stCondLst>
-                      <p:childTnLst>
                         <p:par>
-                          <p:cTn id="17" fill="hold">
+                          <p:cTn id="15" fill="hold">
                             <p:stCondLst>
                               <p:cond delay="0"/>
                             </p:stCondLst>
                             <p:childTnLst>
                               <p:par>
-                                <p:cTn id="18" presetID="1" presetClass="entr" presetSubtype="0" fill="hold" grpId="0" nodeType="clickEffect">
+                                <p:cTn id="16" presetID="1" presetClass="entr" presetSubtype="0" fill="hold" grpId="0" nodeType="afterEffect">
                                   <p:stCondLst>
                                     <p:cond delay="0"/>
                                   </p:stCondLst>
                                   <p:childTnLst>
                                     <p:set>
                                       <p:cBhvr>
-                                        <p:cTn id="19" dur="1" fill="hold">
+                                        <p:cTn id="17" dur="1" fill="hold">
                                           <p:stCondLst>
                                             <p:cond delay="0"/>
                                           </p:stCondLst>
@@ -19476,30 +20626,21 @@
                             </p:childTnLst>
                           </p:cTn>
                         </p:par>
-                      </p:childTnLst>
-                    </p:cTn>
-                  </p:par>
-                  <p:par>
-                    <p:cTn id="20" fill="hold">
-                      <p:stCondLst>
-                        <p:cond delay="indefinite"/>
-                      </p:stCondLst>
-                      <p:childTnLst>
                         <p:par>
-                          <p:cTn id="21" fill="hold">
+                          <p:cTn id="18" fill="hold">
                             <p:stCondLst>
                               <p:cond delay="0"/>
                             </p:stCondLst>
                             <p:childTnLst>
                               <p:par>
-                                <p:cTn id="22" presetID="1" presetClass="entr" presetSubtype="0" fill="hold" grpId="0" nodeType="clickEffect">
+                                <p:cTn id="19" presetID="1" presetClass="entr" presetSubtype="0" fill="hold" grpId="0" nodeType="afterEffect">
                                   <p:stCondLst>
                                     <p:cond delay="0"/>
                                   </p:stCondLst>
                                   <p:childTnLst>
                                     <p:set>
                                       <p:cBhvr>
-                                        <p:cTn id="23" dur="1" fill="hold">
+                                        <p:cTn id="20" dur="1" fill="hold">
                                           <p:stCondLst>
                                             <p:cond delay="0"/>
                                           </p:stCondLst>
@@ -19525,30 +20666,21 @@
                             </p:childTnLst>
                           </p:cTn>
                         </p:par>
-                      </p:childTnLst>
-                    </p:cTn>
-                  </p:par>
-                  <p:par>
-                    <p:cTn id="24" fill="hold">
-                      <p:stCondLst>
-                        <p:cond delay="indefinite"/>
-                      </p:stCondLst>
-                      <p:childTnLst>
                         <p:par>
-                          <p:cTn id="25" fill="hold">
+                          <p:cTn id="21" fill="hold">
                             <p:stCondLst>
                               <p:cond delay="0"/>
                             </p:stCondLst>
                             <p:childTnLst>
                               <p:par>
-                                <p:cTn id="26" presetID="1" presetClass="entr" presetSubtype="0" fill="hold" grpId="0" nodeType="clickEffect">
+                                <p:cTn id="22" presetID="1" presetClass="entr" presetSubtype="0" fill="hold" grpId="0" nodeType="afterEffect">
                                   <p:stCondLst>
                                     <p:cond delay="0"/>
                                   </p:stCondLst>
                                   <p:childTnLst>
                                     <p:set>
                                       <p:cBhvr>
-                                        <p:cTn id="27" dur="1" fill="hold">
+                                        <p:cTn id="23" dur="1" fill="hold">
                                           <p:stCondLst>
                                             <p:cond delay="0"/>
                                           </p:stCondLst>
@@ -19574,30 +20706,21 @@
                             </p:childTnLst>
                           </p:cTn>
                         </p:par>
-                      </p:childTnLst>
-                    </p:cTn>
-                  </p:par>
-                  <p:par>
-                    <p:cTn id="28" fill="hold">
-                      <p:stCondLst>
-                        <p:cond delay="indefinite"/>
-                      </p:stCondLst>
-                      <p:childTnLst>
                         <p:par>
-                          <p:cTn id="29" fill="hold">
+                          <p:cTn id="24" fill="hold">
                             <p:stCondLst>
                               <p:cond delay="0"/>
                             </p:stCondLst>
                             <p:childTnLst>
                               <p:par>
-                                <p:cTn id="30" presetID="1" presetClass="entr" presetSubtype="0" fill="hold" grpId="0" nodeType="clickEffect">
+                                <p:cTn id="25" presetID="1" presetClass="entr" presetSubtype="0" fill="hold" grpId="0" nodeType="afterEffect">
                                   <p:stCondLst>
                                     <p:cond delay="0"/>
                                   </p:stCondLst>
                                   <p:childTnLst>
                                     <p:set>
                                       <p:cBhvr>
-                                        <p:cTn id="31" dur="1" fill="hold">
+                                        <p:cTn id="26" dur="1" fill="hold">
                                           <p:stCondLst>
                                             <p:cond delay="0"/>
                                           </p:stCondLst>
@@ -19627,26 +20750,26 @@
                     </p:cTn>
                   </p:par>
                   <p:par>
-                    <p:cTn id="32" fill="hold">
+                    <p:cTn id="27" fill="hold">
                       <p:stCondLst>
                         <p:cond delay="indefinite"/>
                       </p:stCondLst>
                       <p:childTnLst>
                         <p:par>
-                          <p:cTn id="33" fill="hold">
+                          <p:cTn id="28" fill="hold">
                             <p:stCondLst>
                               <p:cond delay="0"/>
                             </p:stCondLst>
                             <p:childTnLst>
                               <p:par>
-                                <p:cTn id="34" presetID="26" presetClass="entr" presetSubtype="0" fill="hold" nodeType="clickEffect">
+                                <p:cTn id="29" presetID="26" presetClass="entr" presetSubtype="0" fill="hold" nodeType="clickEffect">
                                   <p:stCondLst>
                                     <p:cond delay="0"/>
                                   </p:stCondLst>
                                   <p:childTnLst>
                                     <p:set>
                                       <p:cBhvr>
-                                        <p:cTn id="35" dur="1" fill="hold">
+                                        <p:cTn id="30" dur="1" fill="hold">
                                           <p:stCondLst>
                                             <p:cond delay="0"/>
                                           </p:stCondLst>
@@ -19664,7 +20787,7 @@
                                     </p:set>
                                     <p:animEffect transition="in" filter="wipe(down)">
                                       <p:cBhvr>
-                                        <p:cTn id="36" dur="580">
+                                        <p:cTn id="31" dur="580">
                                           <p:stCondLst>
                                             <p:cond delay="0"/>
                                           </p:stCondLst>
@@ -19676,7 +20799,7 @@
                                     </p:animEffect>
                                     <p:anim calcmode="lin" valueType="num">
                                       <p:cBhvr>
-                                        <p:cTn id="37" dur="1822" tmFilter="0,0; 0.14,0.36; 0.43,0.73; 0.71,0.91; 1.0,1.0">
+                                        <p:cTn id="32" dur="1822" tmFilter="0,0; 0.14,0.36; 0.43,0.73; 0.71,0.91; 1.0,1.0">
                                           <p:stCondLst>
                                             <p:cond delay="0"/>
                                           </p:stCondLst>
@@ -19703,7 +20826,7 @@
                                     </p:anim>
                                     <p:anim calcmode="lin" valueType="num">
                                       <p:cBhvr>
-                                        <p:cTn id="38" dur="664" tmFilter="0.0,0.0; 0.25,0.07; 0.50,0.2; 0.75,0.467; 1.0,1.0">
+                                        <p:cTn id="33" dur="664" tmFilter="0.0,0.0; 0.25,0.07; 0.50,0.2; 0.75,0.467; 1.0,1.0">
                                           <p:stCondLst>
                                             <p:cond delay="0"/>
                                           </p:stCondLst>
@@ -19730,7 +20853,7 @@
                                     </p:anim>
                                     <p:anim calcmode="lin" valueType="num">
                                       <p:cBhvr>
-                                        <p:cTn id="39" dur="664" tmFilter="0, 0; 0.125,0.2665; 0.25,0.4; 0.375,0.465; 0.5,0.5;  0.625,0.535; 0.75,0.6; 0.875,0.7335; 1,1">
+                                        <p:cTn id="34" dur="664" tmFilter="0, 0; 0.125,0.2665; 0.25,0.4; 0.375,0.465; 0.5,0.5;  0.625,0.535; 0.75,0.6; 0.875,0.7335; 1,1">
                                           <p:stCondLst>
                                             <p:cond delay="664"/>
                                           </p:stCondLst>
@@ -19757,7 +20880,7 @@
                                     </p:anim>
                                     <p:anim calcmode="lin" valueType="num">
                                       <p:cBhvr>
-                                        <p:cTn id="40" dur="332" tmFilter="0, 0; 0.125,0.2665; 0.25,0.4; 0.375,0.465; 0.5,0.5;  0.625,0.535; 0.75,0.6; 0.875,0.7335; 1,1">
+                                        <p:cTn id="35" dur="332" tmFilter="0, 0; 0.125,0.2665; 0.25,0.4; 0.375,0.465; 0.5,0.5;  0.625,0.535; 0.75,0.6; 0.875,0.7335; 1,1">
                                           <p:stCondLst>
                                             <p:cond delay="1324"/>
                                           </p:stCondLst>
@@ -19784,7 +20907,7 @@
                                     </p:anim>
                                     <p:anim calcmode="lin" valueType="num">
                                       <p:cBhvr>
-                                        <p:cTn id="41" dur="164" tmFilter="0, 0; 0.125,0.2665; 0.25,0.4; 0.375,0.465; 0.5,0.5;  0.625,0.535; 0.75,0.6; 0.875,0.7335; 1,1">
+                                        <p:cTn id="36" dur="164" tmFilter="0, 0; 0.125,0.2665; 0.25,0.4; 0.375,0.465; 0.5,0.5;  0.625,0.535; 0.75,0.6; 0.875,0.7335; 1,1">
                                           <p:stCondLst>
                                             <p:cond delay="1656"/>
                                           </p:stCondLst>
@@ -19811,7 +20934,7 @@
                                     </p:anim>
                                     <p:animScale>
                                       <p:cBhvr>
-                                        <p:cTn id="42" dur="26">
+                                        <p:cTn id="37" dur="26">
                                           <p:stCondLst>
                                             <p:cond delay="650"/>
                                           </p:stCondLst>
@@ -19824,7 +20947,7 @@
                                     </p:animScale>
                                     <p:animScale>
                                       <p:cBhvr>
-                                        <p:cTn id="43" dur="166" decel="50000">
+                                        <p:cTn id="38" dur="166" decel="50000">
                                           <p:stCondLst>
                                             <p:cond delay="676"/>
                                           </p:stCondLst>
@@ -19837,7 +20960,7 @@
                                     </p:animScale>
                                     <p:animScale>
                                       <p:cBhvr>
-                                        <p:cTn id="44" dur="26">
+                                        <p:cTn id="39" dur="26">
                                           <p:stCondLst>
                                             <p:cond delay="1312"/>
                                           </p:stCondLst>
@@ -19850,7 +20973,7 @@
                                     </p:animScale>
                                     <p:animScale>
                                       <p:cBhvr>
-                                        <p:cTn id="45" dur="166" decel="50000">
+                                        <p:cTn id="40" dur="166" decel="50000">
                                           <p:stCondLst>
                                             <p:cond delay="1338"/>
                                           </p:stCondLst>
@@ -19863,7 +20986,7 @@
                                     </p:animScale>
                                     <p:animScale>
                                       <p:cBhvr>
-                                        <p:cTn id="46" dur="26">
+                                        <p:cTn id="41" dur="26">
                                           <p:stCondLst>
                                             <p:cond delay="1642"/>
                                           </p:stCondLst>
@@ -19876,7 +20999,7 @@
                                     </p:animScale>
                                     <p:animScale>
                                       <p:cBhvr>
-                                        <p:cTn id="47" dur="166" decel="50000">
+                                        <p:cTn id="42" dur="166" decel="50000">
                                           <p:stCondLst>
                                             <p:cond delay="1668"/>
                                           </p:stCondLst>
@@ -19889,7 +21012,7 @@
                                     </p:animScale>
                                     <p:animScale>
                                       <p:cBhvr>
-                                        <p:cTn id="48" dur="26">
+                                        <p:cTn id="43" dur="26">
                                           <p:stCondLst>
                                             <p:cond delay="1808"/>
                                           </p:stCondLst>
@@ -19902,7 +21025,7 @@
                                     </p:animScale>
                                     <p:animScale>
                                       <p:cBhvr>
-                                        <p:cTn id="49" dur="166" decel="50000">
+                                        <p:cTn id="44" dur="166" decel="50000">
                                           <p:stCondLst>
                                             <p:cond delay="1834"/>
                                           </p:stCondLst>
@@ -19920,20 +21043,20 @@
                           </p:cTn>
                         </p:par>
                         <p:par>
-                          <p:cTn id="50" fill="hold">
+                          <p:cTn id="45" fill="hold">
                             <p:stCondLst>
                               <p:cond delay="2000"/>
                             </p:stCondLst>
                             <p:childTnLst>
                               <p:par>
-                                <p:cTn id="51" presetID="10" presetClass="entr" presetSubtype="0" fill="hold" grpId="0" nodeType="afterEffect">
+                                <p:cTn id="46" presetID="10" presetClass="entr" presetSubtype="0" fill="hold" grpId="0" nodeType="afterEffect">
                                   <p:stCondLst>
                                     <p:cond delay="0"/>
                                   </p:stCondLst>
                                   <p:childTnLst>
                                     <p:set>
                                       <p:cBhvr>
-                                        <p:cTn id="52" dur="1" fill="hold">
+                                        <p:cTn id="47" dur="1" fill="hold">
                                           <p:stCondLst>
                                             <p:cond delay="0"/>
                                           </p:stCondLst>
@@ -19951,7 +21074,7 @@
                                     </p:set>
                                     <p:animEffect transition="in" filter="fade">
                                       <p:cBhvr>
-                                        <p:cTn id="53" dur="500"/>
+                                        <p:cTn id="48" dur="500"/>
                                         <p:tgtEl>
                                           <p:spTgt spid="5"/>
                                         </p:tgtEl>
@@ -19988,7 +21111,7 @@
       </p:par>
     </p:tnLst>
     <p:bldLst>
-      <p:bldP spid="2" grpId="0" build="p"/>
+      <p:bldP spid="2" grpId="0" uiExpand="1" build="p"/>
       <p:bldP spid="5" grpId="0"/>
     </p:bldLst>
   </p:timing>

</xml_diff>

<commit_message>
Alterando referencia para Service Local
</commit_message>
<xml_diff>
--- a/Apresentacao.Knockout.JS/Knockout.JS.2014.04.pptx
+++ b/Apresentacao.Knockout.JS/Knockout.JS.2014.04.pptx
@@ -5,7 +5,7 @@
     <p:sldMasterId id="2147483660" r:id="rId2"/>
   </p:sldMasterIdLst>
   <p:notesMasterIdLst>
-    <p:notesMasterId r:id="rId19"/>
+    <p:notesMasterId r:id="rId20"/>
   </p:notesMasterIdLst>
   <p:sldIdLst>
     <p:sldId id="256" r:id="rId3"/>
@@ -16,14 +16,15 @@
     <p:sldId id="267" r:id="rId8"/>
     <p:sldId id="268" r:id="rId9"/>
     <p:sldId id="277" r:id="rId10"/>
-    <p:sldId id="271" r:id="rId11"/>
-    <p:sldId id="278" r:id="rId12"/>
-    <p:sldId id="275" r:id="rId13"/>
-    <p:sldId id="276" r:id="rId14"/>
-    <p:sldId id="272" r:id="rId15"/>
-    <p:sldId id="273" r:id="rId16"/>
-    <p:sldId id="279" r:id="rId17"/>
-    <p:sldId id="274" r:id="rId18"/>
+    <p:sldId id="280" r:id="rId11"/>
+    <p:sldId id="271" r:id="rId12"/>
+    <p:sldId id="278" r:id="rId13"/>
+    <p:sldId id="275" r:id="rId14"/>
+    <p:sldId id="276" r:id="rId15"/>
+    <p:sldId id="272" r:id="rId16"/>
+    <p:sldId id="273" r:id="rId17"/>
+    <p:sldId id="279" r:id="rId18"/>
+    <p:sldId id="274" r:id="rId19"/>
   </p:sldIdLst>
   <p:sldSz cx="12192000" cy="6858000"/>
   <p:notesSz cx="6858000" cy="9144000"/>
@@ -3259,7 +3260,7 @@
             <a:fld id="{E28287AA-0D99-42CE-A71B-10FA9908BBF8}" type="datetimeFigureOut">
               <a:rPr lang="en-US" smtClean="0"/>
               <a:pPr/>
-              <a:t>4/23/2014</a:t>
+              <a:t>26-Apr-14</a:t>
             </a:fld>
             <a:endParaRPr lang="en-US"/>
           </a:p>
@@ -3421,7 +3422,7 @@
             <a:fld id="{D7C167DB-EFF0-400D-96A1-6799F871DE5B}" type="slidenum">
               <a:rPr lang="en-US" smtClean="0"/>
               <a:pPr/>
-              <a:t>‹nº›</a:t>
+              <a:t>‹#›</a:t>
             </a:fld>
             <a:endParaRPr lang="en-US"/>
           </a:p>
@@ -3913,7 +3914,7 @@
             <a:fld id="{DCFA480D-CB17-4C49-BB2A-C7514E1C7CEA}" type="datetimeFigureOut">
               <a:rPr lang="en-US" smtClean="0"/>
               <a:pPr/>
-              <a:t>4/23/2014</a:t>
+              <a:t>26-Apr-14</a:t>
             </a:fld>
             <a:endParaRPr lang="en-US"/>
           </a:p>
@@ -3938,7 +3939,7 @@
             <a:fld id="{CEAB1635-7AB6-4A02-8F63-2344453D2D84}" type="slidenum">
               <a:rPr lang="en-US" smtClean="0"/>
               <a:pPr algn="ctr"/>
-              <a:t>‹nº›</a:t>
+              <a:t>‹#›</a:t>
             </a:fld>
             <a:endParaRPr lang="en-US" dirty="0"/>
           </a:p>
@@ -4081,7 +4082,7 @@
             <a:fld id="{DCFA480D-CB17-4C49-BB2A-C7514E1C7CEA}" type="datetimeFigureOut">
               <a:rPr lang="en-US" smtClean="0"/>
               <a:pPr/>
-              <a:t>4/23/2014</a:t>
+              <a:t>26-Apr-14</a:t>
             </a:fld>
             <a:endParaRPr lang="en-US"/>
           </a:p>
@@ -4124,7 +4125,7 @@
             <a:fld id="{CEAB1635-7AB6-4A02-8F63-2344453D2D84}" type="slidenum">
               <a:rPr lang="en-US" smtClean="0"/>
               <a:pPr/>
-              <a:t>‹nº›</a:t>
+              <a:t>‹#›</a:t>
             </a:fld>
             <a:endParaRPr lang="en-US"/>
           </a:p>
@@ -4258,7 +4259,7 @@
             <a:fld id="{DCFA480D-CB17-4C49-BB2A-C7514E1C7CEA}" type="datetimeFigureOut">
               <a:rPr lang="en-US" smtClean="0"/>
               <a:pPr/>
-              <a:t>4/23/2014</a:t>
+              <a:t>26-Apr-14</a:t>
             </a:fld>
             <a:endParaRPr lang="en-US"/>
           </a:p>
@@ -4301,7 +4302,7 @@
             <a:fld id="{CEAB1635-7AB6-4A02-8F63-2344453D2D84}" type="slidenum">
               <a:rPr lang="en-US" smtClean="0"/>
               <a:pPr/>
-              <a:t>‹nº›</a:t>
+              <a:t>‹#›</a:t>
             </a:fld>
             <a:endParaRPr lang="en-US"/>
           </a:p>
@@ -4407,7 +4408,7 @@
             <a:fld id="{DCFA480D-CB17-4C49-BB2A-C7514E1C7CEA}" type="datetimeFigureOut">
               <a:rPr lang="en-US" smtClean="0"/>
               <a:pPr/>
-              <a:t>4/23/2014</a:t>
+              <a:t>26-Apr-14</a:t>
             </a:fld>
             <a:endParaRPr lang="en-US"/>
           </a:p>
@@ -4436,7 +4437,7 @@
             <a:fld id="{CEAB1635-7AB6-4A02-8F63-2344453D2D84}" type="slidenum">
               <a:rPr lang="en-US" smtClean="0"/>
               <a:pPr algn="ctr"/>
-              <a:t>‹nº›</a:t>
+              <a:t>‹#›</a:t>
             </a:fld>
             <a:endParaRPr lang="en-US" dirty="0"/>
           </a:p>
@@ -4532,7 +4533,7 @@
             <a:fld id="{DCFA480D-CB17-4C49-BB2A-C7514E1C7CEA}" type="datetimeFigureOut">
               <a:rPr lang="en-US" smtClean="0"/>
               <a:pPr/>
-              <a:t>4/23/2014</a:t>
+              <a:t>26-Apr-14</a:t>
             </a:fld>
             <a:endParaRPr lang="en-US" dirty="0"/>
           </a:p>
@@ -4575,7 +4576,7 @@
             <a:fld id="{CEAB1635-7AB6-4A02-8F63-2344453D2D84}" type="slidenum">
               <a:rPr lang="en-US" smtClean="0"/>
               <a:pPr/>
-              <a:t>‹nº›</a:t>
+              <a:t>‹#›</a:t>
             </a:fld>
             <a:endParaRPr lang="en-US" dirty="0"/>
           </a:p>
@@ -4804,7 +4805,7 @@
             <a:fld id="{DCFA480D-CB17-4C49-BB2A-C7514E1C7CEA}" type="datetimeFigureOut">
               <a:rPr lang="en-US" smtClean="0"/>
               <a:pPr/>
-              <a:t>4/23/2014</a:t>
+              <a:t>26-Apr-14</a:t>
             </a:fld>
             <a:endParaRPr lang="en-US" dirty="0"/>
           </a:p>
@@ -4847,7 +4848,7 @@
             <a:fld id="{CEAB1635-7AB6-4A02-8F63-2344453D2D84}" type="slidenum">
               <a:rPr lang="en-US" smtClean="0"/>
               <a:pPr/>
-              <a:t>‹nº›</a:t>
+              <a:t>‹#›</a:t>
             </a:fld>
             <a:endParaRPr lang="en-US" dirty="0"/>
           </a:p>
@@ -5033,7 +5034,7 @@
             <a:fld id="{CEAB1635-7AB6-4A02-8F63-2344453D2D84}" type="slidenum">
               <a:rPr lang="en-US" smtClean="0"/>
               <a:pPr/>
-              <a:t>‹nº›</a:t>
+              <a:t>‹#›</a:t>
             </a:fld>
             <a:endParaRPr lang="en-US" dirty="0"/>
           </a:p>
@@ -5076,7 +5077,7 @@
             <a:fld id="{DCFA480D-CB17-4C49-BB2A-C7514E1C7CEA}" type="datetimeFigureOut">
               <a:rPr lang="en-US" smtClean="0"/>
               <a:pPr/>
-              <a:t>4/23/2014</a:t>
+              <a:t>26-Apr-14</a:t>
             </a:fld>
             <a:endParaRPr lang="en-US" dirty="0"/>
           </a:p>
@@ -5524,7 +5525,7 @@
             <a:fld id="{DCFA480D-CB17-4C49-BB2A-C7514E1C7CEA}" type="datetimeFigureOut">
               <a:rPr lang="en-US" smtClean="0"/>
               <a:pPr/>
-              <a:t>4/23/2014</a:t>
+              <a:t>26-Apr-14</a:t>
             </a:fld>
             <a:endParaRPr lang="en-US" dirty="0"/>
           </a:p>
@@ -5567,7 +5568,7 @@
             <a:fld id="{CEAB1635-7AB6-4A02-8F63-2344453D2D84}" type="slidenum">
               <a:rPr lang="en-US" smtClean="0"/>
               <a:pPr/>
-              <a:t>‹nº›</a:t>
+              <a:t>‹#›</a:t>
             </a:fld>
             <a:endParaRPr lang="en-US" dirty="0"/>
           </a:p>
@@ -5639,7 +5640,7 @@
             <a:fld id="{DCFA480D-CB17-4C49-BB2A-C7514E1C7CEA}" type="datetimeFigureOut">
               <a:rPr lang="en-US" smtClean="0"/>
               <a:pPr/>
-              <a:t>4/23/2014</a:t>
+              <a:t>26-Apr-14</a:t>
             </a:fld>
             <a:endParaRPr lang="en-US" dirty="0"/>
           </a:p>
@@ -5682,7 +5683,7 @@
             <a:fld id="{CEAB1635-7AB6-4A02-8F63-2344453D2D84}" type="slidenum">
               <a:rPr lang="en-US" smtClean="0"/>
               <a:pPr/>
-              <a:t>‹nº›</a:t>
+              <a:t>‹#›</a:t>
             </a:fld>
             <a:endParaRPr lang="en-US" dirty="0"/>
           </a:p>
@@ -5891,7 +5892,7 @@
             <a:fld id="{DCFA480D-CB17-4C49-BB2A-C7514E1C7CEA}" type="datetimeFigureOut">
               <a:rPr lang="en-US" smtClean="0"/>
               <a:pPr/>
-              <a:t>4/23/2014</a:t>
+              <a:t>26-Apr-14</a:t>
             </a:fld>
             <a:endParaRPr lang="en-US"/>
           </a:p>
@@ -5916,7 +5917,7 @@
             <a:fld id="{CEAB1635-7AB6-4A02-8F63-2344453D2D84}" type="slidenum">
               <a:rPr lang="en-US" smtClean="0"/>
               <a:pPr algn="ctr"/>
-              <a:t>‹nº›</a:t>
+              <a:t>‹#›</a:t>
             </a:fld>
             <a:endParaRPr lang="en-US" dirty="0"/>
           </a:p>
@@ -6134,7 +6135,7 @@
             <a:fld id="{DCFA480D-CB17-4C49-BB2A-C7514E1C7CEA}" type="datetimeFigureOut">
               <a:rPr lang="en-US" smtClean="0"/>
               <a:pPr/>
-              <a:t>4/23/2014</a:t>
+              <a:t>26-Apr-14</a:t>
             </a:fld>
             <a:endParaRPr lang="en-US"/>
           </a:p>
@@ -6159,7 +6160,7 @@
             <a:fld id="{CEAB1635-7AB6-4A02-8F63-2344453D2D84}" type="slidenum">
               <a:rPr lang="en-US" smtClean="0"/>
               <a:pPr algn="ctr"/>
-              <a:t>‹nº›</a:t>
+              <a:t>‹#›</a:t>
             </a:fld>
             <a:endParaRPr lang="en-US" dirty="0"/>
           </a:p>
@@ -6310,7 +6311,7 @@
             <a:fld id="{DCFA480D-CB17-4C49-BB2A-C7514E1C7CEA}" type="datetimeFigureOut">
               <a:rPr lang="en-US" smtClean="0"/>
               <a:pPr/>
-              <a:t>4/23/2014</a:t>
+              <a:t>26-Apr-14</a:t>
             </a:fld>
             <a:endParaRPr lang="en-US" sz="1200" dirty="0">
               <a:solidFill>
@@ -6398,7 +6399,7 @@
             <a:fld id="{CEAB1635-7AB6-4A02-8F63-2344453D2D84}" type="slidenum">
               <a:rPr lang="en-US" smtClean="0"/>
               <a:pPr algn="ctr"/>
-              <a:t>‹nº›</a:t>
+              <a:t>‹#›</a:t>
             </a:fld>
             <a:endParaRPr lang="en-US" sz="1600" baseline="0" dirty="0">
               <a:solidFill>
@@ -7020,6 +7021,1275 @@
 </file>
 
 <file path=ppt/slides/slide10.xml><?xml version="1.0" encoding="utf-8"?>
+<p:sld xmlns:a="http://schemas.openxmlformats.org/drawingml/2006/main" xmlns:r="http://schemas.openxmlformats.org/officeDocument/2006/relationships" xmlns:p="http://schemas.openxmlformats.org/presentationml/2006/main">
+  <p:cSld>
+    <p:spTree>
+      <p:nvGrpSpPr>
+        <p:cNvPr id="1" name=""/>
+        <p:cNvGrpSpPr/>
+        <p:nvPr/>
+      </p:nvGrpSpPr>
+      <p:grpSpPr>
+        <a:xfrm>
+          <a:off x="0" y="0"/>
+          <a:ext cx="0" cy="0"/>
+          <a:chOff x="0" y="0"/>
+          <a:chExt cx="0" cy="0"/>
+        </a:xfrm>
+      </p:grpSpPr>
+      <p:sp>
+        <p:nvSpPr>
+          <p:cNvPr id="2" name="Content Placeholder 1"/>
+          <p:cNvSpPr>
+            <a:spLocks noGrp="1"/>
+          </p:cNvSpPr>
+          <p:nvPr>
+            <p:ph idx="1"/>
+          </p:nvPr>
+        </p:nvSpPr>
+        <p:spPr>
+          <a:xfrm>
+            <a:off x="609600" y="1524000"/>
+            <a:ext cx="10972800" cy="3255039"/>
+          </a:xfrm>
+        </p:spPr>
+        <p:txBody>
+          <a:bodyPr/>
+          <a:lstStyle/>
+          <a:p>
+            <a:r>
+              <a:rPr lang="en-US" dirty="0" smtClean="0"/>
+              <a:t>Obter dados do Servidor</a:t>
+            </a:r>
+          </a:p>
+          <a:p>
+            <a:r>
+              <a:rPr lang="en-US" dirty="0" smtClean="0"/>
+              <a:t>Definir uma interface com o usuário</a:t>
+            </a:r>
+          </a:p>
+          <a:p>
+            <a:r>
+              <a:rPr lang="en-US" dirty="0" smtClean="0"/>
+              <a:t>Criar métodos para apresentação e manter os dados  (DOM)</a:t>
+            </a:r>
+          </a:p>
+          <a:p>
+            <a:r>
+              <a:rPr lang="en-US" dirty="0" smtClean="0"/>
+              <a:t>Criar métodos para manipular os dados (como reordenação da lista) </a:t>
+            </a:r>
+          </a:p>
+          <a:p>
+            <a:r>
+              <a:rPr lang="en-US" dirty="0"/>
+              <a:t>Criar métodos para validar os dados do </a:t>
+            </a:r>
+            <a:r>
+              <a:rPr lang="en-US" dirty="0" smtClean="0"/>
+              <a:t>usuário</a:t>
+            </a:r>
+          </a:p>
+          <a:p>
+            <a:r>
+              <a:rPr lang="en-US" dirty="0" smtClean="0"/>
+              <a:t>Criar métodos para persistir os dados</a:t>
+            </a:r>
+            <a:endParaRPr lang="en-US" dirty="0"/>
+          </a:p>
+        </p:txBody>
+      </p:sp>
+      <p:sp>
+        <p:nvSpPr>
+          <p:cNvPr id="3" name="Title 2"/>
+          <p:cNvSpPr>
+            <a:spLocks noGrp="1"/>
+          </p:cNvSpPr>
+          <p:nvPr>
+            <p:ph type="title"/>
+          </p:nvPr>
+        </p:nvSpPr>
+        <p:spPr/>
+        <p:txBody>
+          <a:bodyPr/>
+          <a:lstStyle/>
+          <a:p>
+            <a:r>
+              <a:rPr lang="en-US" dirty="0" smtClean="0"/>
+              <a:t>Apresentando </a:t>
+            </a:r>
+            <a:r>
+              <a:rPr lang="en-US" dirty="0"/>
+              <a:t>o primeiro exemplo</a:t>
+            </a:r>
+          </a:p>
+        </p:txBody>
+      </p:sp>
+      <p:grpSp>
+        <p:nvGrpSpPr>
+          <p:cNvPr id="14" name="Group 13"/>
+          <p:cNvGrpSpPr/>
+          <p:nvPr/>
+        </p:nvGrpSpPr>
+        <p:grpSpPr>
+          <a:xfrm rot="21045721">
+            <a:off x="7254337" y="3916895"/>
+            <a:ext cx="4464496" cy="2232248"/>
+            <a:chOff x="6960096" y="3753036"/>
+            <a:chExt cx="4464496" cy="2232248"/>
+          </a:xfrm>
+        </p:grpSpPr>
+        <p:sp>
+          <p:nvSpPr>
+            <p:cNvPr id="13" name="Snip Diagonal Corner Rectangle 12"/>
+            <p:cNvSpPr/>
+            <p:nvPr/>
+          </p:nvSpPr>
+          <p:spPr>
+            <a:xfrm>
+              <a:off x="6960096" y="3753036"/>
+              <a:ext cx="4464496" cy="2232248"/>
+            </a:xfrm>
+            <a:prstGeom prst="snip2DiagRect">
+              <a:avLst/>
+            </a:prstGeom>
+          </p:spPr>
+          <p:style>
+            <a:lnRef idx="3">
+              <a:schemeClr val="lt1"/>
+            </a:lnRef>
+            <a:fillRef idx="1">
+              <a:schemeClr val="accent2"/>
+            </a:fillRef>
+            <a:effectRef idx="1">
+              <a:schemeClr val="accent2"/>
+            </a:effectRef>
+            <a:fontRef idx="minor">
+              <a:schemeClr val="lt1"/>
+            </a:fontRef>
+          </p:style>
+          <p:txBody>
+            <a:bodyPr rtlCol="0" anchor="ctr"/>
+            <a:lstStyle/>
+            <a:p>
+              <a:pPr algn="ctr"/>
+              <a:endParaRPr lang="en-US"/>
+            </a:p>
+          </p:txBody>
+        </p:sp>
+        <p:grpSp>
+          <p:nvGrpSpPr>
+            <p:cNvPr id="12" name="Group 11"/>
+            <p:cNvGrpSpPr/>
+            <p:nvPr/>
+          </p:nvGrpSpPr>
+          <p:grpSpPr>
+            <a:xfrm>
+              <a:off x="7104112" y="3933056"/>
+              <a:ext cx="4176464" cy="1872208"/>
+              <a:chOff x="7104112" y="3933056"/>
+              <a:chExt cx="4176464" cy="1872208"/>
+            </a:xfrm>
+          </p:grpSpPr>
+          <p:sp>
+            <p:nvSpPr>
+              <p:cNvPr id="4" name="Folded Corner 3"/>
+              <p:cNvSpPr/>
+              <p:nvPr/>
+            </p:nvSpPr>
+            <p:spPr>
+              <a:xfrm>
+                <a:off x="7104112" y="3933056"/>
+                <a:ext cx="4176464" cy="1872208"/>
+              </a:xfrm>
+              <a:prstGeom prst="foldedCorner">
+                <a:avLst/>
+              </a:prstGeom>
+            </p:spPr>
+            <p:style>
+              <a:lnRef idx="2">
+                <a:schemeClr val="accent2"/>
+              </a:lnRef>
+              <a:fillRef idx="1">
+                <a:schemeClr val="lt1"/>
+              </a:fillRef>
+              <a:effectRef idx="0">
+                <a:schemeClr val="accent2"/>
+              </a:effectRef>
+              <a:fontRef idx="minor">
+                <a:schemeClr val="dk1"/>
+              </a:fontRef>
+            </p:style>
+            <p:txBody>
+              <a:bodyPr rtlCol="0" anchor="ctr"/>
+              <a:lstStyle/>
+              <a:p>
+                <a:pPr algn="r"/>
+                <a:endParaRPr lang="en-US" dirty="0">
+                  <a:latin typeface="Arial Black" panose="020B0A04020102020204" pitchFamily="34" charset="0"/>
+                </a:endParaRPr>
+              </a:p>
+            </p:txBody>
+          </p:sp>
+          <p:cxnSp>
+            <p:nvCxnSpPr>
+              <p:cNvPr id="6" name="Straight Connector 5"/>
+              <p:cNvCxnSpPr/>
+              <p:nvPr/>
+            </p:nvCxnSpPr>
+            <p:spPr>
+              <a:xfrm flipV="1">
+                <a:off x="7824192" y="4005064"/>
+                <a:ext cx="0" cy="1728192"/>
+              </a:xfrm>
+              <a:prstGeom prst="line">
+                <a:avLst/>
+              </a:prstGeom>
+              <a:ln>
+                <a:solidFill>
+                  <a:schemeClr val="accent2">
+                    <a:lumMod val="75000"/>
+                  </a:schemeClr>
+                </a:solidFill>
+              </a:ln>
+            </p:spPr>
+            <p:style>
+              <a:lnRef idx="1">
+                <a:schemeClr val="accent1"/>
+              </a:lnRef>
+              <a:fillRef idx="0">
+                <a:schemeClr val="accent1"/>
+              </a:fillRef>
+              <a:effectRef idx="0">
+                <a:schemeClr val="accent1"/>
+              </a:effectRef>
+              <a:fontRef idx="minor">
+                <a:schemeClr val="tx1"/>
+              </a:fontRef>
+            </p:style>
+          </p:cxnSp>
+          <p:cxnSp>
+            <p:nvCxnSpPr>
+              <p:cNvPr id="8" name="Straight Connector 7"/>
+              <p:cNvCxnSpPr/>
+              <p:nvPr/>
+            </p:nvCxnSpPr>
+            <p:spPr>
+              <a:xfrm>
+                <a:off x="7104112" y="5013176"/>
+                <a:ext cx="4176464" cy="0"/>
+              </a:xfrm>
+              <a:prstGeom prst="line">
+                <a:avLst/>
+              </a:prstGeom>
+              <a:ln>
+                <a:solidFill>
+                  <a:schemeClr val="accent6">
+                    <a:lumMod val="60000"/>
+                    <a:lumOff val="40000"/>
+                  </a:schemeClr>
+                </a:solidFill>
+              </a:ln>
+            </p:spPr>
+            <p:style>
+              <a:lnRef idx="1">
+                <a:schemeClr val="accent1"/>
+              </a:lnRef>
+              <a:fillRef idx="0">
+                <a:schemeClr val="accent1"/>
+              </a:fillRef>
+              <a:effectRef idx="0">
+                <a:schemeClr val="accent1"/>
+              </a:effectRef>
+              <a:fontRef idx="minor">
+                <a:schemeClr val="tx1"/>
+              </a:fontRef>
+            </p:style>
+          </p:cxnSp>
+          <p:sp>
+            <p:nvSpPr>
+              <p:cNvPr id="9" name="Rectangle 8"/>
+              <p:cNvSpPr/>
+              <p:nvPr/>
+            </p:nvSpPr>
+            <p:spPr>
+              <a:xfrm>
+                <a:off x="7320136" y="5229200"/>
+                <a:ext cx="288032" cy="288032"/>
+              </a:xfrm>
+              <a:prstGeom prst="rect">
+                <a:avLst/>
+              </a:prstGeom>
+              <a:solidFill>
+                <a:schemeClr val="tx1">
+                  <a:lumMod val="95000"/>
+                </a:schemeClr>
+              </a:solidFill>
+              <a:ln w="12700"/>
+            </p:spPr>
+            <p:style>
+              <a:lnRef idx="2">
+                <a:schemeClr val="dk1"/>
+              </a:lnRef>
+              <a:fillRef idx="1">
+                <a:schemeClr val="lt1"/>
+              </a:fillRef>
+              <a:effectRef idx="0">
+                <a:schemeClr val="dk1"/>
+              </a:effectRef>
+              <a:fontRef idx="minor">
+                <a:schemeClr val="dk1"/>
+              </a:fontRef>
+            </p:style>
+            <p:txBody>
+              <a:bodyPr rtlCol="0" anchor="ctr"/>
+              <a:lstStyle/>
+              <a:p>
+                <a:pPr algn="ctr"/>
+                <a:endParaRPr lang="en-US"/>
+              </a:p>
+            </p:txBody>
+          </p:sp>
+          <p:sp>
+            <p:nvSpPr>
+              <p:cNvPr id="10" name="TextBox 9"/>
+              <p:cNvSpPr txBox="1"/>
+              <p:nvPr/>
+            </p:nvSpPr>
+            <p:spPr>
+              <a:xfrm>
+                <a:off x="8041017" y="5157192"/>
+                <a:ext cx="2087431" cy="461665"/>
+              </a:xfrm>
+              <a:prstGeom prst="rect">
+                <a:avLst/>
+              </a:prstGeom>
+              <a:noFill/>
+            </p:spPr>
+            <p:txBody>
+              <a:bodyPr wrap="none" rtlCol="0">
+                <a:spAutoFit/>
+              </a:bodyPr>
+              <a:lstStyle/>
+              <a:p>
+                <a:r>
+                  <a:rPr lang="en-US" sz="2400" dirty="0" smtClean="0">
+                    <a:solidFill>
+                      <a:schemeClr val="bg1"/>
+                    </a:solidFill>
+                    <a:latin typeface="Corbel" panose="020B0503020204020204" pitchFamily="34" charset="0"/>
+                  </a:rPr>
+                  <a:t>Comprar pão...</a:t>
+                </a:r>
+                <a:endParaRPr lang="en-US" sz="2400" dirty="0">
+                  <a:solidFill>
+                    <a:schemeClr val="bg1"/>
+                  </a:solidFill>
+                  <a:latin typeface="Corbel" panose="020B0503020204020204" pitchFamily="34" charset="0"/>
+                </a:endParaRPr>
+              </a:p>
+            </p:txBody>
+          </p:sp>
+          <p:sp>
+            <p:nvSpPr>
+              <p:cNvPr id="11" name="TextBox 10"/>
+              <p:cNvSpPr txBox="1"/>
+              <p:nvPr/>
+            </p:nvSpPr>
+            <p:spPr>
+              <a:xfrm>
+                <a:off x="8040216" y="4390509"/>
+                <a:ext cx="3240360" cy="461665"/>
+              </a:xfrm>
+              <a:prstGeom prst="rect">
+                <a:avLst/>
+              </a:prstGeom>
+              <a:noFill/>
+            </p:spPr>
+            <p:txBody>
+              <a:bodyPr wrap="square" rtlCol="0">
+                <a:spAutoFit/>
+              </a:bodyPr>
+              <a:lstStyle/>
+              <a:p>
+                <a:r>
+                  <a:rPr lang="en-US" sz="2400" dirty="0" smtClean="0">
+                    <a:solidFill>
+                      <a:schemeClr val="accent1">
+                        <a:lumMod val="50000"/>
+                      </a:schemeClr>
+                    </a:solidFill>
+                    <a:latin typeface="Arial Black" panose="020B0A04020102020204" pitchFamily="34" charset="0"/>
+                  </a:rPr>
+                  <a:t>Lista de Tarefas</a:t>
+                </a:r>
+                <a:endParaRPr lang="en-US" sz="2400" dirty="0">
+                  <a:solidFill>
+                    <a:schemeClr val="accent1">
+                      <a:lumMod val="50000"/>
+                    </a:schemeClr>
+                  </a:solidFill>
+                  <a:latin typeface="Arial Black" panose="020B0A04020102020204" pitchFamily="34" charset="0"/>
+                </a:endParaRPr>
+              </a:p>
+            </p:txBody>
+          </p:sp>
+        </p:grpSp>
+      </p:grpSp>
+      <p:grpSp>
+        <p:nvGrpSpPr>
+          <p:cNvPr id="18" name="Group 17"/>
+          <p:cNvGrpSpPr/>
+          <p:nvPr/>
+        </p:nvGrpSpPr>
+        <p:grpSpPr>
+          <a:xfrm>
+            <a:off x="551384" y="5054515"/>
+            <a:ext cx="936104" cy="864096"/>
+            <a:chOff x="3287688" y="5445224"/>
+            <a:chExt cx="936104" cy="864096"/>
+          </a:xfrm>
+        </p:grpSpPr>
+        <p:sp>
+          <p:nvSpPr>
+            <p:cNvPr id="19" name="Oval 18"/>
+            <p:cNvSpPr/>
+            <p:nvPr/>
+          </p:nvSpPr>
+          <p:spPr>
+            <a:xfrm>
+              <a:off x="3287688" y="5445224"/>
+              <a:ext cx="936104" cy="864096"/>
+            </a:xfrm>
+            <a:prstGeom prst="ellipse">
+              <a:avLst/>
+            </a:prstGeom>
+            <a:solidFill>
+              <a:srgbClr val="EA3E3E"/>
+            </a:solidFill>
+            <a:ln>
+              <a:solidFill>
+                <a:schemeClr val="bg2">
+                  <a:lumMod val="75000"/>
+                </a:schemeClr>
+              </a:solidFill>
+            </a:ln>
+          </p:spPr>
+          <p:style>
+            <a:lnRef idx="2">
+              <a:schemeClr val="accent1">
+                <a:shade val="50000"/>
+              </a:schemeClr>
+            </a:lnRef>
+            <a:fillRef idx="1">
+              <a:schemeClr val="accent1"/>
+            </a:fillRef>
+            <a:effectRef idx="0">
+              <a:schemeClr val="accent1"/>
+            </a:effectRef>
+            <a:fontRef idx="minor">
+              <a:schemeClr val="lt1"/>
+            </a:fontRef>
+          </p:style>
+          <p:txBody>
+            <a:bodyPr rtlCol="0" anchor="ctr"/>
+            <a:lstStyle/>
+            <a:p>
+              <a:pPr algn="ctr"/>
+              <a:endParaRPr lang="en-US"/>
+            </a:p>
+          </p:txBody>
+        </p:sp>
+        <p:sp>
+          <p:nvSpPr>
+            <p:cNvPr id="20" name="Multiply 19"/>
+            <p:cNvSpPr/>
+            <p:nvPr/>
+          </p:nvSpPr>
+          <p:spPr>
+            <a:xfrm>
+              <a:off x="3359696" y="5506116"/>
+              <a:ext cx="792088" cy="742312"/>
+            </a:xfrm>
+            <a:prstGeom prst="mathMultiply">
+              <a:avLst/>
+            </a:prstGeom>
+            <a:ln>
+              <a:solidFill>
+                <a:schemeClr val="bg2">
+                  <a:lumMod val="75000"/>
+                </a:schemeClr>
+              </a:solidFill>
+            </a:ln>
+          </p:spPr>
+          <p:style>
+            <a:lnRef idx="2">
+              <a:schemeClr val="accent1"/>
+            </a:lnRef>
+            <a:fillRef idx="1">
+              <a:schemeClr val="lt1"/>
+            </a:fillRef>
+            <a:effectRef idx="0">
+              <a:schemeClr val="accent1"/>
+            </a:effectRef>
+            <a:fontRef idx="minor">
+              <a:schemeClr val="dk1"/>
+            </a:fontRef>
+          </p:style>
+          <p:txBody>
+            <a:bodyPr rtlCol="0" anchor="ctr"/>
+            <a:lstStyle/>
+            <a:p>
+              <a:pPr algn="ctr"/>
+              <a:endParaRPr lang="en-US"/>
+            </a:p>
+          </p:txBody>
+        </p:sp>
+      </p:grpSp>
+      <p:sp>
+        <p:nvSpPr>
+          <p:cNvPr id="5" name="TextBox 4"/>
+          <p:cNvSpPr txBox="1"/>
+          <p:nvPr/>
+        </p:nvSpPr>
+        <p:spPr>
+          <a:xfrm>
+            <a:off x="1685349" y="5068341"/>
+            <a:ext cx="5170859" cy="1384995"/>
+          </a:xfrm>
+          <a:prstGeom prst="rect">
+            <a:avLst/>
+          </a:prstGeom>
+          <a:noFill/>
+        </p:spPr>
+        <p:txBody>
+          <a:bodyPr wrap="square" rtlCol="0">
+            <a:spAutoFit/>
+          </a:bodyPr>
+          <a:lstStyle/>
+          <a:p>
+            <a:r>
+              <a:rPr lang="en-US" sz="2800" b="1" dirty="0" smtClean="0">
+                <a:solidFill>
+                  <a:srgbClr val="EA3E3E"/>
+                </a:solidFill>
+                <a:effectLst>
+                  <a:outerShdw blurRad="38100" dist="38100" dir="2700000" algn="tl">
+                    <a:srgbClr val="000000">
+                      <a:alpha val="43137"/>
+                    </a:srgbClr>
+                  </a:outerShdw>
+                </a:effectLst>
+                <a:latin typeface="Corbel" panose="020B0503020204020204" pitchFamily="34" charset="0"/>
+              </a:rPr>
+              <a:t>Sem a estrutura do KOjs, esses métodos podem ser bem desorganizados.</a:t>
+            </a:r>
+            <a:endParaRPr lang="en-US" sz="2800" b="1" dirty="0">
+              <a:solidFill>
+                <a:srgbClr val="EA3E3E"/>
+              </a:solidFill>
+              <a:effectLst>
+                <a:outerShdw blurRad="38100" dist="38100" dir="2700000" algn="tl">
+                  <a:srgbClr val="000000">
+                    <a:alpha val="43137"/>
+                  </a:srgbClr>
+                </a:outerShdw>
+              </a:effectLst>
+              <a:latin typeface="Corbel" panose="020B0503020204020204" pitchFamily="34" charset="0"/>
+            </a:endParaRPr>
+          </a:p>
+        </p:txBody>
+      </p:sp>
+    </p:spTree>
+    <p:extLst>
+      <p:ext uri="{BB962C8B-B14F-4D97-AF65-F5344CB8AC3E}">
+        <p14:creationId xmlns:p14="http://schemas.microsoft.com/office/powerpoint/2010/main" val="3705422472"/>
+      </p:ext>
+    </p:extLst>
+  </p:cSld>
+  <p:clrMapOvr>
+    <a:masterClrMapping/>
+  </p:clrMapOvr>
+  <p:timing>
+    <p:tnLst>
+      <p:par>
+        <p:cTn id="1" dur="indefinite" restart="never" nodeType="tmRoot">
+          <p:childTnLst>
+            <p:seq concurrent="1" nextAc="seek">
+              <p:cTn id="2" dur="indefinite" nodeType="mainSeq">
+                <p:childTnLst>
+                  <p:par>
+                    <p:cTn id="3" fill="hold">
+                      <p:stCondLst>
+                        <p:cond delay="indefinite"/>
+                      </p:stCondLst>
+                      <p:childTnLst>
+                        <p:par>
+                          <p:cTn id="4" fill="hold">
+                            <p:stCondLst>
+                              <p:cond delay="0"/>
+                            </p:stCondLst>
+                            <p:childTnLst>
+                              <p:par>
+                                <p:cTn id="5" presetID="10" presetClass="entr" presetSubtype="0" fill="hold" nodeType="clickEffect">
+                                  <p:stCondLst>
+                                    <p:cond delay="0"/>
+                                  </p:stCondLst>
+                                  <p:childTnLst>
+                                    <p:set>
+                                      <p:cBhvr>
+                                        <p:cTn id="6" dur="1" fill="hold">
+                                          <p:stCondLst>
+                                            <p:cond delay="0"/>
+                                          </p:stCondLst>
+                                        </p:cTn>
+                                        <p:tgtEl>
+                                          <p:spTgt spid="14"/>
+                                        </p:tgtEl>
+                                        <p:attrNameLst>
+                                          <p:attrName>style.visibility</p:attrName>
+                                        </p:attrNameLst>
+                                      </p:cBhvr>
+                                      <p:to>
+                                        <p:strVal val="visible"/>
+                                      </p:to>
+                                    </p:set>
+                                    <p:animEffect transition="in" filter="fade">
+                                      <p:cBhvr>
+                                        <p:cTn id="7" dur="500"/>
+                                        <p:tgtEl>
+                                          <p:spTgt spid="14"/>
+                                        </p:tgtEl>
+                                      </p:cBhvr>
+                                    </p:animEffect>
+                                  </p:childTnLst>
+                                </p:cTn>
+                              </p:par>
+                            </p:childTnLst>
+                          </p:cTn>
+                        </p:par>
+                      </p:childTnLst>
+                    </p:cTn>
+                  </p:par>
+                  <p:par>
+                    <p:cTn id="8" fill="hold">
+                      <p:stCondLst>
+                        <p:cond delay="indefinite"/>
+                      </p:stCondLst>
+                      <p:childTnLst>
+                        <p:par>
+                          <p:cTn id="9" fill="hold">
+                            <p:stCondLst>
+                              <p:cond delay="0"/>
+                            </p:stCondLst>
+                            <p:childTnLst>
+                              <p:par>
+                                <p:cTn id="10" presetID="1" presetClass="entr" presetSubtype="0" fill="hold" grpId="0" nodeType="clickEffect">
+                                  <p:stCondLst>
+                                    <p:cond delay="0"/>
+                                  </p:stCondLst>
+                                  <p:childTnLst>
+                                    <p:set>
+                                      <p:cBhvr>
+                                        <p:cTn id="11" dur="1" fill="hold">
+                                          <p:stCondLst>
+                                            <p:cond delay="0"/>
+                                          </p:stCondLst>
+                                        </p:cTn>
+                                        <p:tgtEl>
+                                          <p:spTgt spid="2">
+                                            <p:txEl>
+                                              <p:pRg st="0" end="0"/>
+                                            </p:txEl>
+                                          </p:spTgt>
+                                        </p:tgtEl>
+                                        <p:attrNameLst>
+                                          <p:attrName>style.visibility</p:attrName>
+                                        </p:attrNameLst>
+                                      </p:cBhvr>
+                                      <p:to>
+                                        <p:strVal val="visible"/>
+                                      </p:to>
+                                    </p:set>
+                                  </p:childTnLst>
+                                </p:cTn>
+                              </p:par>
+                            </p:childTnLst>
+                          </p:cTn>
+                        </p:par>
+                        <p:par>
+                          <p:cTn id="12" fill="hold">
+                            <p:stCondLst>
+                              <p:cond delay="0"/>
+                            </p:stCondLst>
+                            <p:childTnLst>
+                              <p:par>
+                                <p:cTn id="13" presetID="1" presetClass="entr" presetSubtype="0" fill="hold" grpId="0" nodeType="afterEffect">
+                                  <p:stCondLst>
+                                    <p:cond delay="0"/>
+                                  </p:stCondLst>
+                                  <p:childTnLst>
+                                    <p:set>
+                                      <p:cBhvr>
+                                        <p:cTn id="14" dur="1" fill="hold">
+                                          <p:stCondLst>
+                                            <p:cond delay="0"/>
+                                          </p:stCondLst>
+                                        </p:cTn>
+                                        <p:tgtEl>
+                                          <p:spTgt spid="2">
+                                            <p:txEl>
+                                              <p:pRg st="1" end="1"/>
+                                            </p:txEl>
+                                          </p:spTgt>
+                                        </p:tgtEl>
+                                        <p:attrNameLst>
+                                          <p:attrName>style.visibility</p:attrName>
+                                        </p:attrNameLst>
+                                      </p:cBhvr>
+                                      <p:to>
+                                        <p:strVal val="visible"/>
+                                      </p:to>
+                                    </p:set>
+                                  </p:childTnLst>
+                                </p:cTn>
+                              </p:par>
+                            </p:childTnLst>
+                          </p:cTn>
+                        </p:par>
+                        <p:par>
+                          <p:cTn id="15" fill="hold">
+                            <p:stCondLst>
+                              <p:cond delay="0"/>
+                            </p:stCondLst>
+                            <p:childTnLst>
+                              <p:par>
+                                <p:cTn id="16" presetID="1" presetClass="entr" presetSubtype="0" fill="hold" grpId="0" nodeType="afterEffect">
+                                  <p:stCondLst>
+                                    <p:cond delay="0"/>
+                                  </p:stCondLst>
+                                  <p:childTnLst>
+                                    <p:set>
+                                      <p:cBhvr>
+                                        <p:cTn id="17" dur="1" fill="hold">
+                                          <p:stCondLst>
+                                            <p:cond delay="0"/>
+                                          </p:stCondLst>
+                                        </p:cTn>
+                                        <p:tgtEl>
+                                          <p:spTgt spid="2">
+                                            <p:txEl>
+                                              <p:pRg st="2" end="2"/>
+                                            </p:txEl>
+                                          </p:spTgt>
+                                        </p:tgtEl>
+                                        <p:attrNameLst>
+                                          <p:attrName>style.visibility</p:attrName>
+                                        </p:attrNameLst>
+                                      </p:cBhvr>
+                                      <p:to>
+                                        <p:strVal val="visible"/>
+                                      </p:to>
+                                    </p:set>
+                                  </p:childTnLst>
+                                </p:cTn>
+                              </p:par>
+                            </p:childTnLst>
+                          </p:cTn>
+                        </p:par>
+                        <p:par>
+                          <p:cTn id="18" fill="hold">
+                            <p:stCondLst>
+                              <p:cond delay="0"/>
+                            </p:stCondLst>
+                            <p:childTnLst>
+                              <p:par>
+                                <p:cTn id="19" presetID="1" presetClass="entr" presetSubtype="0" fill="hold" grpId="0" nodeType="afterEffect">
+                                  <p:stCondLst>
+                                    <p:cond delay="0"/>
+                                  </p:stCondLst>
+                                  <p:childTnLst>
+                                    <p:set>
+                                      <p:cBhvr>
+                                        <p:cTn id="20" dur="1" fill="hold">
+                                          <p:stCondLst>
+                                            <p:cond delay="0"/>
+                                          </p:stCondLst>
+                                        </p:cTn>
+                                        <p:tgtEl>
+                                          <p:spTgt spid="2">
+                                            <p:txEl>
+                                              <p:pRg st="3" end="3"/>
+                                            </p:txEl>
+                                          </p:spTgt>
+                                        </p:tgtEl>
+                                        <p:attrNameLst>
+                                          <p:attrName>style.visibility</p:attrName>
+                                        </p:attrNameLst>
+                                      </p:cBhvr>
+                                      <p:to>
+                                        <p:strVal val="visible"/>
+                                      </p:to>
+                                    </p:set>
+                                  </p:childTnLst>
+                                </p:cTn>
+                              </p:par>
+                            </p:childTnLst>
+                          </p:cTn>
+                        </p:par>
+                        <p:par>
+                          <p:cTn id="21" fill="hold">
+                            <p:stCondLst>
+                              <p:cond delay="0"/>
+                            </p:stCondLst>
+                            <p:childTnLst>
+                              <p:par>
+                                <p:cTn id="22" presetID="1" presetClass="entr" presetSubtype="0" fill="hold" grpId="0" nodeType="afterEffect">
+                                  <p:stCondLst>
+                                    <p:cond delay="0"/>
+                                  </p:stCondLst>
+                                  <p:childTnLst>
+                                    <p:set>
+                                      <p:cBhvr>
+                                        <p:cTn id="23" dur="1" fill="hold">
+                                          <p:stCondLst>
+                                            <p:cond delay="0"/>
+                                          </p:stCondLst>
+                                        </p:cTn>
+                                        <p:tgtEl>
+                                          <p:spTgt spid="2">
+                                            <p:txEl>
+                                              <p:pRg st="4" end="4"/>
+                                            </p:txEl>
+                                          </p:spTgt>
+                                        </p:tgtEl>
+                                        <p:attrNameLst>
+                                          <p:attrName>style.visibility</p:attrName>
+                                        </p:attrNameLst>
+                                      </p:cBhvr>
+                                      <p:to>
+                                        <p:strVal val="visible"/>
+                                      </p:to>
+                                    </p:set>
+                                  </p:childTnLst>
+                                </p:cTn>
+                              </p:par>
+                            </p:childTnLst>
+                          </p:cTn>
+                        </p:par>
+                        <p:par>
+                          <p:cTn id="24" fill="hold">
+                            <p:stCondLst>
+                              <p:cond delay="0"/>
+                            </p:stCondLst>
+                            <p:childTnLst>
+                              <p:par>
+                                <p:cTn id="25" presetID="1" presetClass="entr" presetSubtype="0" fill="hold" grpId="0" nodeType="afterEffect">
+                                  <p:stCondLst>
+                                    <p:cond delay="0"/>
+                                  </p:stCondLst>
+                                  <p:childTnLst>
+                                    <p:set>
+                                      <p:cBhvr>
+                                        <p:cTn id="26" dur="1" fill="hold">
+                                          <p:stCondLst>
+                                            <p:cond delay="0"/>
+                                          </p:stCondLst>
+                                        </p:cTn>
+                                        <p:tgtEl>
+                                          <p:spTgt spid="2">
+                                            <p:txEl>
+                                              <p:pRg st="5" end="5"/>
+                                            </p:txEl>
+                                          </p:spTgt>
+                                        </p:tgtEl>
+                                        <p:attrNameLst>
+                                          <p:attrName>style.visibility</p:attrName>
+                                        </p:attrNameLst>
+                                      </p:cBhvr>
+                                      <p:to>
+                                        <p:strVal val="visible"/>
+                                      </p:to>
+                                    </p:set>
+                                  </p:childTnLst>
+                                </p:cTn>
+                              </p:par>
+                            </p:childTnLst>
+                          </p:cTn>
+                        </p:par>
+                      </p:childTnLst>
+                    </p:cTn>
+                  </p:par>
+                  <p:par>
+                    <p:cTn id="27" fill="hold">
+                      <p:stCondLst>
+                        <p:cond delay="indefinite"/>
+                      </p:stCondLst>
+                      <p:childTnLst>
+                        <p:par>
+                          <p:cTn id="28" fill="hold">
+                            <p:stCondLst>
+                              <p:cond delay="0"/>
+                            </p:stCondLst>
+                            <p:childTnLst>
+                              <p:par>
+                                <p:cTn id="29" presetID="26" presetClass="entr" presetSubtype="0" fill="hold" nodeType="clickEffect">
+                                  <p:stCondLst>
+                                    <p:cond delay="0"/>
+                                  </p:stCondLst>
+                                  <p:childTnLst>
+                                    <p:set>
+                                      <p:cBhvr>
+                                        <p:cTn id="30" dur="1" fill="hold">
+                                          <p:stCondLst>
+                                            <p:cond delay="0"/>
+                                          </p:stCondLst>
+                                        </p:cTn>
+                                        <p:tgtEl>
+                                          <p:spTgt spid="18"/>
+                                        </p:tgtEl>
+                                        <p:attrNameLst>
+                                          <p:attrName>style.visibility</p:attrName>
+                                        </p:attrNameLst>
+                                      </p:cBhvr>
+                                      <p:to>
+                                        <p:strVal val="visible"/>
+                                      </p:to>
+                                    </p:set>
+                                    <p:animEffect transition="in" filter="wipe(down)">
+                                      <p:cBhvr>
+                                        <p:cTn id="31" dur="580">
+                                          <p:stCondLst>
+                                            <p:cond delay="0"/>
+                                          </p:stCondLst>
+                                        </p:cTn>
+                                        <p:tgtEl>
+                                          <p:spTgt spid="18"/>
+                                        </p:tgtEl>
+                                      </p:cBhvr>
+                                    </p:animEffect>
+                                    <p:anim calcmode="lin" valueType="num">
+                                      <p:cBhvr>
+                                        <p:cTn id="32" dur="1822" tmFilter="0,0; 0.14,0.36; 0.43,0.73; 0.71,0.91; 1.0,1.0">
+                                          <p:stCondLst>
+                                            <p:cond delay="0"/>
+                                          </p:stCondLst>
+                                        </p:cTn>
+                                        <p:tgtEl>
+                                          <p:spTgt spid="18"/>
+                                        </p:tgtEl>
+                                        <p:attrNameLst>
+                                          <p:attrName>ppt_x</p:attrName>
+                                        </p:attrNameLst>
+                                      </p:cBhvr>
+                                      <p:tavLst>
+                                        <p:tav tm="0">
+                                          <p:val>
+                                            <p:strVal val="#ppt_x-0.25"/>
+                                          </p:val>
+                                        </p:tav>
+                                        <p:tav tm="100000">
+                                          <p:val>
+                                            <p:strVal val="#ppt_x"/>
+                                          </p:val>
+                                        </p:tav>
+                                      </p:tavLst>
+                                    </p:anim>
+                                    <p:anim calcmode="lin" valueType="num">
+                                      <p:cBhvr>
+                                        <p:cTn id="33" dur="664" tmFilter="0.0,0.0; 0.25,0.07; 0.50,0.2; 0.75,0.467; 1.0,1.0">
+                                          <p:stCondLst>
+                                            <p:cond delay="0"/>
+                                          </p:stCondLst>
+                                        </p:cTn>
+                                        <p:tgtEl>
+                                          <p:spTgt spid="18"/>
+                                        </p:tgtEl>
+                                        <p:attrNameLst>
+                                          <p:attrName>ppt_y</p:attrName>
+                                        </p:attrNameLst>
+                                      </p:cBhvr>
+                                      <p:tavLst>
+                                        <p:tav tm="0" fmla="#ppt_y-sin(pi*$)/3">
+                                          <p:val>
+                                            <p:fltVal val="0.5"/>
+                                          </p:val>
+                                        </p:tav>
+                                        <p:tav tm="100000">
+                                          <p:val>
+                                            <p:fltVal val="1"/>
+                                          </p:val>
+                                        </p:tav>
+                                      </p:tavLst>
+                                    </p:anim>
+                                    <p:anim calcmode="lin" valueType="num">
+                                      <p:cBhvr>
+                                        <p:cTn id="34" dur="664" tmFilter="0, 0; 0.125,0.2665; 0.25,0.4; 0.375,0.465; 0.5,0.5;  0.625,0.535; 0.75,0.6; 0.875,0.7335; 1,1">
+                                          <p:stCondLst>
+                                            <p:cond delay="664"/>
+                                          </p:stCondLst>
+                                        </p:cTn>
+                                        <p:tgtEl>
+                                          <p:spTgt spid="18"/>
+                                        </p:tgtEl>
+                                        <p:attrNameLst>
+                                          <p:attrName>ppt_y</p:attrName>
+                                        </p:attrNameLst>
+                                      </p:cBhvr>
+                                      <p:tavLst>
+                                        <p:tav tm="0" fmla="#ppt_y-sin(pi*$)/9">
+                                          <p:val>
+                                            <p:fltVal val="0"/>
+                                          </p:val>
+                                        </p:tav>
+                                        <p:tav tm="100000">
+                                          <p:val>
+                                            <p:fltVal val="1"/>
+                                          </p:val>
+                                        </p:tav>
+                                      </p:tavLst>
+                                    </p:anim>
+                                    <p:anim calcmode="lin" valueType="num">
+                                      <p:cBhvr>
+                                        <p:cTn id="35" dur="332" tmFilter="0, 0; 0.125,0.2665; 0.25,0.4; 0.375,0.465; 0.5,0.5;  0.625,0.535; 0.75,0.6; 0.875,0.7335; 1,1">
+                                          <p:stCondLst>
+                                            <p:cond delay="1324"/>
+                                          </p:stCondLst>
+                                        </p:cTn>
+                                        <p:tgtEl>
+                                          <p:spTgt spid="18"/>
+                                        </p:tgtEl>
+                                        <p:attrNameLst>
+                                          <p:attrName>ppt_y</p:attrName>
+                                        </p:attrNameLst>
+                                      </p:cBhvr>
+                                      <p:tavLst>
+                                        <p:tav tm="0" fmla="#ppt_y-sin(pi*$)/27">
+                                          <p:val>
+                                            <p:fltVal val="0"/>
+                                          </p:val>
+                                        </p:tav>
+                                        <p:tav tm="100000">
+                                          <p:val>
+                                            <p:fltVal val="1"/>
+                                          </p:val>
+                                        </p:tav>
+                                      </p:tavLst>
+                                    </p:anim>
+                                    <p:anim calcmode="lin" valueType="num">
+                                      <p:cBhvr>
+                                        <p:cTn id="36" dur="164" tmFilter="0, 0; 0.125,0.2665; 0.25,0.4; 0.375,0.465; 0.5,0.5;  0.625,0.535; 0.75,0.6; 0.875,0.7335; 1,1">
+                                          <p:stCondLst>
+                                            <p:cond delay="1656"/>
+                                          </p:stCondLst>
+                                        </p:cTn>
+                                        <p:tgtEl>
+                                          <p:spTgt spid="18"/>
+                                        </p:tgtEl>
+                                        <p:attrNameLst>
+                                          <p:attrName>ppt_y</p:attrName>
+                                        </p:attrNameLst>
+                                      </p:cBhvr>
+                                      <p:tavLst>
+                                        <p:tav tm="0" fmla="#ppt_y-sin(pi*$)/81">
+                                          <p:val>
+                                            <p:fltVal val="0"/>
+                                          </p:val>
+                                        </p:tav>
+                                        <p:tav tm="100000">
+                                          <p:val>
+                                            <p:fltVal val="1"/>
+                                          </p:val>
+                                        </p:tav>
+                                      </p:tavLst>
+                                    </p:anim>
+                                    <p:animScale>
+                                      <p:cBhvr>
+                                        <p:cTn id="37" dur="26">
+                                          <p:stCondLst>
+                                            <p:cond delay="650"/>
+                                          </p:stCondLst>
+                                        </p:cTn>
+                                        <p:tgtEl>
+                                          <p:spTgt spid="18"/>
+                                        </p:tgtEl>
+                                      </p:cBhvr>
+                                      <p:to x="100000" y="60000"/>
+                                    </p:animScale>
+                                    <p:animScale>
+                                      <p:cBhvr>
+                                        <p:cTn id="38" dur="166" decel="50000">
+                                          <p:stCondLst>
+                                            <p:cond delay="676"/>
+                                          </p:stCondLst>
+                                        </p:cTn>
+                                        <p:tgtEl>
+                                          <p:spTgt spid="18"/>
+                                        </p:tgtEl>
+                                      </p:cBhvr>
+                                      <p:to x="100000" y="100000"/>
+                                    </p:animScale>
+                                    <p:animScale>
+                                      <p:cBhvr>
+                                        <p:cTn id="39" dur="26">
+                                          <p:stCondLst>
+                                            <p:cond delay="1312"/>
+                                          </p:stCondLst>
+                                        </p:cTn>
+                                        <p:tgtEl>
+                                          <p:spTgt spid="18"/>
+                                        </p:tgtEl>
+                                      </p:cBhvr>
+                                      <p:to x="100000" y="80000"/>
+                                    </p:animScale>
+                                    <p:animScale>
+                                      <p:cBhvr>
+                                        <p:cTn id="40" dur="166" decel="50000">
+                                          <p:stCondLst>
+                                            <p:cond delay="1338"/>
+                                          </p:stCondLst>
+                                        </p:cTn>
+                                        <p:tgtEl>
+                                          <p:spTgt spid="18"/>
+                                        </p:tgtEl>
+                                      </p:cBhvr>
+                                      <p:to x="100000" y="100000"/>
+                                    </p:animScale>
+                                    <p:animScale>
+                                      <p:cBhvr>
+                                        <p:cTn id="41" dur="26">
+                                          <p:stCondLst>
+                                            <p:cond delay="1642"/>
+                                          </p:stCondLst>
+                                        </p:cTn>
+                                        <p:tgtEl>
+                                          <p:spTgt spid="18"/>
+                                        </p:tgtEl>
+                                      </p:cBhvr>
+                                      <p:to x="100000" y="90000"/>
+                                    </p:animScale>
+                                    <p:animScale>
+                                      <p:cBhvr>
+                                        <p:cTn id="42" dur="166" decel="50000">
+                                          <p:stCondLst>
+                                            <p:cond delay="1668"/>
+                                          </p:stCondLst>
+                                        </p:cTn>
+                                        <p:tgtEl>
+                                          <p:spTgt spid="18"/>
+                                        </p:tgtEl>
+                                      </p:cBhvr>
+                                      <p:to x="100000" y="100000"/>
+                                    </p:animScale>
+                                    <p:animScale>
+                                      <p:cBhvr>
+                                        <p:cTn id="43" dur="26">
+                                          <p:stCondLst>
+                                            <p:cond delay="1808"/>
+                                          </p:stCondLst>
+                                        </p:cTn>
+                                        <p:tgtEl>
+                                          <p:spTgt spid="18"/>
+                                        </p:tgtEl>
+                                      </p:cBhvr>
+                                      <p:to x="100000" y="95000"/>
+                                    </p:animScale>
+                                    <p:animScale>
+                                      <p:cBhvr>
+                                        <p:cTn id="44" dur="166" decel="50000">
+                                          <p:stCondLst>
+                                            <p:cond delay="1834"/>
+                                          </p:stCondLst>
+                                        </p:cTn>
+                                        <p:tgtEl>
+                                          <p:spTgt spid="18"/>
+                                        </p:tgtEl>
+                                      </p:cBhvr>
+                                      <p:to x="100000" y="100000"/>
+                                    </p:animScale>
+                                  </p:childTnLst>
+                                </p:cTn>
+                              </p:par>
+                            </p:childTnLst>
+                          </p:cTn>
+                        </p:par>
+                        <p:par>
+                          <p:cTn id="45" fill="hold">
+                            <p:stCondLst>
+                              <p:cond delay="2000"/>
+                            </p:stCondLst>
+                            <p:childTnLst>
+                              <p:par>
+                                <p:cTn id="46" presetID="10" presetClass="entr" presetSubtype="0" fill="hold" grpId="0" nodeType="afterEffect">
+                                  <p:stCondLst>
+                                    <p:cond delay="0"/>
+                                  </p:stCondLst>
+                                  <p:childTnLst>
+                                    <p:set>
+                                      <p:cBhvr>
+                                        <p:cTn id="47" dur="1" fill="hold">
+                                          <p:stCondLst>
+                                            <p:cond delay="0"/>
+                                          </p:stCondLst>
+                                        </p:cTn>
+                                        <p:tgtEl>
+                                          <p:spTgt spid="5"/>
+                                        </p:tgtEl>
+                                        <p:attrNameLst>
+                                          <p:attrName>style.visibility</p:attrName>
+                                        </p:attrNameLst>
+                                      </p:cBhvr>
+                                      <p:to>
+                                        <p:strVal val="visible"/>
+                                      </p:to>
+                                    </p:set>
+                                    <p:animEffect transition="in" filter="fade">
+                                      <p:cBhvr>
+                                        <p:cTn id="48" dur="500"/>
+                                        <p:tgtEl>
+                                          <p:spTgt spid="5"/>
+                                        </p:tgtEl>
+                                      </p:cBhvr>
+                                    </p:animEffect>
+                                  </p:childTnLst>
+                                </p:cTn>
+                              </p:par>
+                            </p:childTnLst>
+                          </p:cTn>
+                        </p:par>
+                      </p:childTnLst>
+                    </p:cTn>
+                  </p:par>
+                </p:childTnLst>
+              </p:cTn>
+              <p:prevCondLst>
+                <p:cond evt="onPrev" delay="0">
+                  <p:tgtEl>
+                    <p:sldTgt/>
+                  </p:tgtEl>
+                </p:cond>
+              </p:prevCondLst>
+              <p:nextCondLst>
+                <p:cond evt="onNext" delay="0">
+                  <p:tgtEl>
+                    <p:sldTgt/>
+                  </p:tgtEl>
+                </p:cond>
+              </p:nextCondLst>
+            </p:seq>
+          </p:childTnLst>
+        </p:cTn>
+      </p:par>
+    </p:tnLst>
+    <p:bldLst>
+      <p:bldP spid="2" grpId="0" uiExpand="1" build="p"/>
+      <p:bldP spid="5" grpId="0"/>
+    </p:bldLst>
+  </p:timing>
+</p:sld>
+</file>
+
+<file path=ppt/slides/slide11.xml><?xml version="1.0" encoding="utf-8"?>
 <p:sld xmlns:a="http://schemas.openxmlformats.org/drawingml/2006/main" xmlns:r="http://schemas.openxmlformats.org/officeDocument/2006/relationships" xmlns:p="http://schemas.openxmlformats.org/presentationml/2006/main">
   <p:cSld>
     <p:spTree>
@@ -8466,7 +9736,7 @@
 </p:sld>
 </file>
 
-<file path=ppt/slides/slide11.xml><?xml version="1.0" encoding="utf-8"?>
+<file path=ppt/slides/slide12.xml><?xml version="1.0" encoding="utf-8"?>
 <p:sld xmlns:a="http://schemas.openxmlformats.org/drawingml/2006/main" xmlns:r="http://schemas.openxmlformats.org/officeDocument/2006/relationships" xmlns:p="http://schemas.openxmlformats.org/presentationml/2006/main">
   <p:cSld>
     <p:spTree>
@@ -9274,7 +10544,26 @@
                   <a:latin typeface="Consolas" panose="020B0609020204030204" pitchFamily="49" charset="0"/>
                   <a:cs typeface="Consolas" panose="020B0609020204030204" pitchFamily="49" charset="0"/>
                 </a:rPr>
-                <a:t>.getJSON(</a:t>
+                <a:t>.getJSON</a:t>
+              </a:r>
+              <a:r>
+                <a:rPr lang="en-US" sz="2000" dirty="0" smtClean="0">
+                  <a:latin typeface="Consolas" panose="020B0609020204030204" pitchFamily="49" charset="0"/>
+                  <a:cs typeface="Consolas" panose="020B0609020204030204" pitchFamily="49" charset="0"/>
+                </a:rPr>
+                <a:t>(</a:t>
+              </a:r>
+              <a:r>
+                <a:rPr lang="en-US" sz="2000" dirty="0" smtClean="0">
+                  <a:solidFill>
+                    <a:schemeClr val="tx2">
+                      <a:lumMod val="90000"/>
+                    </a:schemeClr>
+                  </a:solidFill>
+                  <a:latin typeface="Consolas" panose="020B0609020204030204" pitchFamily="49" charset="0"/>
+                  <a:cs typeface="Consolas" panose="020B0609020204030204" pitchFamily="49" charset="0"/>
+                </a:rPr>
+                <a:t>"KadastroServiceHost.svc/Listartarefas</a:t>
               </a:r>
               <a:r>
                 <a:rPr lang="en-US" sz="2000" dirty="0">
@@ -9286,7 +10575,7 @@
                   <a:latin typeface="Consolas" panose="020B0609020204030204" pitchFamily="49" charset="0"/>
                   <a:cs typeface="Consolas" panose="020B0609020204030204" pitchFamily="49" charset="0"/>
                 </a:rPr>
-                <a:t>"/KadastroServiceHost.svc/Listartarefas/"</a:t>
+                <a:t>/"</a:t>
               </a:r>
               <a:r>
                 <a:rPr lang="en-US" sz="2000" dirty="0">
@@ -9903,7 +11192,7 @@
 </p:sld>
 </file>
 
-<file path=ppt/slides/slide12.xml><?xml version="1.0" encoding="utf-8"?>
+<file path=ppt/slides/slide13.xml><?xml version="1.0" encoding="utf-8"?>
 <p:sld xmlns:a="http://schemas.openxmlformats.org/drawingml/2006/main" xmlns:r="http://schemas.openxmlformats.org/officeDocument/2006/relationships" xmlns:p="http://schemas.openxmlformats.org/presentationml/2006/main">
   <p:cSld>
     <p:spTree>
@@ -10015,7 +11304,26 @@
                   <a:latin typeface="Consolas" panose="020B0609020204030204" pitchFamily="49" charset="0"/>
                   <a:cs typeface="Consolas" panose="020B0609020204030204" pitchFamily="49" charset="0"/>
                 </a:rPr>
-                <a:t>.getJSON(</a:t>
+                <a:t>.getJSON</a:t>
+              </a:r>
+              <a:r>
+                <a:rPr lang="en-US" sz="2000" dirty="0" smtClean="0">
+                  <a:latin typeface="Consolas" panose="020B0609020204030204" pitchFamily="49" charset="0"/>
+                  <a:cs typeface="Consolas" panose="020B0609020204030204" pitchFamily="49" charset="0"/>
+                </a:rPr>
+                <a:t>(</a:t>
+              </a:r>
+              <a:r>
+                <a:rPr lang="en-US" sz="2000" dirty="0" smtClean="0">
+                  <a:solidFill>
+                    <a:schemeClr val="tx2">
+                      <a:lumMod val="90000"/>
+                    </a:schemeClr>
+                  </a:solidFill>
+                  <a:latin typeface="Consolas" panose="020B0609020204030204" pitchFamily="49" charset="0"/>
+                  <a:cs typeface="Consolas" panose="020B0609020204030204" pitchFamily="49" charset="0"/>
+                </a:rPr>
+                <a:t>"KadastroServiceHost.svc/Listartarefas</a:t>
               </a:r>
               <a:r>
                 <a:rPr lang="en-US" sz="2000" dirty="0">
@@ -10027,7 +11335,7 @@
                   <a:latin typeface="Consolas" panose="020B0609020204030204" pitchFamily="49" charset="0"/>
                   <a:cs typeface="Consolas" panose="020B0609020204030204" pitchFamily="49" charset="0"/>
                 </a:rPr>
-                <a:t>"/KadastroServiceHost.svc/Listartarefas/"</a:t>
+                <a:t>/"</a:t>
               </a:r>
               <a:r>
                 <a:rPr lang="en-US" sz="2000" dirty="0">
@@ -11092,7 +12400,7 @@
 </p:sld>
 </file>
 
-<file path=ppt/slides/slide13.xml><?xml version="1.0" encoding="utf-8"?>
+<file path=ppt/slides/slide14.xml><?xml version="1.0" encoding="utf-8"?>
 <p:sld xmlns:a="http://schemas.openxmlformats.org/drawingml/2006/main" xmlns:r="http://schemas.openxmlformats.org/officeDocument/2006/relationships" xmlns:p="http://schemas.openxmlformats.org/presentationml/2006/main">
   <p:cSld>
     <p:spTree>
@@ -13066,7 +14374,7 @@
 </p:sld>
 </file>
 
-<file path=ppt/slides/slide14.xml><?xml version="1.0" encoding="utf-8"?>
+<file path=ppt/slides/slide15.xml><?xml version="1.0" encoding="utf-8"?>
 <p:sld xmlns:a="http://schemas.openxmlformats.org/drawingml/2006/main" xmlns:r="http://schemas.openxmlformats.org/officeDocument/2006/relationships" xmlns:p="http://schemas.openxmlformats.org/presentationml/2006/main">
   <p:cSld>
     <p:spTree>
@@ -13589,6 +14897,94 @@
           </p:txBody>
         </p:sp>
       </p:grpSp>
+      <p:sp>
+        <p:nvSpPr>
+          <p:cNvPr id="16" name="Curved Up Arrow 15"/>
+          <p:cNvSpPr/>
+          <p:nvPr/>
+        </p:nvSpPr>
+        <p:spPr>
+          <a:xfrm>
+            <a:off x="4728419" y="3025858"/>
+            <a:ext cx="2592288" cy="504056"/>
+          </a:xfrm>
+          <a:prstGeom prst="curvedUpArrow">
+            <a:avLst/>
+          </a:prstGeom>
+        </p:spPr>
+        <p:style>
+          <a:lnRef idx="2">
+            <a:schemeClr val="accent3">
+              <a:shade val="50000"/>
+            </a:schemeClr>
+          </a:lnRef>
+          <a:fillRef idx="1">
+            <a:schemeClr val="accent3"/>
+          </a:fillRef>
+          <a:effectRef idx="0">
+            <a:schemeClr val="accent3"/>
+          </a:effectRef>
+          <a:fontRef idx="minor">
+            <a:schemeClr val="lt1"/>
+          </a:fontRef>
+        </p:style>
+        <p:txBody>
+          <a:bodyPr rtlCol="0" anchor="ctr"/>
+          <a:lstStyle/>
+          <a:p>
+            <a:pPr algn="ctr"/>
+            <a:endParaRPr lang="en-US">
+              <a:solidFill>
+                <a:schemeClr val="tx1"/>
+              </a:solidFill>
+            </a:endParaRPr>
+          </a:p>
+        </p:txBody>
+      </p:sp>
+      <p:sp>
+        <p:nvSpPr>
+          <p:cNvPr id="17" name="Curved Up Arrow 16"/>
+          <p:cNvSpPr/>
+          <p:nvPr/>
+        </p:nvSpPr>
+        <p:spPr>
+          <a:xfrm>
+            <a:off x="7787174" y="3038215"/>
+            <a:ext cx="2592288" cy="504056"/>
+          </a:xfrm>
+          <a:prstGeom prst="curvedUpArrow">
+            <a:avLst/>
+          </a:prstGeom>
+        </p:spPr>
+        <p:style>
+          <a:lnRef idx="2">
+            <a:schemeClr val="accent3">
+              <a:shade val="50000"/>
+            </a:schemeClr>
+          </a:lnRef>
+          <a:fillRef idx="1">
+            <a:schemeClr val="accent3"/>
+          </a:fillRef>
+          <a:effectRef idx="0">
+            <a:schemeClr val="accent3"/>
+          </a:effectRef>
+          <a:fontRef idx="minor">
+            <a:schemeClr val="lt1"/>
+          </a:fontRef>
+        </p:style>
+        <p:txBody>
+          <a:bodyPr rtlCol="0" anchor="ctr"/>
+          <a:lstStyle/>
+          <a:p>
+            <a:pPr algn="ctr"/>
+            <a:endParaRPr lang="en-US">
+              <a:solidFill>
+                <a:schemeClr val="tx1"/>
+              </a:solidFill>
+            </a:endParaRPr>
+          </a:p>
+        </p:txBody>
+      </p:sp>
     </p:spTree>
     <p:extLst>
       <p:ext uri="{BB962C8B-B14F-4D97-AF65-F5344CB8AC3E}">
@@ -13704,6 +15100,51 @@
                       </p:childTnLst>
                     </p:cTn>
                   </p:par>
+                  <p:par>
+                    <p:cTn id="12" fill="hold">
+                      <p:stCondLst>
+                        <p:cond delay="indefinite"/>
+                      </p:stCondLst>
+                      <p:childTnLst>
+                        <p:par>
+                          <p:cTn id="13" fill="hold">
+                            <p:stCondLst>
+                              <p:cond delay="0"/>
+                            </p:stCondLst>
+                            <p:childTnLst>
+                              <p:par>
+                                <p:cTn id="14" presetID="1" presetClass="entr" presetSubtype="0" fill="hold" grpId="0" nodeType="clickEffect">
+                                  <p:stCondLst>
+                                    <p:cond delay="0"/>
+                                  </p:stCondLst>
+                                  <p:childTnLst>
+                                    <p:set>
+                                      <p:cBhvr>
+                                        <p:cTn id="15" dur="1" fill="hold">
+                                          <p:stCondLst>
+                                            <p:cond delay="0"/>
+                                          </p:stCondLst>
+                                        </p:cTn>
+                                        <p:tgtEl>
+                                          <p:spTgt spid="16"/>
+                                        </p:tgtEl>
+                                        <p:attrNameLst>
+                                          <p:attrName>style.visibility</p:attrName>
+                                        </p:attrNameLst>
+                                      </p:cBhvr>
+                                      <p:to>
+                                        <p:strVal val="visible"/>
+                                      </p:to>
+                                    </p:set>
+                                  </p:childTnLst>
+                                </p:cTn>
+                              </p:par>
+                            </p:childTnLst>
+                          </p:cTn>
+                        </p:par>
+                      </p:childTnLst>
+                    </p:cTn>
+                  </p:par>
                 </p:childTnLst>
               </p:cTn>
               <p:prevCondLst>
@@ -13725,11 +15166,14 @@
         </p:cTn>
       </p:par>
     </p:tnLst>
+    <p:bldLst>
+      <p:bldP spid="16" grpId="0" animBg="1"/>
+    </p:bldLst>
   </p:timing>
 </p:sld>
 </file>
 
-<file path=ppt/slides/slide15.xml><?xml version="1.0" encoding="utf-8"?>
+<file path=ppt/slides/slide16.xml><?xml version="1.0" encoding="utf-8"?>
 <p:sld xmlns:a="http://schemas.openxmlformats.org/drawingml/2006/main" xmlns:r="http://schemas.openxmlformats.org/officeDocument/2006/relationships" xmlns:p="http://schemas.openxmlformats.org/presentationml/2006/main">
   <p:cSld>
     <p:spTree>
@@ -14235,6 +15679,94 @@
           </p:txBody>
         </p:sp>
       </p:grpSp>
+      <p:sp>
+        <p:nvSpPr>
+          <p:cNvPr id="3" name="Curved Down Arrow 2"/>
+          <p:cNvSpPr/>
+          <p:nvPr/>
+        </p:nvSpPr>
+        <p:spPr>
+          <a:xfrm flipH="1">
+            <a:off x="7968208" y="5140931"/>
+            <a:ext cx="2275694" cy="432048"/>
+          </a:xfrm>
+          <a:prstGeom prst="curvedDownArrow">
+            <a:avLst/>
+          </a:prstGeom>
+        </p:spPr>
+        <p:style>
+          <a:lnRef idx="2">
+            <a:schemeClr val="accent3">
+              <a:shade val="50000"/>
+            </a:schemeClr>
+          </a:lnRef>
+          <a:fillRef idx="1">
+            <a:schemeClr val="accent3"/>
+          </a:fillRef>
+          <a:effectRef idx="0">
+            <a:schemeClr val="accent3"/>
+          </a:effectRef>
+          <a:fontRef idx="minor">
+            <a:schemeClr val="lt1"/>
+          </a:fontRef>
+        </p:style>
+        <p:txBody>
+          <a:bodyPr rtlCol="0" anchor="ctr"/>
+          <a:lstStyle/>
+          <a:p>
+            <a:pPr algn="ctr"/>
+            <a:endParaRPr lang="en-US">
+              <a:solidFill>
+                <a:schemeClr val="tx1"/>
+              </a:solidFill>
+            </a:endParaRPr>
+          </a:p>
+        </p:txBody>
+      </p:sp>
+      <p:sp>
+        <p:nvSpPr>
+          <p:cNvPr id="17" name="Curved Down Arrow 16"/>
+          <p:cNvSpPr/>
+          <p:nvPr/>
+        </p:nvSpPr>
+        <p:spPr>
+          <a:xfrm flipH="1">
+            <a:off x="5361639" y="5121188"/>
+            <a:ext cx="2275694" cy="432048"/>
+          </a:xfrm>
+          <a:prstGeom prst="curvedDownArrow">
+            <a:avLst/>
+          </a:prstGeom>
+        </p:spPr>
+        <p:style>
+          <a:lnRef idx="2">
+            <a:schemeClr val="accent3">
+              <a:shade val="50000"/>
+            </a:schemeClr>
+          </a:lnRef>
+          <a:fillRef idx="1">
+            <a:schemeClr val="accent3"/>
+          </a:fillRef>
+          <a:effectRef idx="0">
+            <a:schemeClr val="accent3"/>
+          </a:effectRef>
+          <a:fontRef idx="minor">
+            <a:schemeClr val="lt1"/>
+          </a:fontRef>
+        </p:style>
+        <p:txBody>
+          <a:bodyPr rtlCol="0" anchor="ctr"/>
+          <a:lstStyle/>
+          <a:p>
+            <a:pPr algn="ctr"/>
+            <a:endParaRPr lang="en-US">
+              <a:solidFill>
+                <a:schemeClr val="tx1"/>
+              </a:solidFill>
+            </a:endParaRPr>
+          </a:p>
+        </p:txBody>
+      </p:sp>
     </p:spTree>
     <p:extLst>
       <p:ext uri="{BB962C8B-B14F-4D97-AF65-F5344CB8AC3E}">
@@ -14350,6 +15882,51 @@
                       </p:childTnLst>
                     </p:cTn>
                   </p:par>
+                  <p:par>
+                    <p:cTn id="12" fill="hold">
+                      <p:stCondLst>
+                        <p:cond delay="indefinite"/>
+                      </p:stCondLst>
+                      <p:childTnLst>
+                        <p:par>
+                          <p:cTn id="13" fill="hold">
+                            <p:stCondLst>
+                              <p:cond delay="0"/>
+                            </p:stCondLst>
+                            <p:childTnLst>
+                              <p:par>
+                                <p:cTn id="14" presetID="1" presetClass="entr" presetSubtype="0" fill="hold" grpId="0" nodeType="clickEffect">
+                                  <p:stCondLst>
+                                    <p:cond delay="0"/>
+                                  </p:stCondLst>
+                                  <p:childTnLst>
+                                    <p:set>
+                                      <p:cBhvr>
+                                        <p:cTn id="15" dur="1" fill="hold">
+                                          <p:stCondLst>
+                                            <p:cond delay="0"/>
+                                          </p:stCondLst>
+                                        </p:cTn>
+                                        <p:tgtEl>
+                                          <p:spTgt spid="3"/>
+                                        </p:tgtEl>
+                                        <p:attrNameLst>
+                                          <p:attrName>style.visibility</p:attrName>
+                                        </p:attrNameLst>
+                                      </p:cBhvr>
+                                      <p:to>
+                                        <p:strVal val="visible"/>
+                                      </p:to>
+                                    </p:set>
+                                  </p:childTnLst>
+                                </p:cTn>
+                              </p:par>
+                            </p:childTnLst>
+                          </p:cTn>
+                        </p:par>
+                      </p:childTnLst>
+                    </p:cTn>
+                  </p:par>
                 </p:childTnLst>
               </p:cTn>
               <p:prevCondLst>
@@ -14371,11 +15948,14 @@
         </p:cTn>
       </p:par>
     </p:tnLst>
+    <p:bldLst>
+      <p:bldP spid="3" grpId="0" animBg="1"/>
+    </p:bldLst>
   </p:timing>
 </p:sld>
 </file>
 
-<file path=ppt/slides/slide16.xml><?xml version="1.0" encoding="utf-8"?>
+<file path=ppt/slides/slide17.xml><?xml version="1.0" encoding="utf-8"?>
 <p:sld xmlns:a="http://schemas.openxmlformats.org/drawingml/2006/main" xmlns:r="http://schemas.openxmlformats.org/officeDocument/2006/relationships" xmlns:p="http://schemas.openxmlformats.org/presentationml/2006/main">
   <p:cSld>
     <p:spTree>
@@ -19868,69 +21448,7 @@
       </p:grpSpPr>
       <p:sp>
         <p:nvSpPr>
-          <p:cNvPr id="2" name="Content Placeholder 1"/>
-          <p:cNvSpPr>
-            <a:spLocks noGrp="1"/>
-          </p:cNvSpPr>
-          <p:nvPr>
-            <p:ph idx="1"/>
-          </p:nvPr>
-        </p:nvSpPr>
-        <p:spPr>
-          <a:xfrm>
-            <a:off x="609600" y="1524000"/>
-            <a:ext cx="10972800" cy="3255039"/>
-          </a:xfrm>
-        </p:spPr>
-        <p:txBody>
-          <a:bodyPr/>
-          <a:lstStyle/>
-          <a:p>
-            <a:r>
-              <a:rPr lang="en-US" dirty="0" smtClean="0"/>
-              <a:t>Obter dados do Servidor</a:t>
-            </a:r>
-          </a:p>
-          <a:p>
-            <a:r>
-              <a:rPr lang="en-US" dirty="0" smtClean="0"/>
-              <a:t>Definir uma interface com o usuário</a:t>
-            </a:r>
-          </a:p>
-          <a:p>
-            <a:r>
-              <a:rPr lang="en-US" dirty="0" smtClean="0"/>
-              <a:t>Criar métodos para apresentação e manter os dados  (DOM)</a:t>
-            </a:r>
-          </a:p>
-          <a:p>
-            <a:r>
-              <a:rPr lang="en-US" dirty="0" smtClean="0"/>
-              <a:t>Criar métodos para manipular os dados (como reordenação da lista) </a:t>
-            </a:r>
-          </a:p>
-          <a:p>
-            <a:r>
-              <a:rPr lang="en-US" dirty="0"/>
-              <a:t>Criar métodos para validar os dados do </a:t>
-            </a:r>
-            <a:r>
-              <a:rPr lang="en-US" dirty="0" smtClean="0"/>
-              <a:t>usuário</a:t>
-            </a:r>
-          </a:p>
-          <a:p>
-            <a:r>
-              <a:rPr lang="en-US" dirty="0" smtClean="0"/>
-              <a:t>Criar métodos para persistir os dados</a:t>
-            </a:r>
-            <a:endParaRPr lang="en-US" dirty="0"/>
-          </a:p>
-        </p:txBody>
-      </p:sp>
-      <p:sp>
-        <p:nvSpPr>
-          <p:cNvPr id="3" name="Title 2"/>
+          <p:cNvPr id="2" name="Title 1"/>
           <p:cNvSpPr>
             <a:spLocks noGrp="1"/>
           </p:cNvSpPr>
@@ -19945,494 +21463,16 @@
           <a:p>
             <a:r>
               <a:rPr lang="en-US" dirty="0" smtClean="0"/>
-              <a:t>Apresentando </a:t>
-            </a:r>
-            <a:r>
-              <a:rPr lang="en-US" dirty="0"/>
-              <a:t>o primeiro exemplo</a:t>
-            </a:r>
-          </a:p>
-        </p:txBody>
-      </p:sp>
-      <p:grpSp>
-        <p:nvGrpSpPr>
-          <p:cNvPr id="14" name="Group 13"/>
-          <p:cNvGrpSpPr/>
-          <p:nvPr/>
-        </p:nvGrpSpPr>
-        <p:grpSpPr>
-          <a:xfrm rot="21045721">
-            <a:off x="7254337" y="3916895"/>
-            <a:ext cx="4464496" cy="2232248"/>
-            <a:chOff x="6960096" y="3753036"/>
-            <a:chExt cx="4464496" cy="2232248"/>
-          </a:xfrm>
-        </p:grpSpPr>
-        <p:sp>
-          <p:nvSpPr>
-            <p:cNvPr id="13" name="Snip Diagonal Corner Rectangle 12"/>
-            <p:cNvSpPr/>
-            <p:nvPr/>
-          </p:nvSpPr>
-          <p:spPr>
-            <a:xfrm>
-              <a:off x="6960096" y="3753036"/>
-              <a:ext cx="4464496" cy="2232248"/>
-            </a:xfrm>
-            <a:prstGeom prst="snip2DiagRect">
-              <a:avLst/>
-            </a:prstGeom>
-          </p:spPr>
-          <p:style>
-            <a:lnRef idx="3">
-              <a:schemeClr val="lt1"/>
-            </a:lnRef>
-            <a:fillRef idx="1">
-              <a:schemeClr val="accent2"/>
-            </a:fillRef>
-            <a:effectRef idx="1">
-              <a:schemeClr val="accent2"/>
-            </a:effectRef>
-            <a:fontRef idx="minor">
-              <a:schemeClr val="lt1"/>
-            </a:fontRef>
-          </p:style>
-          <p:txBody>
-            <a:bodyPr rtlCol="0" anchor="ctr"/>
-            <a:lstStyle/>
-            <a:p>
-              <a:pPr algn="ctr"/>
-              <a:endParaRPr lang="en-US"/>
-            </a:p>
-          </p:txBody>
-        </p:sp>
-        <p:grpSp>
-          <p:nvGrpSpPr>
-            <p:cNvPr id="12" name="Group 11"/>
-            <p:cNvGrpSpPr/>
-            <p:nvPr/>
-          </p:nvGrpSpPr>
-          <p:grpSpPr>
-            <a:xfrm>
-              <a:off x="7104112" y="3933056"/>
-              <a:ext cx="4176464" cy="1872208"/>
-              <a:chOff x="7104112" y="3933056"/>
-              <a:chExt cx="4176464" cy="1872208"/>
-            </a:xfrm>
-          </p:grpSpPr>
-          <p:sp>
-            <p:nvSpPr>
-              <p:cNvPr id="4" name="Folded Corner 3"/>
-              <p:cNvSpPr/>
-              <p:nvPr/>
-            </p:nvSpPr>
-            <p:spPr>
-              <a:xfrm>
-                <a:off x="7104112" y="3933056"/>
-                <a:ext cx="4176464" cy="1872208"/>
-              </a:xfrm>
-              <a:prstGeom prst="foldedCorner">
-                <a:avLst/>
-              </a:prstGeom>
-            </p:spPr>
-            <p:style>
-              <a:lnRef idx="2">
-                <a:schemeClr val="accent2"/>
-              </a:lnRef>
-              <a:fillRef idx="1">
-                <a:schemeClr val="lt1"/>
-              </a:fillRef>
-              <a:effectRef idx="0">
-                <a:schemeClr val="accent2"/>
-              </a:effectRef>
-              <a:fontRef idx="minor">
-                <a:schemeClr val="dk1"/>
-              </a:fontRef>
-            </p:style>
-            <p:txBody>
-              <a:bodyPr rtlCol="0" anchor="ctr"/>
-              <a:lstStyle/>
-              <a:p>
-                <a:pPr algn="r"/>
-                <a:endParaRPr lang="en-US" dirty="0">
-                  <a:latin typeface="Arial Black" panose="020B0A04020102020204" pitchFamily="34" charset="0"/>
-                </a:endParaRPr>
-              </a:p>
-            </p:txBody>
-          </p:sp>
-          <p:cxnSp>
-            <p:nvCxnSpPr>
-              <p:cNvPr id="6" name="Straight Connector 5"/>
-              <p:cNvCxnSpPr/>
-              <p:nvPr/>
-            </p:nvCxnSpPr>
-            <p:spPr>
-              <a:xfrm flipV="1">
-                <a:off x="7824192" y="4005064"/>
-                <a:ext cx="0" cy="1728192"/>
-              </a:xfrm>
-              <a:prstGeom prst="line">
-                <a:avLst/>
-              </a:prstGeom>
-              <a:ln>
-                <a:solidFill>
-                  <a:schemeClr val="accent2">
-                    <a:lumMod val="75000"/>
-                  </a:schemeClr>
-                </a:solidFill>
-              </a:ln>
-            </p:spPr>
-            <p:style>
-              <a:lnRef idx="1">
-                <a:schemeClr val="accent1"/>
-              </a:lnRef>
-              <a:fillRef idx="0">
-                <a:schemeClr val="accent1"/>
-              </a:fillRef>
-              <a:effectRef idx="0">
-                <a:schemeClr val="accent1"/>
-              </a:effectRef>
-              <a:fontRef idx="minor">
-                <a:schemeClr val="tx1"/>
-              </a:fontRef>
-            </p:style>
-          </p:cxnSp>
-          <p:cxnSp>
-            <p:nvCxnSpPr>
-              <p:cNvPr id="8" name="Straight Connector 7"/>
-              <p:cNvCxnSpPr/>
-              <p:nvPr/>
-            </p:nvCxnSpPr>
-            <p:spPr>
-              <a:xfrm>
-                <a:off x="7104112" y="5013176"/>
-                <a:ext cx="4176464" cy="0"/>
-              </a:xfrm>
-              <a:prstGeom prst="line">
-                <a:avLst/>
-              </a:prstGeom>
-              <a:ln>
-                <a:solidFill>
-                  <a:schemeClr val="accent6">
-                    <a:lumMod val="60000"/>
-                    <a:lumOff val="40000"/>
-                  </a:schemeClr>
-                </a:solidFill>
-              </a:ln>
-            </p:spPr>
-            <p:style>
-              <a:lnRef idx="1">
-                <a:schemeClr val="accent1"/>
-              </a:lnRef>
-              <a:fillRef idx="0">
-                <a:schemeClr val="accent1"/>
-              </a:fillRef>
-              <a:effectRef idx="0">
-                <a:schemeClr val="accent1"/>
-              </a:effectRef>
-              <a:fontRef idx="minor">
-                <a:schemeClr val="tx1"/>
-              </a:fontRef>
-            </p:style>
-          </p:cxnSp>
-          <p:sp>
-            <p:nvSpPr>
-              <p:cNvPr id="9" name="Rectangle 8"/>
-              <p:cNvSpPr/>
-              <p:nvPr/>
-            </p:nvSpPr>
-            <p:spPr>
-              <a:xfrm>
-                <a:off x="7320136" y="5229200"/>
-                <a:ext cx="288032" cy="288032"/>
-              </a:xfrm>
-              <a:prstGeom prst="rect">
-                <a:avLst/>
-              </a:prstGeom>
-              <a:solidFill>
-                <a:schemeClr val="tx1">
-                  <a:lumMod val="95000"/>
-                </a:schemeClr>
-              </a:solidFill>
-              <a:ln w="12700"/>
-            </p:spPr>
-            <p:style>
-              <a:lnRef idx="2">
-                <a:schemeClr val="dk1"/>
-              </a:lnRef>
-              <a:fillRef idx="1">
-                <a:schemeClr val="lt1"/>
-              </a:fillRef>
-              <a:effectRef idx="0">
-                <a:schemeClr val="dk1"/>
-              </a:effectRef>
-              <a:fontRef idx="minor">
-                <a:schemeClr val="dk1"/>
-              </a:fontRef>
-            </p:style>
-            <p:txBody>
-              <a:bodyPr rtlCol="0" anchor="ctr"/>
-              <a:lstStyle/>
-              <a:p>
-                <a:pPr algn="ctr"/>
-                <a:endParaRPr lang="en-US"/>
-              </a:p>
-            </p:txBody>
-          </p:sp>
-          <p:sp>
-            <p:nvSpPr>
-              <p:cNvPr id="10" name="TextBox 9"/>
-              <p:cNvSpPr txBox="1"/>
-              <p:nvPr/>
-            </p:nvSpPr>
-            <p:spPr>
-              <a:xfrm>
-                <a:off x="8041017" y="5157192"/>
-                <a:ext cx="2087431" cy="461665"/>
-              </a:xfrm>
-              <a:prstGeom prst="rect">
-                <a:avLst/>
-              </a:prstGeom>
-              <a:noFill/>
-            </p:spPr>
-            <p:txBody>
-              <a:bodyPr wrap="none" rtlCol="0">
-                <a:spAutoFit/>
-              </a:bodyPr>
-              <a:lstStyle/>
-              <a:p>
-                <a:r>
-                  <a:rPr lang="en-US" sz="2400" dirty="0" smtClean="0">
-                    <a:solidFill>
-                      <a:schemeClr val="bg1"/>
-                    </a:solidFill>
-                    <a:latin typeface="Corbel" panose="020B0503020204020204" pitchFamily="34" charset="0"/>
-                  </a:rPr>
-                  <a:t>Comprar pão...</a:t>
-                </a:r>
-                <a:endParaRPr lang="en-US" sz="2400" dirty="0">
-                  <a:solidFill>
-                    <a:schemeClr val="bg1"/>
-                  </a:solidFill>
-                  <a:latin typeface="Corbel" panose="020B0503020204020204" pitchFamily="34" charset="0"/>
-                </a:endParaRPr>
-              </a:p>
-            </p:txBody>
-          </p:sp>
-          <p:sp>
-            <p:nvSpPr>
-              <p:cNvPr id="11" name="TextBox 10"/>
-              <p:cNvSpPr txBox="1"/>
-              <p:nvPr/>
-            </p:nvSpPr>
-            <p:spPr>
-              <a:xfrm>
-                <a:off x="8040216" y="4390509"/>
-                <a:ext cx="3240360" cy="461665"/>
-              </a:xfrm>
-              <a:prstGeom prst="rect">
-                <a:avLst/>
-              </a:prstGeom>
-              <a:noFill/>
-            </p:spPr>
-            <p:txBody>
-              <a:bodyPr wrap="square" rtlCol="0">
-                <a:spAutoFit/>
-              </a:bodyPr>
-              <a:lstStyle/>
-              <a:p>
-                <a:r>
-                  <a:rPr lang="en-US" sz="2400" dirty="0" smtClean="0">
-                    <a:solidFill>
-                      <a:schemeClr val="accent1">
-                        <a:lumMod val="50000"/>
-                      </a:schemeClr>
-                    </a:solidFill>
-                    <a:latin typeface="Arial Black" panose="020B0A04020102020204" pitchFamily="34" charset="0"/>
-                  </a:rPr>
-                  <a:t>Lista de Tarefas</a:t>
-                </a:r>
-                <a:endParaRPr lang="en-US" sz="2400" dirty="0">
-                  <a:solidFill>
-                    <a:schemeClr val="accent1">
-                      <a:lumMod val="50000"/>
-                    </a:schemeClr>
-                  </a:solidFill>
-                  <a:latin typeface="Arial Black" panose="020B0A04020102020204" pitchFamily="34" charset="0"/>
-                </a:endParaRPr>
-              </a:p>
-            </p:txBody>
-          </p:sp>
-        </p:grpSp>
-      </p:grpSp>
-      <p:grpSp>
-        <p:nvGrpSpPr>
-          <p:cNvPr id="18" name="Group 17"/>
-          <p:cNvGrpSpPr/>
-          <p:nvPr/>
-        </p:nvGrpSpPr>
-        <p:grpSpPr>
-          <a:xfrm>
-            <a:off x="551384" y="5054515"/>
-            <a:ext cx="936104" cy="864096"/>
-            <a:chOff x="3287688" y="5445224"/>
-            <a:chExt cx="936104" cy="864096"/>
-          </a:xfrm>
-        </p:grpSpPr>
-        <p:sp>
-          <p:nvSpPr>
-            <p:cNvPr id="19" name="Oval 18"/>
-            <p:cNvSpPr/>
-            <p:nvPr/>
-          </p:nvSpPr>
-          <p:spPr>
-            <a:xfrm>
-              <a:off x="3287688" y="5445224"/>
-              <a:ext cx="936104" cy="864096"/>
-            </a:xfrm>
-            <a:prstGeom prst="ellipse">
-              <a:avLst/>
-            </a:prstGeom>
-            <a:solidFill>
-              <a:srgbClr val="EA3E3E"/>
-            </a:solidFill>
-            <a:ln>
-              <a:solidFill>
-                <a:schemeClr val="bg2">
-                  <a:lumMod val="75000"/>
-                </a:schemeClr>
-              </a:solidFill>
-            </a:ln>
-          </p:spPr>
-          <p:style>
-            <a:lnRef idx="2">
-              <a:schemeClr val="accent1">
-                <a:shade val="50000"/>
-              </a:schemeClr>
-            </a:lnRef>
-            <a:fillRef idx="1">
-              <a:schemeClr val="accent1"/>
-            </a:fillRef>
-            <a:effectRef idx="0">
-              <a:schemeClr val="accent1"/>
-            </a:effectRef>
-            <a:fontRef idx="minor">
-              <a:schemeClr val="lt1"/>
-            </a:fontRef>
-          </p:style>
-          <p:txBody>
-            <a:bodyPr rtlCol="0" anchor="ctr"/>
-            <a:lstStyle/>
-            <a:p>
-              <a:pPr algn="ctr"/>
-              <a:endParaRPr lang="en-US"/>
-            </a:p>
-          </p:txBody>
-        </p:sp>
-        <p:sp>
-          <p:nvSpPr>
-            <p:cNvPr id="20" name="Multiply 19"/>
-            <p:cNvSpPr/>
-            <p:nvPr/>
-          </p:nvSpPr>
-          <p:spPr>
-            <a:xfrm>
-              <a:off x="3359696" y="5506116"/>
-              <a:ext cx="792088" cy="742312"/>
-            </a:xfrm>
-            <a:prstGeom prst="mathMultiply">
-              <a:avLst/>
-            </a:prstGeom>
-            <a:ln>
-              <a:solidFill>
-                <a:schemeClr val="bg2">
-                  <a:lumMod val="75000"/>
-                </a:schemeClr>
-              </a:solidFill>
-            </a:ln>
-          </p:spPr>
-          <p:style>
-            <a:lnRef idx="2">
-              <a:schemeClr val="accent1"/>
-            </a:lnRef>
-            <a:fillRef idx="1">
-              <a:schemeClr val="lt1"/>
-            </a:fillRef>
-            <a:effectRef idx="0">
-              <a:schemeClr val="accent1"/>
-            </a:effectRef>
-            <a:fontRef idx="minor">
-              <a:schemeClr val="dk1"/>
-            </a:fontRef>
-          </p:style>
-          <p:txBody>
-            <a:bodyPr rtlCol="0" anchor="ctr"/>
-            <a:lstStyle/>
-            <a:p>
-              <a:pPr algn="ctr"/>
-              <a:endParaRPr lang="en-US"/>
-            </a:p>
-          </p:txBody>
-        </p:sp>
-      </p:grpSp>
-      <p:sp>
-        <p:nvSpPr>
-          <p:cNvPr id="5" name="TextBox 4"/>
-          <p:cNvSpPr txBox="1"/>
-          <p:nvPr/>
-        </p:nvSpPr>
-        <p:spPr>
-          <a:xfrm>
-            <a:off x="1685349" y="5068341"/>
-            <a:ext cx="5170859" cy="1384995"/>
-          </a:xfrm>
-          <a:prstGeom prst="rect">
-            <a:avLst/>
-          </a:prstGeom>
-          <a:noFill/>
-        </p:spPr>
-        <p:txBody>
-          <a:bodyPr wrap="square" rtlCol="0">
-            <a:spAutoFit/>
-          </a:bodyPr>
-          <a:lstStyle/>
-          <a:p>
-            <a:r>
-              <a:rPr lang="en-US" sz="2800" b="1" dirty="0" smtClean="0">
-                <a:solidFill>
-                  <a:srgbClr val="EA3E3E"/>
-                </a:solidFill>
-                <a:effectLst>
-                  <a:outerShdw blurRad="38100" dist="38100" dir="2700000" algn="tl">
-                    <a:srgbClr val="000000">
-                      <a:alpha val="43137"/>
-                    </a:srgbClr>
-                  </a:outerShdw>
-                </a:effectLst>
-                <a:latin typeface="Corbel" panose="020B0503020204020204" pitchFamily="34" charset="0"/>
-              </a:rPr>
-              <a:t>Sem a estrutura do KOjs, esses métodos podem ser bem desorganizados.</a:t>
-            </a:r>
-            <a:endParaRPr lang="en-US" sz="2800" b="1" dirty="0">
-              <a:solidFill>
-                <a:srgbClr val="EA3E3E"/>
-              </a:solidFill>
-              <a:effectLst>
-                <a:outerShdw blurRad="38100" dist="38100" dir="2700000" algn="tl">
-                  <a:srgbClr val="000000">
-                    <a:alpha val="43137"/>
-                  </a:srgbClr>
-                </a:outerShdw>
-              </a:effectLst>
-              <a:latin typeface="Corbel" panose="020B0503020204020204" pitchFamily="34" charset="0"/>
-            </a:endParaRPr>
+              <a:t>2.6 Instalação</a:t>
+            </a:r>
+            <a:endParaRPr lang="en-US" dirty="0"/>
           </a:p>
         </p:txBody>
       </p:sp>
     </p:spTree>
     <p:extLst>
       <p:ext uri="{BB962C8B-B14F-4D97-AF65-F5344CB8AC3E}">
-        <p14:creationId xmlns:p14="http://schemas.microsoft.com/office/powerpoint/2010/main" val="3705422472"/>
+        <p14:creationId xmlns:p14="http://schemas.microsoft.com/office/powerpoint/2010/main" val="4079616922"/>
       </p:ext>
     </p:extLst>
   </p:cSld>
@@ -20442,678 +21482,9 @@
   <p:timing>
     <p:tnLst>
       <p:par>
-        <p:cTn id="1" dur="indefinite" restart="never" nodeType="tmRoot">
-          <p:childTnLst>
-            <p:seq concurrent="1" nextAc="seek">
-              <p:cTn id="2" dur="indefinite" nodeType="mainSeq">
-                <p:childTnLst>
-                  <p:par>
-                    <p:cTn id="3" fill="hold">
-                      <p:stCondLst>
-                        <p:cond delay="indefinite"/>
-                      </p:stCondLst>
-                      <p:childTnLst>
-                        <p:par>
-                          <p:cTn id="4" fill="hold">
-                            <p:stCondLst>
-                              <p:cond delay="0"/>
-                            </p:stCondLst>
-                            <p:childTnLst>
-                              <p:par>
-                                <p:cTn id="5" presetID="10" presetClass="entr" presetSubtype="0" fill="hold" nodeType="clickEffect">
-                                  <p:stCondLst>
-                                    <p:cond delay="0"/>
-                                  </p:stCondLst>
-                                  <p:childTnLst>
-                                    <p:set>
-                                      <p:cBhvr>
-                                        <p:cTn id="6" dur="1" fill="hold">
-                                          <p:stCondLst>
-                                            <p:cond delay="0"/>
-                                          </p:stCondLst>
-                                        </p:cTn>
-                                        <p:tgtEl>
-                                          <p:spTgt spid="14"/>
-                                        </p:tgtEl>
-                                        <p:attrNameLst>
-                                          <p:attrName>style.visibility</p:attrName>
-                                        </p:attrNameLst>
-                                      </p:cBhvr>
-                                      <p:to>
-                                        <p:strVal val="visible"/>
-                                      </p:to>
-                                    </p:set>
-                                    <p:animEffect transition="in" filter="fade">
-                                      <p:cBhvr>
-                                        <p:cTn id="7" dur="500"/>
-                                        <p:tgtEl>
-                                          <p:spTgt spid="14"/>
-                                        </p:tgtEl>
-                                      </p:cBhvr>
-                                    </p:animEffect>
-                                  </p:childTnLst>
-                                </p:cTn>
-                              </p:par>
-                            </p:childTnLst>
-                          </p:cTn>
-                        </p:par>
-                      </p:childTnLst>
-                    </p:cTn>
-                  </p:par>
-                  <p:par>
-                    <p:cTn id="8" fill="hold">
-                      <p:stCondLst>
-                        <p:cond delay="indefinite"/>
-                      </p:stCondLst>
-                      <p:childTnLst>
-                        <p:par>
-                          <p:cTn id="9" fill="hold">
-                            <p:stCondLst>
-                              <p:cond delay="0"/>
-                            </p:stCondLst>
-                            <p:childTnLst>
-                              <p:par>
-                                <p:cTn id="10" presetID="1" presetClass="entr" presetSubtype="0" fill="hold" grpId="0" nodeType="clickEffect">
-                                  <p:stCondLst>
-                                    <p:cond delay="0"/>
-                                  </p:stCondLst>
-                                  <p:childTnLst>
-                                    <p:set>
-                                      <p:cBhvr>
-                                        <p:cTn id="11" dur="1" fill="hold">
-                                          <p:stCondLst>
-                                            <p:cond delay="0"/>
-                                          </p:stCondLst>
-                                        </p:cTn>
-                                        <p:tgtEl>
-                                          <p:spTgt spid="2">
-                                            <p:txEl>
-                                              <p:pRg st="0" end="0"/>
-                                            </p:txEl>
-                                          </p:spTgt>
-                                        </p:tgtEl>
-                                        <p:attrNameLst>
-                                          <p:attrName>style.visibility</p:attrName>
-                                        </p:attrNameLst>
-                                      </p:cBhvr>
-                                      <p:to>
-                                        <p:strVal val="visible"/>
-                                      </p:to>
-                                    </p:set>
-                                  </p:childTnLst>
-                                </p:cTn>
-                              </p:par>
-                            </p:childTnLst>
-                          </p:cTn>
-                        </p:par>
-                        <p:par>
-                          <p:cTn id="12" fill="hold">
-                            <p:stCondLst>
-                              <p:cond delay="0"/>
-                            </p:stCondLst>
-                            <p:childTnLst>
-                              <p:par>
-                                <p:cTn id="13" presetID="1" presetClass="entr" presetSubtype="0" fill="hold" grpId="0" nodeType="afterEffect">
-                                  <p:stCondLst>
-                                    <p:cond delay="0"/>
-                                  </p:stCondLst>
-                                  <p:childTnLst>
-                                    <p:set>
-                                      <p:cBhvr>
-                                        <p:cTn id="14" dur="1" fill="hold">
-                                          <p:stCondLst>
-                                            <p:cond delay="0"/>
-                                          </p:stCondLst>
-                                        </p:cTn>
-                                        <p:tgtEl>
-                                          <p:spTgt spid="2">
-                                            <p:txEl>
-                                              <p:pRg st="1" end="1"/>
-                                            </p:txEl>
-                                          </p:spTgt>
-                                        </p:tgtEl>
-                                        <p:attrNameLst>
-                                          <p:attrName>style.visibility</p:attrName>
-                                        </p:attrNameLst>
-                                      </p:cBhvr>
-                                      <p:to>
-                                        <p:strVal val="visible"/>
-                                      </p:to>
-                                    </p:set>
-                                  </p:childTnLst>
-                                </p:cTn>
-                              </p:par>
-                            </p:childTnLst>
-                          </p:cTn>
-                        </p:par>
-                        <p:par>
-                          <p:cTn id="15" fill="hold">
-                            <p:stCondLst>
-                              <p:cond delay="0"/>
-                            </p:stCondLst>
-                            <p:childTnLst>
-                              <p:par>
-                                <p:cTn id="16" presetID="1" presetClass="entr" presetSubtype="0" fill="hold" grpId="0" nodeType="afterEffect">
-                                  <p:stCondLst>
-                                    <p:cond delay="0"/>
-                                  </p:stCondLst>
-                                  <p:childTnLst>
-                                    <p:set>
-                                      <p:cBhvr>
-                                        <p:cTn id="17" dur="1" fill="hold">
-                                          <p:stCondLst>
-                                            <p:cond delay="0"/>
-                                          </p:stCondLst>
-                                        </p:cTn>
-                                        <p:tgtEl>
-                                          <p:spTgt spid="2">
-                                            <p:txEl>
-                                              <p:pRg st="2" end="2"/>
-                                            </p:txEl>
-                                          </p:spTgt>
-                                        </p:tgtEl>
-                                        <p:attrNameLst>
-                                          <p:attrName>style.visibility</p:attrName>
-                                        </p:attrNameLst>
-                                      </p:cBhvr>
-                                      <p:to>
-                                        <p:strVal val="visible"/>
-                                      </p:to>
-                                    </p:set>
-                                  </p:childTnLst>
-                                </p:cTn>
-                              </p:par>
-                            </p:childTnLst>
-                          </p:cTn>
-                        </p:par>
-                        <p:par>
-                          <p:cTn id="18" fill="hold">
-                            <p:stCondLst>
-                              <p:cond delay="0"/>
-                            </p:stCondLst>
-                            <p:childTnLst>
-                              <p:par>
-                                <p:cTn id="19" presetID="1" presetClass="entr" presetSubtype="0" fill="hold" grpId="0" nodeType="afterEffect">
-                                  <p:stCondLst>
-                                    <p:cond delay="0"/>
-                                  </p:stCondLst>
-                                  <p:childTnLst>
-                                    <p:set>
-                                      <p:cBhvr>
-                                        <p:cTn id="20" dur="1" fill="hold">
-                                          <p:stCondLst>
-                                            <p:cond delay="0"/>
-                                          </p:stCondLst>
-                                        </p:cTn>
-                                        <p:tgtEl>
-                                          <p:spTgt spid="2">
-                                            <p:txEl>
-                                              <p:pRg st="3" end="3"/>
-                                            </p:txEl>
-                                          </p:spTgt>
-                                        </p:tgtEl>
-                                        <p:attrNameLst>
-                                          <p:attrName>style.visibility</p:attrName>
-                                        </p:attrNameLst>
-                                      </p:cBhvr>
-                                      <p:to>
-                                        <p:strVal val="visible"/>
-                                      </p:to>
-                                    </p:set>
-                                  </p:childTnLst>
-                                </p:cTn>
-                              </p:par>
-                            </p:childTnLst>
-                          </p:cTn>
-                        </p:par>
-                        <p:par>
-                          <p:cTn id="21" fill="hold">
-                            <p:stCondLst>
-                              <p:cond delay="0"/>
-                            </p:stCondLst>
-                            <p:childTnLst>
-                              <p:par>
-                                <p:cTn id="22" presetID="1" presetClass="entr" presetSubtype="0" fill="hold" grpId="0" nodeType="afterEffect">
-                                  <p:stCondLst>
-                                    <p:cond delay="0"/>
-                                  </p:stCondLst>
-                                  <p:childTnLst>
-                                    <p:set>
-                                      <p:cBhvr>
-                                        <p:cTn id="23" dur="1" fill="hold">
-                                          <p:stCondLst>
-                                            <p:cond delay="0"/>
-                                          </p:stCondLst>
-                                        </p:cTn>
-                                        <p:tgtEl>
-                                          <p:spTgt spid="2">
-                                            <p:txEl>
-                                              <p:pRg st="4" end="4"/>
-                                            </p:txEl>
-                                          </p:spTgt>
-                                        </p:tgtEl>
-                                        <p:attrNameLst>
-                                          <p:attrName>style.visibility</p:attrName>
-                                        </p:attrNameLst>
-                                      </p:cBhvr>
-                                      <p:to>
-                                        <p:strVal val="visible"/>
-                                      </p:to>
-                                    </p:set>
-                                  </p:childTnLst>
-                                </p:cTn>
-                              </p:par>
-                            </p:childTnLst>
-                          </p:cTn>
-                        </p:par>
-                        <p:par>
-                          <p:cTn id="24" fill="hold">
-                            <p:stCondLst>
-                              <p:cond delay="0"/>
-                            </p:stCondLst>
-                            <p:childTnLst>
-                              <p:par>
-                                <p:cTn id="25" presetID="1" presetClass="entr" presetSubtype="0" fill="hold" grpId="0" nodeType="afterEffect">
-                                  <p:stCondLst>
-                                    <p:cond delay="0"/>
-                                  </p:stCondLst>
-                                  <p:childTnLst>
-                                    <p:set>
-                                      <p:cBhvr>
-                                        <p:cTn id="26" dur="1" fill="hold">
-                                          <p:stCondLst>
-                                            <p:cond delay="0"/>
-                                          </p:stCondLst>
-                                        </p:cTn>
-                                        <p:tgtEl>
-                                          <p:spTgt spid="2">
-                                            <p:txEl>
-                                              <p:pRg st="5" end="5"/>
-                                            </p:txEl>
-                                          </p:spTgt>
-                                        </p:tgtEl>
-                                        <p:attrNameLst>
-                                          <p:attrName>style.visibility</p:attrName>
-                                        </p:attrNameLst>
-                                      </p:cBhvr>
-                                      <p:to>
-                                        <p:strVal val="visible"/>
-                                      </p:to>
-                                    </p:set>
-                                  </p:childTnLst>
-                                </p:cTn>
-                              </p:par>
-                            </p:childTnLst>
-                          </p:cTn>
-                        </p:par>
-                      </p:childTnLst>
-                    </p:cTn>
-                  </p:par>
-                  <p:par>
-                    <p:cTn id="27" fill="hold">
-                      <p:stCondLst>
-                        <p:cond delay="indefinite"/>
-                      </p:stCondLst>
-                      <p:childTnLst>
-                        <p:par>
-                          <p:cTn id="28" fill="hold">
-                            <p:stCondLst>
-                              <p:cond delay="0"/>
-                            </p:stCondLst>
-                            <p:childTnLst>
-                              <p:par>
-                                <p:cTn id="29" presetID="26" presetClass="entr" presetSubtype="0" fill="hold" nodeType="clickEffect">
-                                  <p:stCondLst>
-                                    <p:cond delay="0"/>
-                                  </p:stCondLst>
-                                  <p:childTnLst>
-                                    <p:set>
-                                      <p:cBhvr>
-                                        <p:cTn id="30" dur="1" fill="hold">
-                                          <p:stCondLst>
-                                            <p:cond delay="0"/>
-                                          </p:stCondLst>
-                                        </p:cTn>
-                                        <p:tgtEl>
-                                          <p:spTgt spid="18"/>
-                                        </p:tgtEl>
-                                        <p:attrNameLst>
-                                          <p:attrName>style.visibility</p:attrName>
-                                        </p:attrNameLst>
-                                      </p:cBhvr>
-                                      <p:to>
-                                        <p:strVal val="visible"/>
-                                      </p:to>
-                                    </p:set>
-                                    <p:animEffect transition="in" filter="wipe(down)">
-                                      <p:cBhvr>
-                                        <p:cTn id="31" dur="580">
-                                          <p:stCondLst>
-                                            <p:cond delay="0"/>
-                                          </p:stCondLst>
-                                        </p:cTn>
-                                        <p:tgtEl>
-                                          <p:spTgt spid="18"/>
-                                        </p:tgtEl>
-                                      </p:cBhvr>
-                                    </p:animEffect>
-                                    <p:anim calcmode="lin" valueType="num">
-                                      <p:cBhvr>
-                                        <p:cTn id="32" dur="1822" tmFilter="0,0; 0.14,0.36; 0.43,0.73; 0.71,0.91; 1.0,1.0">
-                                          <p:stCondLst>
-                                            <p:cond delay="0"/>
-                                          </p:stCondLst>
-                                        </p:cTn>
-                                        <p:tgtEl>
-                                          <p:spTgt spid="18"/>
-                                        </p:tgtEl>
-                                        <p:attrNameLst>
-                                          <p:attrName>ppt_x</p:attrName>
-                                        </p:attrNameLst>
-                                      </p:cBhvr>
-                                      <p:tavLst>
-                                        <p:tav tm="0">
-                                          <p:val>
-                                            <p:strVal val="#ppt_x-0.25"/>
-                                          </p:val>
-                                        </p:tav>
-                                        <p:tav tm="100000">
-                                          <p:val>
-                                            <p:strVal val="#ppt_x"/>
-                                          </p:val>
-                                        </p:tav>
-                                      </p:tavLst>
-                                    </p:anim>
-                                    <p:anim calcmode="lin" valueType="num">
-                                      <p:cBhvr>
-                                        <p:cTn id="33" dur="664" tmFilter="0.0,0.0; 0.25,0.07; 0.50,0.2; 0.75,0.467; 1.0,1.0">
-                                          <p:stCondLst>
-                                            <p:cond delay="0"/>
-                                          </p:stCondLst>
-                                        </p:cTn>
-                                        <p:tgtEl>
-                                          <p:spTgt spid="18"/>
-                                        </p:tgtEl>
-                                        <p:attrNameLst>
-                                          <p:attrName>ppt_y</p:attrName>
-                                        </p:attrNameLst>
-                                      </p:cBhvr>
-                                      <p:tavLst>
-                                        <p:tav tm="0" fmla="#ppt_y-sin(pi*$)/3">
-                                          <p:val>
-                                            <p:fltVal val="0.5"/>
-                                          </p:val>
-                                        </p:tav>
-                                        <p:tav tm="100000">
-                                          <p:val>
-                                            <p:fltVal val="1"/>
-                                          </p:val>
-                                        </p:tav>
-                                      </p:tavLst>
-                                    </p:anim>
-                                    <p:anim calcmode="lin" valueType="num">
-                                      <p:cBhvr>
-                                        <p:cTn id="34" dur="664" tmFilter="0, 0; 0.125,0.2665; 0.25,0.4; 0.375,0.465; 0.5,0.5;  0.625,0.535; 0.75,0.6; 0.875,0.7335; 1,1">
-                                          <p:stCondLst>
-                                            <p:cond delay="664"/>
-                                          </p:stCondLst>
-                                        </p:cTn>
-                                        <p:tgtEl>
-                                          <p:spTgt spid="18"/>
-                                        </p:tgtEl>
-                                        <p:attrNameLst>
-                                          <p:attrName>ppt_y</p:attrName>
-                                        </p:attrNameLst>
-                                      </p:cBhvr>
-                                      <p:tavLst>
-                                        <p:tav tm="0" fmla="#ppt_y-sin(pi*$)/9">
-                                          <p:val>
-                                            <p:fltVal val="0"/>
-                                          </p:val>
-                                        </p:tav>
-                                        <p:tav tm="100000">
-                                          <p:val>
-                                            <p:fltVal val="1"/>
-                                          </p:val>
-                                        </p:tav>
-                                      </p:tavLst>
-                                    </p:anim>
-                                    <p:anim calcmode="lin" valueType="num">
-                                      <p:cBhvr>
-                                        <p:cTn id="35" dur="332" tmFilter="0, 0; 0.125,0.2665; 0.25,0.4; 0.375,0.465; 0.5,0.5;  0.625,0.535; 0.75,0.6; 0.875,0.7335; 1,1">
-                                          <p:stCondLst>
-                                            <p:cond delay="1324"/>
-                                          </p:stCondLst>
-                                        </p:cTn>
-                                        <p:tgtEl>
-                                          <p:spTgt spid="18"/>
-                                        </p:tgtEl>
-                                        <p:attrNameLst>
-                                          <p:attrName>ppt_y</p:attrName>
-                                        </p:attrNameLst>
-                                      </p:cBhvr>
-                                      <p:tavLst>
-                                        <p:tav tm="0" fmla="#ppt_y-sin(pi*$)/27">
-                                          <p:val>
-                                            <p:fltVal val="0"/>
-                                          </p:val>
-                                        </p:tav>
-                                        <p:tav tm="100000">
-                                          <p:val>
-                                            <p:fltVal val="1"/>
-                                          </p:val>
-                                        </p:tav>
-                                      </p:tavLst>
-                                    </p:anim>
-                                    <p:anim calcmode="lin" valueType="num">
-                                      <p:cBhvr>
-                                        <p:cTn id="36" dur="164" tmFilter="0, 0; 0.125,0.2665; 0.25,0.4; 0.375,0.465; 0.5,0.5;  0.625,0.535; 0.75,0.6; 0.875,0.7335; 1,1">
-                                          <p:stCondLst>
-                                            <p:cond delay="1656"/>
-                                          </p:stCondLst>
-                                        </p:cTn>
-                                        <p:tgtEl>
-                                          <p:spTgt spid="18"/>
-                                        </p:tgtEl>
-                                        <p:attrNameLst>
-                                          <p:attrName>ppt_y</p:attrName>
-                                        </p:attrNameLst>
-                                      </p:cBhvr>
-                                      <p:tavLst>
-                                        <p:tav tm="0" fmla="#ppt_y-sin(pi*$)/81">
-                                          <p:val>
-                                            <p:fltVal val="0"/>
-                                          </p:val>
-                                        </p:tav>
-                                        <p:tav tm="100000">
-                                          <p:val>
-                                            <p:fltVal val="1"/>
-                                          </p:val>
-                                        </p:tav>
-                                      </p:tavLst>
-                                    </p:anim>
-                                    <p:animScale>
-                                      <p:cBhvr>
-                                        <p:cTn id="37" dur="26">
-                                          <p:stCondLst>
-                                            <p:cond delay="650"/>
-                                          </p:stCondLst>
-                                        </p:cTn>
-                                        <p:tgtEl>
-                                          <p:spTgt spid="18"/>
-                                        </p:tgtEl>
-                                      </p:cBhvr>
-                                      <p:to x="100000" y="60000"/>
-                                    </p:animScale>
-                                    <p:animScale>
-                                      <p:cBhvr>
-                                        <p:cTn id="38" dur="166" decel="50000">
-                                          <p:stCondLst>
-                                            <p:cond delay="676"/>
-                                          </p:stCondLst>
-                                        </p:cTn>
-                                        <p:tgtEl>
-                                          <p:spTgt spid="18"/>
-                                        </p:tgtEl>
-                                      </p:cBhvr>
-                                      <p:to x="100000" y="100000"/>
-                                    </p:animScale>
-                                    <p:animScale>
-                                      <p:cBhvr>
-                                        <p:cTn id="39" dur="26">
-                                          <p:stCondLst>
-                                            <p:cond delay="1312"/>
-                                          </p:stCondLst>
-                                        </p:cTn>
-                                        <p:tgtEl>
-                                          <p:spTgt spid="18"/>
-                                        </p:tgtEl>
-                                      </p:cBhvr>
-                                      <p:to x="100000" y="80000"/>
-                                    </p:animScale>
-                                    <p:animScale>
-                                      <p:cBhvr>
-                                        <p:cTn id="40" dur="166" decel="50000">
-                                          <p:stCondLst>
-                                            <p:cond delay="1338"/>
-                                          </p:stCondLst>
-                                        </p:cTn>
-                                        <p:tgtEl>
-                                          <p:spTgt spid="18"/>
-                                        </p:tgtEl>
-                                      </p:cBhvr>
-                                      <p:to x="100000" y="100000"/>
-                                    </p:animScale>
-                                    <p:animScale>
-                                      <p:cBhvr>
-                                        <p:cTn id="41" dur="26">
-                                          <p:stCondLst>
-                                            <p:cond delay="1642"/>
-                                          </p:stCondLst>
-                                        </p:cTn>
-                                        <p:tgtEl>
-                                          <p:spTgt spid="18"/>
-                                        </p:tgtEl>
-                                      </p:cBhvr>
-                                      <p:to x="100000" y="90000"/>
-                                    </p:animScale>
-                                    <p:animScale>
-                                      <p:cBhvr>
-                                        <p:cTn id="42" dur="166" decel="50000">
-                                          <p:stCondLst>
-                                            <p:cond delay="1668"/>
-                                          </p:stCondLst>
-                                        </p:cTn>
-                                        <p:tgtEl>
-                                          <p:spTgt spid="18"/>
-                                        </p:tgtEl>
-                                      </p:cBhvr>
-                                      <p:to x="100000" y="100000"/>
-                                    </p:animScale>
-                                    <p:animScale>
-                                      <p:cBhvr>
-                                        <p:cTn id="43" dur="26">
-                                          <p:stCondLst>
-                                            <p:cond delay="1808"/>
-                                          </p:stCondLst>
-                                        </p:cTn>
-                                        <p:tgtEl>
-                                          <p:spTgt spid="18"/>
-                                        </p:tgtEl>
-                                      </p:cBhvr>
-                                      <p:to x="100000" y="95000"/>
-                                    </p:animScale>
-                                    <p:animScale>
-                                      <p:cBhvr>
-                                        <p:cTn id="44" dur="166" decel="50000">
-                                          <p:stCondLst>
-                                            <p:cond delay="1834"/>
-                                          </p:stCondLst>
-                                        </p:cTn>
-                                        <p:tgtEl>
-                                          <p:spTgt spid="18"/>
-                                        </p:tgtEl>
-                                      </p:cBhvr>
-                                      <p:to x="100000" y="100000"/>
-                                    </p:animScale>
-                                  </p:childTnLst>
-                                </p:cTn>
-                              </p:par>
-                            </p:childTnLst>
-                          </p:cTn>
-                        </p:par>
-                        <p:par>
-                          <p:cTn id="45" fill="hold">
-                            <p:stCondLst>
-                              <p:cond delay="2000"/>
-                            </p:stCondLst>
-                            <p:childTnLst>
-                              <p:par>
-                                <p:cTn id="46" presetID="10" presetClass="entr" presetSubtype="0" fill="hold" grpId="0" nodeType="afterEffect">
-                                  <p:stCondLst>
-                                    <p:cond delay="0"/>
-                                  </p:stCondLst>
-                                  <p:childTnLst>
-                                    <p:set>
-                                      <p:cBhvr>
-                                        <p:cTn id="47" dur="1" fill="hold">
-                                          <p:stCondLst>
-                                            <p:cond delay="0"/>
-                                          </p:stCondLst>
-                                        </p:cTn>
-                                        <p:tgtEl>
-                                          <p:spTgt spid="5"/>
-                                        </p:tgtEl>
-                                        <p:attrNameLst>
-                                          <p:attrName>style.visibility</p:attrName>
-                                        </p:attrNameLst>
-                                      </p:cBhvr>
-                                      <p:to>
-                                        <p:strVal val="visible"/>
-                                      </p:to>
-                                    </p:set>
-                                    <p:animEffect transition="in" filter="fade">
-                                      <p:cBhvr>
-                                        <p:cTn id="48" dur="500"/>
-                                        <p:tgtEl>
-                                          <p:spTgt spid="5"/>
-                                        </p:tgtEl>
-                                      </p:cBhvr>
-                                    </p:animEffect>
-                                  </p:childTnLst>
-                                </p:cTn>
-                              </p:par>
-                            </p:childTnLst>
-                          </p:cTn>
-                        </p:par>
-                      </p:childTnLst>
-                    </p:cTn>
-                  </p:par>
-                </p:childTnLst>
-              </p:cTn>
-              <p:prevCondLst>
-                <p:cond evt="onPrev" delay="0">
-                  <p:tgtEl>
-                    <p:sldTgt/>
-                  </p:tgtEl>
-                </p:cond>
-              </p:prevCondLst>
-              <p:nextCondLst>
-                <p:cond evt="onNext" delay="0">
-                  <p:tgtEl>
-                    <p:sldTgt/>
-                  </p:tgtEl>
-                </p:cond>
-              </p:nextCondLst>
-            </p:seq>
-          </p:childTnLst>
-        </p:cTn>
+        <p:cTn id="1" dur="indefinite" restart="never" nodeType="tmRoot"/>
       </p:par>
     </p:tnLst>
-    <p:bldLst>
-      <p:bldP spid="2" grpId="0" uiExpand="1" build="p"/>
-      <p:bldP spid="5" grpId="0"/>
-    </p:bldLst>
   </p:timing>
 </p:sld>
 </file>

</xml_diff>

<commit_message>
Observable para boolean executar
</commit_message>
<xml_diff>
--- a/Apresentacao.Knockout.JS/Knockout.JS.2014.04.pptx
+++ b/Apresentacao.Knockout.JS/Knockout.JS.2014.04.pptx
@@ -21128,7 +21128,12 @@
             <p:ph idx="1"/>
           </p:nvPr>
         </p:nvSpPr>
-        <p:spPr/>
+        <p:spPr>
+          <a:xfrm>
+            <a:off x="609600" y="1524000"/>
+            <a:ext cx="10972800" cy="2985120"/>
+          </a:xfrm>
+        </p:spPr>
         <p:txBody>
           <a:bodyPr/>
           <a:lstStyle/>
@@ -21211,6 +21216,67 @@
               <a:t>2.5 Mais conceitos chaves do KOjs</a:t>
             </a:r>
             <a:endParaRPr lang="en-US" dirty="0"/>
+          </a:p>
+        </p:txBody>
+      </p:sp>
+      <p:sp>
+        <p:nvSpPr>
+          <p:cNvPr id="4" name="TextBox 3"/>
+          <p:cNvSpPr txBox="1"/>
+          <p:nvPr/>
+        </p:nvSpPr>
+        <p:spPr>
+          <a:xfrm>
+            <a:off x="983432" y="4694893"/>
+            <a:ext cx="10598968" cy="1569660"/>
+          </a:xfrm>
+          <a:prstGeom prst="rect">
+            <a:avLst/>
+          </a:prstGeom>
+          <a:noFill/>
+        </p:spPr>
+        <p:txBody>
+          <a:bodyPr wrap="square" rtlCol="0">
+            <a:spAutoFit/>
+          </a:bodyPr>
+          <a:lstStyle/>
+          <a:p>
+            <a:r>
+              <a:rPr lang="en-US" sz="2400" dirty="0"/>
+              <a:t>Esses são os conceitos que devemos aprender para trabalhar com o KO, são os sistemas de </a:t>
+            </a:r>
+            <a:r>
+              <a:rPr lang="en-US" sz="2400" dirty="0" smtClean="0"/>
+              <a:t>“Bindings</a:t>
+            </a:r>
+            <a:r>
+              <a:rPr lang="en-US" sz="2400" dirty="0"/>
+              <a:t>" e como usa-los nos </a:t>
+            </a:r>
+            <a:r>
+              <a:rPr lang="en-US" sz="2400" dirty="0" smtClean="0"/>
+              <a:t>“Templates</a:t>
+            </a:r>
+            <a:r>
+              <a:rPr lang="en-US" sz="2400" dirty="0"/>
+              <a:t>" e o </a:t>
+            </a:r>
+            <a:r>
+              <a:rPr lang="en-US" sz="2400" dirty="0" smtClean="0"/>
+              <a:t>“Dependency Tracking” </a:t>
+            </a:r>
+            <a:r>
+              <a:rPr lang="en-US" sz="2400" dirty="0"/>
+              <a:t>que é utilizado para atualizar a inteface com o usuário </a:t>
+            </a:r>
+            <a:r>
+              <a:rPr lang="en-US" sz="2400" dirty="0" smtClean="0"/>
+              <a:t>através </a:t>
+            </a:r>
+            <a:r>
+              <a:rPr lang="en-US" sz="2400" dirty="0"/>
+              <a:t>dos bindings.</a:t>
+            </a:r>
           </a:p>
         </p:txBody>
       </p:sp>
@@ -21398,6 +21464,42 @@
                             </p:childTnLst>
                           </p:cTn>
                         </p:par>
+                        <p:par>
+                          <p:cTn id="16" fill="hold">
+                            <p:stCondLst>
+                              <p:cond delay="0"/>
+                            </p:stCondLst>
+                            <p:childTnLst>
+                              <p:par>
+                                <p:cTn id="17" presetID="1" presetClass="entr" presetSubtype="0" fill="hold" grpId="0" nodeType="afterEffect">
+                                  <p:stCondLst>
+                                    <p:cond delay="0"/>
+                                  </p:stCondLst>
+                                  <p:childTnLst>
+                                    <p:set>
+                                      <p:cBhvr>
+                                        <p:cTn id="18" dur="1" fill="hold">
+                                          <p:stCondLst>
+                                            <p:cond delay="0"/>
+                                          </p:stCondLst>
+                                        </p:cTn>
+                                        <p:tgtEl>
+                                          <p:spTgt spid="4"/>
+                                        </p:tgtEl>
+                                        <p:attrNameLst>
+                                          <p:attrName>style.visibility</p:attrName>
+                                        </p:attrNameLst>
+                                      </p:cBhvr>
+                                      <p:to>
+                                        <p:strVal val="visible"/>
+                                      </p:to>
+                                    </p:set>
+                                  </p:childTnLst>
+                                </p:cTn>
+                              </p:par>
+                            </p:childTnLst>
+                          </p:cTn>
+                        </p:par>
                       </p:childTnLst>
                     </p:cTn>
                   </p:par>
@@ -21424,6 +21526,7 @@
     </p:tnLst>
     <p:bldLst>
       <p:bldP spid="2" grpId="0" uiExpand="1" build="p"/>
+      <p:bldP spid="4" grpId="0"/>
     </p:bldLst>
   </p:timing>
 </p:sld>
@@ -21469,6 +21572,780 @@
           </a:p>
         </p:txBody>
       </p:sp>
+      <p:grpSp>
+        <p:nvGrpSpPr>
+          <p:cNvPr id="10" name="Group 9"/>
+          <p:cNvGrpSpPr/>
+          <p:nvPr/>
+        </p:nvGrpSpPr>
+        <p:grpSpPr>
+          <a:xfrm>
+            <a:off x="839417" y="1557338"/>
+            <a:ext cx="4320480" cy="1592887"/>
+            <a:chOff x="479378" y="1557338"/>
+            <a:chExt cx="4320480" cy="1592887"/>
+          </a:xfrm>
+        </p:grpSpPr>
+        <p:grpSp>
+          <p:nvGrpSpPr>
+            <p:cNvPr id="4" name="Group 3"/>
+            <p:cNvGrpSpPr/>
+            <p:nvPr/>
+          </p:nvGrpSpPr>
+          <p:grpSpPr>
+            <a:xfrm>
+              <a:off x="479378" y="1557338"/>
+              <a:ext cx="4320480" cy="1592887"/>
+              <a:chOff x="4367809" y="1620089"/>
+              <a:chExt cx="4320480" cy="1592887"/>
+            </a:xfrm>
+          </p:grpSpPr>
+          <p:sp>
+            <p:nvSpPr>
+              <p:cNvPr id="5" name="Rounded Rectangle 4"/>
+              <p:cNvSpPr/>
+              <p:nvPr/>
+            </p:nvSpPr>
+            <p:spPr>
+              <a:xfrm>
+                <a:off x="4367809" y="2132856"/>
+                <a:ext cx="4320480" cy="1080120"/>
+              </a:xfrm>
+              <a:prstGeom prst="roundRect">
+                <a:avLst/>
+              </a:prstGeom>
+              <a:solidFill>
+                <a:schemeClr val="bg2">
+                  <a:lumMod val="75000"/>
+                </a:schemeClr>
+              </a:solidFill>
+              <a:ln>
+                <a:noFill/>
+              </a:ln>
+            </p:spPr>
+            <p:style>
+              <a:lnRef idx="2">
+                <a:schemeClr val="accent1">
+                  <a:shade val="50000"/>
+                </a:schemeClr>
+              </a:lnRef>
+              <a:fillRef idx="1">
+                <a:schemeClr val="accent1"/>
+              </a:fillRef>
+              <a:effectRef idx="0">
+                <a:schemeClr val="accent1"/>
+              </a:effectRef>
+              <a:fontRef idx="minor">
+                <a:schemeClr val="lt1"/>
+              </a:fontRef>
+            </p:style>
+            <p:txBody>
+              <a:bodyPr rtlCol="0" anchor="ctr"/>
+              <a:lstStyle/>
+              <a:p>
+                <a:pPr algn="ctr"/>
+                <a:endParaRPr lang="en-US"/>
+              </a:p>
+            </p:txBody>
+          </p:sp>
+          <p:sp>
+            <p:nvSpPr>
+              <p:cNvPr id="6" name="Rounded Rectangle 5"/>
+              <p:cNvSpPr/>
+              <p:nvPr/>
+            </p:nvSpPr>
+            <p:spPr>
+              <a:xfrm>
+                <a:off x="4511823" y="2420888"/>
+                <a:ext cx="2304255" cy="576064"/>
+              </a:xfrm>
+              <a:prstGeom prst="roundRect">
+                <a:avLst/>
+              </a:prstGeom>
+              <a:ln>
+                <a:noFill/>
+              </a:ln>
+            </p:spPr>
+            <p:style>
+              <a:lnRef idx="1">
+                <a:schemeClr val="accent3"/>
+              </a:lnRef>
+              <a:fillRef idx="2">
+                <a:schemeClr val="accent3"/>
+              </a:fillRef>
+              <a:effectRef idx="1">
+                <a:schemeClr val="accent3"/>
+              </a:effectRef>
+              <a:fontRef idx="minor">
+                <a:schemeClr val="dk1"/>
+              </a:fontRef>
+            </p:style>
+            <p:txBody>
+              <a:bodyPr rtlCol="0" anchor="ctr"/>
+              <a:lstStyle/>
+              <a:p>
+                <a:pPr algn="ctr"/>
+                <a:r>
+                  <a:rPr lang="en-US" sz="2800" dirty="0" smtClean="0">
+                    <a:latin typeface="Corbel" panose="020B0503020204020204" pitchFamily="34" charset="0"/>
+                  </a:rPr>
+                  <a:t>ViewModel</a:t>
+                </a:r>
+                <a:endParaRPr lang="en-US" sz="2800" dirty="0">
+                  <a:latin typeface="Corbel" panose="020B0503020204020204" pitchFamily="34" charset="0"/>
+                </a:endParaRPr>
+              </a:p>
+            </p:txBody>
+          </p:sp>
+          <p:sp>
+            <p:nvSpPr>
+              <p:cNvPr id="7" name="TextBox 6"/>
+              <p:cNvSpPr txBox="1"/>
+              <p:nvPr/>
+            </p:nvSpPr>
+            <p:spPr>
+              <a:xfrm>
+                <a:off x="4627074" y="1620089"/>
+                <a:ext cx="1435008" cy="584775"/>
+              </a:xfrm>
+              <a:prstGeom prst="rect">
+                <a:avLst/>
+              </a:prstGeom>
+              <a:noFill/>
+            </p:spPr>
+            <p:txBody>
+              <a:bodyPr wrap="none" rtlCol="0">
+                <a:spAutoFit/>
+              </a:bodyPr>
+              <a:lstStyle/>
+              <a:p>
+                <a:r>
+                  <a:rPr lang="en-US" sz="3200" dirty="0" smtClean="0">
+                    <a:solidFill>
+                      <a:schemeClr val="bg2">
+                        <a:lumMod val="40000"/>
+                        <a:lumOff val="60000"/>
+                      </a:schemeClr>
+                    </a:solidFill>
+                    <a:latin typeface="Corbel" panose="020B0503020204020204" pitchFamily="34" charset="0"/>
+                  </a:rPr>
+                  <a:t>Cliente</a:t>
+                </a:r>
+                <a:endParaRPr lang="en-US" sz="3200" dirty="0">
+                  <a:solidFill>
+                    <a:schemeClr val="bg2">
+                      <a:lumMod val="40000"/>
+                      <a:lumOff val="60000"/>
+                    </a:schemeClr>
+                  </a:solidFill>
+                  <a:latin typeface="Corbel" panose="020B0503020204020204" pitchFamily="34" charset="0"/>
+                </a:endParaRPr>
+              </a:p>
+            </p:txBody>
+          </p:sp>
+        </p:grpSp>
+        <p:sp>
+          <p:nvSpPr>
+            <p:cNvPr id="9" name="Rounded Rectangle 8"/>
+            <p:cNvSpPr/>
+            <p:nvPr/>
+          </p:nvSpPr>
+          <p:spPr>
+            <a:xfrm>
+              <a:off x="3106650" y="2358137"/>
+              <a:ext cx="1550258" cy="576064"/>
+            </a:xfrm>
+            <a:prstGeom prst="roundRect">
+              <a:avLst/>
+            </a:prstGeom>
+            <a:ln>
+              <a:noFill/>
+            </a:ln>
+          </p:spPr>
+          <p:style>
+            <a:lnRef idx="1">
+              <a:schemeClr val="accent3"/>
+            </a:lnRef>
+            <a:fillRef idx="2">
+              <a:schemeClr val="accent3"/>
+            </a:fillRef>
+            <a:effectRef idx="1">
+              <a:schemeClr val="accent3"/>
+            </a:effectRef>
+            <a:fontRef idx="minor">
+              <a:schemeClr val="dk1"/>
+            </a:fontRef>
+          </p:style>
+          <p:txBody>
+            <a:bodyPr rtlCol="0" anchor="ctr"/>
+            <a:lstStyle/>
+            <a:p>
+              <a:pPr algn="ctr"/>
+              <a:r>
+                <a:rPr lang="en-US" sz="2800" dirty="0" smtClean="0">
+                  <a:latin typeface="Corbel" panose="020B0503020204020204" pitchFamily="34" charset="0"/>
+                </a:rPr>
+                <a:t>View</a:t>
+              </a:r>
+              <a:endParaRPr lang="en-US" sz="2800" dirty="0">
+                <a:latin typeface="Corbel" panose="020B0503020204020204" pitchFamily="34" charset="0"/>
+              </a:endParaRPr>
+            </a:p>
+          </p:txBody>
+        </p:sp>
+      </p:grpSp>
+      <p:sp>
+        <p:nvSpPr>
+          <p:cNvPr id="11" name="Rectangle 10"/>
+          <p:cNvSpPr/>
+          <p:nvPr/>
+        </p:nvSpPr>
+        <p:spPr>
+          <a:xfrm>
+            <a:off x="1559496" y="5198523"/>
+            <a:ext cx="7488832" cy="792088"/>
+          </a:xfrm>
+          <a:prstGeom prst="rect">
+            <a:avLst/>
+          </a:prstGeom>
+          <a:solidFill>
+            <a:schemeClr val="tx2">
+              <a:lumMod val="10000"/>
+            </a:schemeClr>
+          </a:solidFill>
+          <a:ln>
+            <a:noFill/>
+          </a:ln>
+        </p:spPr>
+        <p:style>
+          <a:lnRef idx="2">
+            <a:schemeClr val="accent1">
+              <a:shade val="50000"/>
+            </a:schemeClr>
+          </a:lnRef>
+          <a:fillRef idx="1">
+            <a:schemeClr val="accent1"/>
+          </a:fillRef>
+          <a:effectRef idx="0">
+            <a:schemeClr val="accent1"/>
+          </a:effectRef>
+          <a:fontRef idx="minor">
+            <a:schemeClr val="lt1"/>
+          </a:fontRef>
+        </p:style>
+        <p:txBody>
+          <a:bodyPr rtlCol="0" anchor="ctr"/>
+          <a:lstStyle/>
+          <a:p>
+            <a:pPr algn="ctr"/>
+            <a:r>
+              <a:rPr lang="en-US" sz="2000" dirty="0">
+                <a:solidFill>
+                  <a:schemeClr val="tx1"/>
+                </a:solidFill>
+                <a:latin typeface="Consolas" panose="020B0609020204030204" pitchFamily="49" charset="0"/>
+                <a:cs typeface="Consolas" panose="020B0609020204030204" pitchFamily="49" charset="0"/>
+              </a:rPr>
+              <a:t>ko.applyBindings(</a:t>
+            </a:r>
+            <a:r>
+              <a:rPr lang="en-US" sz="2000" dirty="0">
+                <a:solidFill>
+                  <a:srgbClr val="C00000"/>
+                </a:solidFill>
+                <a:latin typeface="Consolas" panose="020B0609020204030204" pitchFamily="49" charset="0"/>
+                <a:cs typeface="Consolas" panose="020B0609020204030204" pitchFamily="49" charset="0"/>
+              </a:rPr>
+              <a:t>new</a:t>
+            </a:r>
+            <a:r>
+              <a:rPr lang="en-US" sz="2000" dirty="0">
+                <a:solidFill>
+                  <a:schemeClr val="tx1"/>
+                </a:solidFill>
+                <a:latin typeface="Consolas" panose="020B0609020204030204" pitchFamily="49" charset="0"/>
+                <a:cs typeface="Consolas" panose="020B0609020204030204" pitchFamily="49" charset="0"/>
+              </a:rPr>
+              <a:t> </a:t>
+            </a:r>
+            <a:r>
+              <a:rPr lang="en-US" sz="2000" dirty="0">
+                <a:solidFill>
+                  <a:srgbClr val="92D050"/>
+                </a:solidFill>
+                <a:latin typeface="Consolas" panose="020B0609020204030204" pitchFamily="49" charset="0"/>
+                <a:cs typeface="Consolas" panose="020B0609020204030204" pitchFamily="49" charset="0"/>
+              </a:rPr>
+              <a:t>ListarTarefasViewModel</a:t>
+            </a:r>
+            <a:r>
+              <a:rPr lang="en-US" sz="2000" dirty="0">
+                <a:solidFill>
+                  <a:schemeClr val="tx1"/>
+                </a:solidFill>
+                <a:latin typeface="Consolas" panose="020B0609020204030204" pitchFamily="49" charset="0"/>
+                <a:cs typeface="Consolas" panose="020B0609020204030204" pitchFamily="49" charset="0"/>
+              </a:rPr>
+              <a:t>());</a:t>
+            </a:r>
+            <a:endParaRPr lang="en-US" sz="2000" dirty="0">
+              <a:solidFill>
+                <a:schemeClr val="tx1"/>
+              </a:solidFill>
+              <a:latin typeface="Consolas" panose="020B0609020204030204" pitchFamily="49" charset="0"/>
+              <a:cs typeface="Consolas" panose="020B0609020204030204" pitchFamily="49" charset="0"/>
+            </a:endParaRPr>
+          </a:p>
+        </p:txBody>
+      </p:sp>
+      <p:sp>
+        <p:nvSpPr>
+          <p:cNvPr id="12" name="Rectangle 11"/>
+          <p:cNvSpPr/>
+          <p:nvPr/>
+        </p:nvSpPr>
+        <p:spPr>
+          <a:xfrm>
+            <a:off x="860298" y="4406435"/>
+            <a:ext cx="7488832" cy="792088"/>
+          </a:xfrm>
+          <a:prstGeom prst="rect">
+            <a:avLst/>
+          </a:prstGeom>
+          <a:solidFill>
+            <a:schemeClr val="tx2">
+              <a:lumMod val="10000"/>
+            </a:schemeClr>
+          </a:solidFill>
+          <a:ln>
+            <a:noFill/>
+          </a:ln>
+        </p:spPr>
+        <p:style>
+          <a:lnRef idx="2">
+            <a:schemeClr val="accent1">
+              <a:shade val="50000"/>
+            </a:schemeClr>
+          </a:lnRef>
+          <a:fillRef idx="1">
+            <a:schemeClr val="accent1"/>
+          </a:fillRef>
+          <a:effectRef idx="0">
+            <a:schemeClr val="accent1"/>
+          </a:effectRef>
+          <a:fontRef idx="minor">
+            <a:schemeClr val="lt1"/>
+          </a:fontRef>
+        </p:style>
+        <p:txBody>
+          <a:bodyPr rtlCol="0" anchor="ctr"/>
+          <a:lstStyle/>
+          <a:p>
+            <a:pPr algn="ctr"/>
+            <a:r>
+              <a:rPr lang="en-US" sz="2000" i="1" dirty="0">
+                <a:solidFill>
+                  <a:srgbClr val="00B0F0"/>
+                </a:solidFill>
+                <a:latin typeface="Consolas" panose="020B0609020204030204" pitchFamily="49" charset="0"/>
+                <a:cs typeface="Consolas" panose="020B0609020204030204" pitchFamily="49" charset="0"/>
+              </a:rPr>
+              <a:t>function</a:t>
+            </a:r>
+            <a:r>
+              <a:rPr lang="en-US" sz="2000" dirty="0">
+                <a:solidFill>
+                  <a:schemeClr val="tx1"/>
+                </a:solidFill>
+                <a:latin typeface="Consolas" panose="020B0609020204030204" pitchFamily="49" charset="0"/>
+                <a:cs typeface="Consolas" panose="020B0609020204030204" pitchFamily="49" charset="0"/>
+              </a:rPr>
+              <a:t> </a:t>
+            </a:r>
+            <a:r>
+              <a:rPr lang="en-US" sz="2000" dirty="0">
+                <a:solidFill>
+                  <a:srgbClr val="92D050"/>
+                </a:solidFill>
+                <a:latin typeface="Consolas" panose="020B0609020204030204" pitchFamily="49" charset="0"/>
+                <a:cs typeface="Consolas" panose="020B0609020204030204" pitchFamily="49" charset="0"/>
+              </a:rPr>
+              <a:t>ListarTarefasViewModel</a:t>
+            </a:r>
+            <a:r>
+              <a:rPr lang="en-US" sz="2000" dirty="0">
+                <a:solidFill>
+                  <a:schemeClr val="tx1"/>
+                </a:solidFill>
+                <a:latin typeface="Consolas" panose="020B0609020204030204" pitchFamily="49" charset="0"/>
+                <a:cs typeface="Consolas" panose="020B0609020204030204" pitchFamily="49" charset="0"/>
+              </a:rPr>
+              <a:t>() </a:t>
+            </a:r>
+            <a:r>
+              <a:rPr lang="en-US" sz="2000" dirty="0" smtClean="0">
+                <a:solidFill>
+                  <a:schemeClr val="tx1"/>
+                </a:solidFill>
+                <a:latin typeface="Consolas" panose="020B0609020204030204" pitchFamily="49" charset="0"/>
+                <a:cs typeface="Consolas" panose="020B0609020204030204" pitchFamily="49" charset="0"/>
+              </a:rPr>
+              <a:t>{ }</a:t>
+            </a:r>
+            <a:endParaRPr lang="en-US" sz="2000" dirty="0">
+              <a:solidFill>
+                <a:schemeClr val="tx1"/>
+              </a:solidFill>
+              <a:latin typeface="Consolas" panose="020B0609020204030204" pitchFamily="49" charset="0"/>
+              <a:cs typeface="Consolas" panose="020B0609020204030204" pitchFamily="49" charset="0"/>
+            </a:endParaRPr>
+          </a:p>
+        </p:txBody>
+      </p:sp>
+      <p:grpSp>
+        <p:nvGrpSpPr>
+          <p:cNvPr id="16" name="Group 15"/>
+          <p:cNvGrpSpPr/>
+          <p:nvPr/>
+        </p:nvGrpSpPr>
+        <p:grpSpPr>
+          <a:xfrm>
+            <a:off x="4072687" y="1624749"/>
+            <a:ext cx="7488832" cy="1727261"/>
+            <a:chOff x="4072687" y="1624749"/>
+            <a:chExt cx="7488832" cy="1727261"/>
+          </a:xfrm>
+        </p:grpSpPr>
+        <p:grpSp>
+          <p:nvGrpSpPr>
+            <p:cNvPr id="14" name="Group 13"/>
+            <p:cNvGrpSpPr/>
+            <p:nvPr/>
+          </p:nvGrpSpPr>
+          <p:grpSpPr>
+            <a:xfrm>
+              <a:off x="4072687" y="1624749"/>
+              <a:ext cx="7488832" cy="1727261"/>
+              <a:chOff x="4072687" y="1624749"/>
+              <a:chExt cx="7488832" cy="1727261"/>
+            </a:xfrm>
+          </p:grpSpPr>
+          <p:sp>
+            <p:nvSpPr>
+              <p:cNvPr id="8" name="Rectangle 7"/>
+              <p:cNvSpPr/>
+              <p:nvPr/>
+            </p:nvSpPr>
+            <p:spPr>
+              <a:xfrm rot="21243221">
+                <a:off x="4072687" y="2559922"/>
+                <a:ext cx="7488832" cy="792088"/>
+              </a:xfrm>
+              <a:prstGeom prst="rect">
+                <a:avLst/>
+              </a:prstGeom>
+              <a:solidFill>
+                <a:schemeClr val="tx2">
+                  <a:lumMod val="10000"/>
+                </a:schemeClr>
+              </a:solidFill>
+              <a:ln>
+                <a:noFill/>
+              </a:ln>
+            </p:spPr>
+            <p:style>
+              <a:lnRef idx="2">
+                <a:schemeClr val="accent1">
+                  <a:shade val="50000"/>
+                </a:schemeClr>
+              </a:lnRef>
+              <a:fillRef idx="1">
+                <a:schemeClr val="accent1"/>
+              </a:fillRef>
+              <a:effectRef idx="0">
+                <a:schemeClr val="accent1"/>
+              </a:effectRef>
+              <a:fontRef idx="minor">
+                <a:schemeClr val="lt1"/>
+              </a:fontRef>
+            </p:style>
+            <p:txBody>
+              <a:bodyPr rtlCol="0" anchor="ctr"/>
+              <a:lstStyle/>
+              <a:p>
+                <a:pPr algn="ctr"/>
+                <a:r>
+                  <a:rPr lang="en-US" sz="2000" dirty="0">
+                    <a:solidFill>
+                      <a:schemeClr val="tx1"/>
+                    </a:solidFill>
+                    <a:latin typeface="Consolas" panose="020B0609020204030204" pitchFamily="49" charset="0"/>
+                    <a:cs typeface="Consolas" panose="020B0609020204030204" pitchFamily="49" charset="0"/>
+                  </a:rPr>
+                  <a:t>&lt;</a:t>
+                </a:r>
+                <a:r>
+                  <a:rPr lang="en-US" sz="2000" dirty="0">
+                    <a:solidFill>
+                      <a:srgbClr val="C00000"/>
+                    </a:solidFill>
+                    <a:latin typeface="Consolas" panose="020B0609020204030204" pitchFamily="49" charset="0"/>
+                    <a:cs typeface="Consolas" panose="020B0609020204030204" pitchFamily="49" charset="0"/>
+                  </a:rPr>
+                  <a:t>script</a:t>
+                </a:r>
+                <a:r>
+                  <a:rPr lang="en-US" sz="2000" dirty="0">
+                    <a:solidFill>
+                      <a:schemeClr val="tx1"/>
+                    </a:solidFill>
+                    <a:latin typeface="Consolas" panose="020B0609020204030204" pitchFamily="49" charset="0"/>
+                    <a:cs typeface="Consolas" panose="020B0609020204030204" pitchFamily="49" charset="0"/>
+                  </a:rPr>
+                  <a:t> </a:t>
+                </a:r>
+                <a:r>
+                  <a:rPr lang="en-US" sz="2000" dirty="0">
+                    <a:solidFill>
+                      <a:srgbClr val="92D050"/>
+                    </a:solidFill>
+                    <a:latin typeface="Consolas" panose="020B0609020204030204" pitchFamily="49" charset="0"/>
+                    <a:cs typeface="Consolas" panose="020B0609020204030204" pitchFamily="49" charset="0"/>
+                  </a:rPr>
+                  <a:t>src</a:t>
+                </a:r>
+                <a:r>
+                  <a:rPr lang="en-US" sz="2000" dirty="0">
+                    <a:solidFill>
+                      <a:schemeClr val="tx1"/>
+                    </a:solidFill>
+                    <a:latin typeface="Consolas" panose="020B0609020204030204" pitchFamily="49" charset="0"/>
+                    <a:cs typeface="Consolas" panose="020B0609020204030204" pitchFamily="49" charset="0"/>
+                  </a:rPr>
+                  <a:t>=</a:t>
+                </a:r>
+                <a:r>
+                  <a:rPr lang="en-US" sz="2000" dirty="0">
+                    <a:solidFill>
+                      <a:schemeClr val="tx2"/>
+                    </a:solidFill>
+                    <a:latin typeface="Consolas" panose="020B0609020204030204" pitchFamily="49" charset="0"/>
+                    <a:cs typeface="Consolas" panose="020B0609020204030204" pitchFamily="49" charset="0"/>
+                  </a:rPr>
+                  <a:t>"js/libs/knockout-3.1.0.js"</a:t>
+                </a:r>
+                <a:r>
+                  <a:rPr lang="en-US" sz="2000" dirty="0">
+                    <a:solidFill>
+                      <a:schemeClr val="tx1"/>
+                    </a:solidFill>
+                    <a:latin typeface="Consolas" panose="020B0609020204030204" pitchFamily="49" charset="0"/>
+                    <a:cs typeface="Consolas" panose="020B0609020204030204" pitchFamily="49" charset="0"/>
+                  </a:rPr>
+                  <a:t>&gt;&lt;/</a:t>
+                </a:r>
+                <a:r>
+                  <a:rPr lang="en-US" sz="2000" dirty="0">
+                    <a:solidFill>
+                      <a:srgbClr val="C00000"/>
+                    </a:solidFill>
+                    <a:latin typeface="Consolas" panose="020B0609020204030204" pitchFamily="49" charset="0"/>
+                    <a:cs typeface="Consolas" panose="020B0609020204030204" pitchFamily="49" charset="0"/>
+                  </a:rPr>
+                  <a:t>script</a:t>
+                </a:r>
+                <a:r>
+                  <a:rPr lang="en-US" sz="2000" dirty="0">
+                    <a:solidFill>
+                      <a:schemeClr val="tx1"/>
+                    </a:solidFill>
+                    <a:latin typeface="Consolas" panose="020B0609020204030204" pitchFamily="49" charset="0"/>
+                    <a:cs typeface="Consolas" panose="020B0609020204030204" pitchFamily="49" charset="0"/>
+                  </a:rPr>
+                  <a:t>&gt;</a:t>
+                </a:r>
+                <a:endParaRPr lang="en-US" sz="2000" dirty="0">
+                  <a:solidFill>
+                    <a:schemeClr val="tx1"/>
+                  </a:solidFill>
+                  <a:latin typeface="Consolas" panose="020B0609020204030204" pitchFamily="49" charset="0"/>
+                  <a:cs typeface="Consolas" panose="020B0609020204030204" pitchFamily="49" charset="0"/>
+                </a:endParaRPr>
+              </a:p>
+            </p:txBody>
+          </p:sp>
+          <p:sp>
+            <p:nvSpPr>
+              <p:cNvPr id="13" name="TextBox 12"/>
+              <p:cNvSpPr txBox="1"/>
+              <p:nvPr/>
+            </p:nvSpPr>
+            <p:spPr>
+              <a:xfrm>
+                <a:off x="6188033" y="1624749"/>
+                <a:ext cx="4368504" cy="830997"/>
+              </a:xfrm>
+              <a:prstGeom prst="rect">
+                <a:avLst/>
+              </a:prstGeom>
+              <a:noFill/>
+            </p:spPr>
+            <p:txBody>
+              <a:bodyPr wrap="none" rtlCol="0">
+                <a:spAutoFit/>
+              </a:bodyPr>
+              <a:lstStyle/>
+              <a:p>
+                <a:r>
+                  <a:rPr lang="en-US" sz="2400" dirty="0" smtClean="0">
+                    <a:solidFill>
+                      <a:srgbClr val="FFFFCC"/>
+                    </a:solidFill>
+                    <a:latin typeface="Corbel" panose="020B0503020204020204" pitchFamily="34" charset="0"/>
+                  </a:rPr>
+                  <a:t>Arquivo único, sem dependência </a:t>
+                </a:r>
+              </a:p>
+              <a:p>
+                <a:r>
+                  <a:rPr lang="en-US" sz="2400" dirty="0" smtClean="0">
+                    <a:solidFill>
+                      <a:srgbClr val="FFFFCC"/>
+                    </a:solidFill>
+                    <a:latin typeface="Corbel" panose="020B0503020204020204" pitchFamily="34" charset="0"/>
+                  </a:rPr>
+                  <a:t>de outras bibliotecas JavaScript.</a:t>
+                </a:r>
+                <a:endParaRPr lang="en-US" sz="2400" dirty="0">
+                  <a:solidFill>
+                    <a:srgbClr val="FFFFCC"/>
+                  </a:solidFill>
+                  <a:latin typeface="Corbel" panose="020B0503020204020204" pitchFamily="34" charset="0"/>
+                </a:endParaRPr>
+              </a:p>
+            </p:txBody>
+          </p:sp>
+        </p:grpSp>
+        <p:sp>
+          <p:nvSpPr>
+            <p:cNvPr id="15" name="TextBox 14"/>
+            <p:cNvSpPr txBox="1"/>
+            <p:nvPr/>
+          </p:nvSpPr>
+          <p:spPr>
+            <a:xfrm rot="21276439">
+              <a:off x="10215183" y="2965558"/>
+              <a:ext cx="1188210" cy="369332"/>
+            </a:xfrm>
+            <a:prstGeom prst="rect">
+              <a:avLst/>
+            </a:prstGeom>
+            <a:noFill/>
+          </p:spPr>
+          <p:txBody>
+            <a:bodyPr wrap="none" rtlCol="0">
+              <a:spAutoFit/>
+            </a:bodyPr>
+            <a:lstStyle/>
+            <a:p>
+              <a:r>
+                <a:rPr lang="en-US" dirty="0" smtClean="0">
+                  <a:latin typeface="Corbel" panose="020B0503020204020204" pitchFamily="34" charset="0"/>
+                </a:rPr>
+                <a:t>Script TAG</a:t>
+              </a:r>
+              <a:endParaRPr lang="en-US" dirty="0">
+                <a:latin typeface="Corbel" panose="020B0503020204020204" pitchFamily="34" charset="0"/>
+              </a:endParaRPr>
+            </a:p>
+          </p:txBody>
+        </p:sp>
+      </p:grpSp>
+      <p:sp>
+        <p:nvSpPr>
+          <p:cNvPr id="17" name="TextBox 16"/>
+          <p:cNvSpPr txBox="1"/>
+          <p:nvPr/>
+        </p:nvSpPr>
+        <p:spPr>
+          <a:xfrm>
+            <a:off x="2855640" y="5954286"/>
+            <a:ext cx="5859296" cy="369332"/>
+          </a:xfrm>
+          <a:prstGeom prst="rect">
+            <a:avLst/>
+          </a:prstGeom>
+          <a:noFill/>
+        </p:spPr>
+        <p:txBody>
+          <a:bodyPr wrap="none" rtlCol="0">
+            <a:spAutoFit/>
+          </a:bodyPr>
+          <a:lstStyle/>
+          <a:p>
+            <a:r>
+              <a:rPr lang="en-US" dirty="0" smtClean="0">
+                <a:latin typeface="Corbel" panose="020B0503020204020204" pitchFamily="34" charset="0"/>
+              </a:rPr>
+              <a:t>Aplicando bindings do data model a interface com o usuário</a:t>
+            </a:r>
+            <a:endParaRPr lang="en-US" dirty="0">
+              <a:latin typeface="Corbel" panose="020B0503020204020204" pitchFamily="34" charset="0"/>
+            </a:endParaRPr>
+          </a:p>
+        </p:txBody>
+      </p:sp>
+      <p:sp>
+        <p:nvSpPr>
+          <p:cNvPr id="18" name="TextBox 17"/>
+          <p:cNvSpPr txBox="1"/>
+          <p:nvPr/>
+        </p:nvSpPr>
+        <p:spPr>
+          <a:xfrm>
+            <a:off x="863400" y="3606115"/>
+            <a:ext cx="4368504" cy="830997"/>
+          </a:xfrm>
+          <a:prstGeom prst="rect">
+            <a:avLst/>
+          </a:prstGeom>
+          <a:noFill/>
+        </p:spPr>
+        <p:txBody>
+          <a:bodyPr wrap="none" rtlCol="0">
+            <a:spAutoFit/>
+          </a:bodyPr>
+          <a:lstStyle/>
+          <a:p>
+            <a:r>
+              <a:rPr lang="en-US" sz="2400" dirty="0" smtClean="0">
+                <a:solidFill>
+                  <a:srgbClr val="FFFFCC"/>
+                </a:solidFill>
+                <a:latin typeface="Corbel" panose="020B0503020204020204" pitchFamily="34" charset="0"/>
+              </a:rPr>
+              <a:t>Arquivo único, sem dependência </a:t>
+            </a:r>
+          </a:p>
+          <a:p>
+            <a:r>
+              <a:rPr lang="en-US" sz="2400" dirty="0" smtClean="0">
+                <a:solidFill>
+                  <a:srgbClr val="FFFFCC"/>
+                </a:solidFill>
+                <a:latin typeface="Corbel" panose="020B0503020204020204" pitchFamily="34" charset="0"/>
+              </a:rPr>
+              <a:t>de outras bibliotecas JavaScript.</a:t>
+            </a:r>
+            <a:endParaRPr lang="en-US" sz="2400" dirty="0">
+              <a:solidFill>
+                <a:srgbClr val="FFFFCC"/>
+              </a:solidFill>
+              <a:latin typeface="Corbel" panose="020B0503020204020204" pitchFamily="34" charset="0"/>
+            </a:endParaRPr>
+          </a:p>
+        </p:txBody>
+      </p:sp>
     </p:spTree>
     <p:extLst>
       <p:ext uri="{BB962C8B-B14F-4D97-AF65-F5344CB8AC3E}">
@@ -21482,9 +22359,142 @@
   <p:timing>
     <p:tnLst>
       <p:par>
-        <p:cTn id="1" dur="indefinite" restart="never" nodeType="tmRoot"/>
+        <p:cTn id="1" dur="indefinite" restart="never" nodeType="tmRoot">
+          <p:childTnLst>
+            <p:seq concurrent="1" nextAc="seek">
+              <p:cTn id="2" dur="indefinite" nodeType="mainSeq">
+                <p:childTnLst>
+                  <p:par>
+                    <p:cTn id="3" fill="hold">
+                      <p:stCondLst>
+                        <p:cond delay="indefinite"/>
+                      </p:stCondLst>
+                      <p:childTnLst>
+                        <p:par>
+                          <p:cTn id="4" fill="hold">
+                            <p:stCondLst>
+                              <p:cond delay="0"/>
+                            </p:stCondLst>
+                            <p:childTnLst>
+                              <p:par>
+                                <p:cTn id="5" presetID="10" presetClass="entr" presetSubtype="0" fill="hold" grpId="0" nodeType="clickEffect">
+                                  <p:stCondLst>
+                                    <p:cond delay="0"/>
+                                  </p:stCondLst>
+                                  <p:childTnLst>
+                                    <p:set>
+                                      <p:cBhvr>
+                                        <p:cTn id="6" dur="1" fill="hold">
+                                          <p:stCondLst>
+                                            <p:cond delay="0"/>
+                                          </p:stCondLst>
+                                        </p:cTn>
+                                        <p:tgtEl>
+                                          <p:spTgt spid="11"/>
+                                        </p:tgtEl>
+                                        <p:attrNameLst>
+                                          <p:attrName>style.visibility</p:attrName>
+                                        </p:attrNameLst>
+                                      </p:cBhvr>
+                                      <p:to>
+                                        <p:strVal val="visible"/>
+                                      </p:to>
+                                    </p:set>
+                                    <p:animEffect transition="in" filter="fade">
+                                      <p:cBhvr>
+                                        <p:cTn id="7" dur="500"/>
+                                        <p:tgtEl>
+                                          <p:spTgt spid="11"/>
+                                        </p:tgtEl>
+                                      </p:cBhvr>
+                                    </p:animEffect>
+                                  </p:childTnLst>
+                                </p:cTn>
+                              </p:par>
+                            </p:childTnLst>
+                          </p:cTn>
+                        </p:par>
+                      </p:childTnLst>
+                    </p:cTn>
+                  </p:par>
+                  <p:par>
+                    <p:cTn id="8" fill="hold">
+                      <p:stCondLst>
+                        <p:cond delay="indefinite"/>
+                      </p:stCondLst>
+                      <p:childTnLst>
+                        <p:par>
+                          <p:cTn id="9" fill="hold">
+                            <p:stCondLst>
+                              <p:cond delay="0"/>
+                            </p:stCondLst>
+                            <p:childTnLst>
+                              <p:par>
+                                <p:cTn id="10" presetID="10" presetClass="entr" presetSubtype="0" fill="hold" grpId="0" nodeType="clickEffect">
+                                  <p:stCondLst>
+                                    <p:cond delay="0"/>
+                                  </p:stCondLst>
+                                  <p:childTnLst>
+                                    <p:set>
+                                      <p:cBhvr>
+                                        <p:cTn id="11" dur="1" fill="hold">
+                                          <p:stCondLst>
+                                            <p:cond delay="0"/>
+                                          </p:stCondLst>
+                                        </p:cTn>
+                                        <p:tgtEl>
+                                          <p:spTgt spid="12"/>
+                                        </p:tgtEl>
+                                        <p:attrNameLst>
+                                          <p:attrName>style.visibility</p:attrName>
+                                        </p:attrNameLst>
+                                      </p:cBhvr>
+                                      <p:to>
+                                        <p:strVal val="visible"/>
+                                      </p:to>
+                                    </p:set>
+                                    <p:animEffect transition="in" filter="fade">
+                                      <p:cBhvr>
+                                        <p:cTn id="12" dur="500"/>
+                                        <p:tgtEl>
+                                          <p:spTgt spid="12"/>
+                                        </p:tgtEl>
+                                      </p:cBhvr>
+                                    </p:animEffect>
+                                  </p:childTnLst>
+                                </p:cTn>
+                              </p:par>
+                            </p:childTnLst>
+                          </p:cTn>
+                        </p:par>
+                      </p:childTnLst>
+                    </p:cTn>
+                  </p:par>
+                </p:childTnLst>
+              </p:cTn>
+              <p:prevCondLst>
+                <p:cond evt="onPrev" delay="0">
+                  <p:tgtEl>
+                    <p:sldTgt/>
+                  </p:tgtEl>
+                </p:cond>
+              </p:prevCondLst>
+              <p:nextCondLst>
+                <p:cond evt="onNext" delay="0">
+                  <p:tgtEl>
+                    <p:sldTgt/>
+                  </p:tgtEl>
+                </p:cond>
+              </p:nextCondLst>
+            </p:seq>
+          </p:childTnLst>
+        </p:cTn>
       </p:par>
     </p:tnLst>
+    <p:bldLst>
+      <p:bldP spid="11" grpId="0" animBg="1"/>
+      <p:bldP spid="12" grpId="0" animBg="1"/>
+    </p:bldLst>
   </p:timing>
 </p:sld>
 </file>

</xml_diff>